<commit_message>
Added slides on conditional and iteration block statements
</commit_message>
<xml_diff>
--- a/Fortran/modern_fortran.pptx
+++ b/Fortran/modern_fortran.pptx
@@ -6,12 +6,21 @@
   </p:sldMasterIdLst>
   <p:sldIdLst>
     <p:sldId id="256" r:id="rId2"/>
-    <p:sldId id="262" r:id="rId3"/>
-    <p:sldId id="257" r:id="rId4"/>
-    <p:sldId id="259" r:id="rId5"/>
-    <p:sldId id="260" r:id="rId6"/>
-    <p:sldId id="258" r:id="rId7"/>
-    <p:sldId id="261" r:id="rId8"/>
+    <p:sldId id="264" r:id="rId3"/>
+    <p:sldId id="262" r:id="rId4"/>
+    <p:sldId id="263" r:id="rId5"/>
+    <p:sldId id="257" r:id="rId6"/>
+    <p:sldId id="259" r:id="rId7"/>
+    <p:sldId id="260" r:id="rId8"/>
+    <p:sldId id="258" r:id="rId9"/>
+    <p:sldId id="261" r:id="rId10"/>
+    <p:sldId id="265" r:id="rId11"/>
+    <p:sldId id="266" r:id="rId12"/>
+    <p:sldId id="268" r:id="rId13"/>
+    <p:sldId id="267" r:id="rId14"/>
+    <p:sldId id="269" r:id="rId15"/>
+    <p:sldId id="270" r:id="rId16"/>
+    <p:sldId id="271" r:id="rId17"/>
   </p:sldIdLst>
   <p:sldSz cx="9144000" cy="6858000" type="screen4x3"/>
   <p:notesSz cx="6858000" cy="9144000"/>
@@ -294,7 +303,7 @@
           <a:p>
             <a:fld id="{3727626D-DB64-4BA0-82BA-59C29F46B0C7}" type="datetimeFigureOut">
               <a:rPr lang="nl-BE" smtClean="0"/>
-              <a:t>25/03/2015</a:t>
+              <a:t>26/03/2015</a:t>
             </a:fld>
             <a:endParaRPr lang="nl-BE"/>
           </a:p>
@@ -464,7 +473,7 @@
           <a:p>
             <a:fld id="{3727626D-DB64-4BA0-82BA-59C29F46B0C7}" type="datetimeFigureOut">
               <a:rPr lang="nl-BE" smtClean="0"/>
-              <a:t>25/03/2015</a:t>
+              <a:t>26/03/2015</a:t>
             </a:fld>
             <a:endParaRPr lang="nl-BE"/>
           </a:p>
@@ -644,7 +653,7 @@
           <a:p>
             <a:fld id="{3727626D-DB64-4BA0-82BA-59C29F46B0C7}" type="datetimeFigureOut">
               <a:rPr lang="nl-BE" smtClean="0"/>
-              <a:t>25/03/2015</a:t>
+              <a:t>26/03/2015</a:t>
             </a:fld>
             <a:endParaRPr lang="nl-BE"/>
           </a:p>
@@ -814,7 +823,7 @@
           <a:p>
             <a:fld id="{3727626D-DB64-4BA0-82BA-59C29F46B0C7}" type="datetimeFigureOut">
               <a:rPr lang="nl-BE" smtClean="0"/>
-              <a:t>25/03/2015</a:t>
+              <a:t>26/03/2015</a:t>
             </a:fld>
             <a:endParaRPr lang="nl-BE"/>
           </a:p>
@@ -1060,7 +1069,7 @@
           <a:p>
             <a:fld id="{3727626D-DB64-4BA0-82BA-59C29F46B0C7}" type="datetimeFigureOut">
               <a:rPr lang="nl-BE" smtClean="0"/>
-              <a:t>25/03/2015</a:t>
+              <a:t>26/03/2015</a:t>
             </a:fld>
             <a:endParaRPr lang="nl-BE"/>
           </a:p>
@@ -1348,7 +1357,7 @@
           <a:p>
             <a:fld id="{3727626D-DB64-4BA0-82BA-59C29F46B0C7}" type="datetimeFigureOut">
               <a:rPr lang="nl-BE" smtClean="0"/>
-              <a:t>25/03/2015</a:t>
+              <a:t>26/03/2015</a:t>
             </a:fld>
             <a:endParaRPr lang="nl-BE"/>
           </a:p>
@@ -1770,7 +1779,7 @@
           <a:p>
             <a:fld id="{3727626D-DB64-4BA0-82BA-59C29F46B0C7}" type="datetimeFigureOut">
               <a:rPr lang="nl-BE" smtClean="0"/>
-              <a:t>25/03/2015</a:t>
+              <a:t>26/03/2015</a:t>
             </a:fld>
             <a:endParaRPr lang="nl-BE"/>
           </a:p>
@@ -1888,7 +1897,7 @@
           <a:p>
             <a:fld id="{3727626D-DB64-4BA0-82BA-59C29F46B0C7}" type="datetimeFigureOut">
               <a:rPr lang="nl-BE" smtClean="0"/>
-              <a:t>25/03/2015</a:t>
+              <a:t>26/03/2015</a:t>
             </a:fld>
             <a:endParaRPr lang="nl-BE"/>
           </a:p>
@@ -1983,7 +1992,7 @@
           <a:p>
             <a:fld id="{3727626D-DB64-4BA0-82BA-59C29F46B0C7}" type="datetimeFigureOut">
               <a:rPr lang="nl-BE" smtClean="0"/>
-              <a:t>25/03/2015</a:t>
+              <a:t>26/03/2015</a:t>
             </a:fld>
             <a:endParaRPr lang="nl-BE"/>
           </a:p>
@@ -2260,7 +2269,7 @@
           <a:p>
             <a:fld id="{3727626D-DB64-4BA0-82BA-59C29F46B0C7}" type="datetimeFigureOut">
               <a:rPr lang="nl-BE" smtClean="0"/>
-              <a:t>25/03/2015</a:t>
+              <a:t>26/03/2015</a:t>
             </a:fld>
             <a:endParaRPr lang="nl-BE"/>
           </a:p>
@@ -2513,7 +2522,7 @@
           <a:p>
             <a:fld id="{3727626D-DB64-4BA0-82BA-59C29F46B0C7}" type="datetimeFigureOut">
               <a:rPr lang="nl-BE" smtClean="0"/>
-              <a:t>25/03/2015</a:t>
+              <a:t>26/03/2015</a:t>
             </a:fld>
             <a:endParaRPr lang="nl-BE"/>
           </a:p>
@@ -2726,7 +2735,7 @@
           <a:p>
             <a:fld id="{3727626D-DB64-4BA0-82BA-59C29F46B0C7}" type="datetimeFigureOut">
               <a:rPr lang="nl-BE" smtClean="0"/>
-              <a:t>25/03/2015</a:t>
+              <a:t>26/03/2015</a:t>
             </a:fld>
             <a:endParaRPr lang="nl-BE"/>
           </a:p>
@@ -3168,6 +3177,2549 @@
 </p:sld>
 </file>
 
+<file path=ppt/slides/slide10.xml><?xml version="1.0" encoding="utf-8"?>
+<p:sld xmlns:a="http://schemas.openxmlformats.org/drawingml/2006/main" xmlns:r="http://schemas.openxmlformats.org/officeDocument/2006/relationships" xmlns:p="http://schemas.openxmlformats.org/presentationml/2006/main">
+  <p:cSld>
+    <p:spTree>
+      <p:nvGrpSpPr>
+        <p:cNvPr id="1" name=""/>
+        <p:cNvGrpSpPr/>
+        <p:nvPr/>
+      </p:nvGrpSpPr>
+      <p:grpSpPr>
+        <a:xfrm>
+          <a:off x="0" y="0"/>
+          <a:ext cx="0" cy="0"/>
+          <a:chOff x="0" y="0"/>
+          <a:chExt cx="0" cy="0"/>
+        </a:xfrm>
+      </p:grpSpPr>
+      <p:sp>
+        <p:nvSpPr>
+          <p:cNvPr id="2" name="Title 1"/>
+          <p:cNvSpPr>
+            <a:spLocks noGrp="1"/>
+          </p:cNvSpPr>
+          <p:nvPr>
+            <p:ph type="title"/>
+          </p:nvPr>
+        </p:nvSpPr>
+        <p:spPr/>
+        <p:txBody>
+          <a:bodyPr/>
+          <a:lstStyle/>
+          <a:p>
+            <a:r>
+              <a:rPr lang="en-US" dirty="0" smtClean="0"/>
+              <a:t>Control statements</a:t>
+            </a:r>
+            <a:endParaRPr lang="nl-BE" dirty="0"/>
+          </a:p>
+        </p:txBody>
+      </p:sp>
+      <p:sp>
+        <p:nvSpPr>
+          <p:cNvPr id="3" name="Text Placeholder 2"/>
+          <p:cNvSpPr>
+            <a:spLocks noGrp="1"/>
+          </p:cNvSpPr>
+          <p:nvPr>
+            <p:ph type="body" idx="1"/>
+          </p:nvPr>
+        </p:nvSpPr>
+        <p:spPr/>
+        <p:txBody>
+          <a:bodyPr/>
+          <a:lstStyle/>
+          <a:p>
+            <a:endParaRPr lang="nl-BE"/>
+          </a:p>
+        </p:txBody>
+      </p:sp>
+    </p:spTree>
+    <p:extLst>
+      <p:ext uri="{BB962C8B-B14F-4D97-AF65-F5344CB8AC3E}">
+        <p14:creationId xmlns:p14="http://schemas.microsoft.com/office/powerpoint/2010/main" val="1701642761"/>
+      </p:ext>
+    </p:extLst>
+  </p:cSld>
+  <p:clrMapOvr>
+    <a:masterClrMapping/>
+  </p:clrMapOvr>
+</p:sld>
+</file>
+
+<file path=ppt/slides/slide11.xml><?xml version="1.0" encoding="utf-8"?>
+<p:sld xmlns:a="http://schemas.openxmlformats.org/drawingml/2006/main" xmlns:r="http://schemas.openxmlformats.org/officeDocument/2006/relationships" xmlns:p="http://schemas.openxmlformats.org/presentationml/2006/main">
+  <p:cSld>
+    <p:spTree>
+      <p:nvGrpSpPr>
+        <p:cNvPr id="1" name=""/>
+        <p:cNvGrpSpPr/>
+        <p:nvPr/>
+      </p:nvGrpSpPr>
+      <p:grpSpPr>
+        <a:xfrm>
+          <a:off x="0" y="0"/>
+          <a:ext cx="0" cy="0"/>
+          <a:chOff x="0" y="0"/>
+          <a:chExt cx="0" cy="0"/>
+        </a:xfrm>
+      </p:grpSpPr>
+      <p:sp>
+        <p:nvSpPr>
+          <p:cNvPr id="2" name="Title 1"/>
+          <p:cNvSpPr>
+            <a:spLocks noGrp="1"/>
+          </p:cNvSpPr>
+          <p:nvPr>
+            <p:ph type="title"/>
+          </p:nvPr>
+        </p:nvSpPr>
+        <p:spPr/>
+        <p:txBody>
+          <a:bodyPr/>
+          <a:lstStyle/>
+          <a:p>
+            <a:r>
+              <a:rPr lang="en-US" dirty="0" smtClean="0"/>
+              <a:t>Conditional statements: IF</a:t>
+            </a:r>
+            <a:endParaRPr lang="nl-BE" dirty="0"/>
+          </a:p>
+        </p:txBody>
+      </p:sp>
+      <p:sp>
+        <p:nvSpPr>
+          <p:cNvPr id="3" name="Content Placeholder 2"/>
+          <p:cNvSpPr>
+            <a:spLocks noGrp="1"/>
+          </p:cNvSpPr>
+          <p:nvPr>
+            <p:ph idx="1"/>
+          </p:nvPr>
+        </p:nvSpPr>
+        <p:spPr/>
+        <p:txBody>
+          <a:bodyPr/>
+          <a:lstStyle/>
+          <a:p>
+            <a:r>
+              <a:rPr lang="en-US" dirty="0" smtClean="0"/>
+              <a:t>if block statement</a:t>
+            </a:r>
+          </a:p>
+          <a:p>
+            <a:endParaRPr lang="en-US" dirty="0"/>
+          </a:p>
+          <a:p>
+            <a:endParaRPr lang="en-US" dirty="0" smtClean="0"/>
+          </a:p>
+          <a:p>
+            <a:endParaRPr lang="en-US" dirty="0"/>
+          </a:p>
+          <a:p>
+            <a:endParaRPr lang="en-US" dirty="0" smtClean="0"/>
+          </a:p>
+          <a:p>
+            <a:r>
+              <a:rPr lang="en-US" dirty="0" smtClean="0"/>
+              <a:t>if statement</a:t>
+            </a:r>
+            <a:endParaRPr lang="nl-BE" dirty="0"/>
+          </a:p>
+        </p:txBody>
+      </p:sp>
+      <p:sp>
+        <p:nvSpPr>
+          <p:cNvPr id="4" name="TextBox 3"/>
+          <p:cNvSpPr txBox="1"/>
+          <p:nvPr/>
+        </p:nvSpPr>
+        <p:spPr>
+          <a:xfrm>
+            <a:off x="827584" y="2279774"/>
+            <a:ext cx="6120680" cy="1815882"/>
+          </a:xfrm>
+          <a:prstGeom prst="rect">
+            <a:avLst/>
+          </a:prstGeom>
+          <a:solidFill>
+            <a:schemeClr val="accent1">
+              <a:lumMod val="40000"/>
+              <a:lumOff val="60000"/>
+            </a:schemeClr>
+          </a:solidFill>
+        </p:spPr>
+        <p:txBody>
+          <a:bodyPr wrap="square" rtlCol="0">
+            <a:spAutoFit/>
+          </a:bodyPr>
+          <a:lstStyle/>
+          <a:p>
+            <a:r>
+              <a:rPr lang="en-US" sz="1600" dirty="0" smtClean="0"/>
+              <a:t>…</a:t>
+            </a:r>
+          </a:p>
+          <a:p>
+            <a:r>
+              <a:rPr lang="en-US" sz="1600" dirty="0" smtClean="0"/>
+              <a:t>IF (x &gt; 10.0) THEN</a:t>
+            </a:r>
+          </a:p>
+          <a:p>
+            <a:r>
+              <a:rPr lang="en-US" sz="1600" dirty="0" smtClean="0"/>
+              <a:t>    …</a:t>
+            </a:r>
+            <a:endParaRPr lang="en-US" sz="1600" dirty="0"/>
+          </a:p>
+          <a:p>
+            <a:r>
+              <a:rPr lang="en-US" sz="1600" dirty="0" smtClean="0"/>
+              <a:t>ELSE</a:t>
+            </a:r>
+          </a:p>
+          <a:p>
+            <a:r>
+              <a:rPr lang="en-US" sz="1600" dirty="0"/>
+              <a:t> </a:t>
+            </a:r>
+            <a:r>
+              <a:rPr lang="en-US" sz="1600" dirty="0" smtClean="0"/>
+              <a:t>   …</a:t>
+            </a:r>
+          </a:p>
+          <a:p>
+            <a:r>
+              <a:rPr lang="en-US" sz="1600" dirty="0" smtClean="0"/>
+              <a:t>END IF</a:t>
+            </a:r>
+          </a:p>
+          <a:p>
+            <a:r>
+              <a:rPr lang="en-US" sz="1600" dirty="0" smtClean="0"/>
+              <a:t>…</a:t>
+            </a:r>
+            <a:endParaRPr lang="en-US" sz="1600" dirty="0" smtClean="0"/>
+          </a:p>
+        </p:txBody>
+      </p:sp>
+      <p:grpSp>
+        <p:nvGrpSpPr>
+          <p:cNvPr id="6" name="Group 5"/>
+          <p:cNvGrpSpPr/>
+          <p:nvPr/>
+        </p:nvGrpSpPr>
+        <p:grpSpPr>
+          <a:xfrm>
+            <a:off x="1259632" y="1774557"/>
+            <a:ext cx="5328592" cy="1006371"/>
+            <a:chOff x="2843808" y="1865002"/>
+            <a:chExt cx="5328592" cy="1006371"/>
+          </a:xfrm>
+        </p:grpSpPr>
+        <p:sp>
+          <p:nvSpPr>
+            <p:cNvPr id="7" name="Rounded Rectangle 6"/>
+            <p:cNvSpPr/>
+            <p:nvPr/>
+          </p:nvSpPr>
+          <p:spPr>
+            <a:xfrm>
+              <a:off x="2843808" y="2691353"/>
+              <a:ext cx="144016" cy="180020"/>
+            </a:xfrm>
+            <a:prstGeom prst="roundRect">
+              <a:avLst/>
+            </a:prstGeom>
+            <a:noFill/>
+            <a:ln>
+              <a:solidFill>
+                <a:srgbClr val="C00000"/>
+              </a:solidFill>
+            </a:ln>
+          </p:spPr>
+          <p:style>
+            <a:lnRef idx="2">
+              <a:schemeClr val="accent1">
+                <a:shade val="50000"/>
+              </a:schemeClr>
+            </a:lnRef>
+            <a:fillRef idx="1">
+              <a:schemeClr val="accent1"/>
+            </a:fillRef>
+            <a:effectRef idx="0">
+              <a:schemeClr val="accent1"/>
+            </a:effectRef>
+            <a:fontRef idx="minor">
+              <a:schemeClr val="lt1"/>
+            </a:fontRef>
+          </p:style>
+          <p:txBody>
+            <a:bodyPr rtlCol="0" anchor="ctr"/>
+            <a:lstStyle/>
+            <a:p>
+              <a:pPr algn="ctr"/>
+              <a:endParaRPr lang="nl-BE"/>
+            </a:p>
+          </p:txBody>
+        </p:sp>
+        <p:sp>
+          <p:nvSpPr>
+            <p:cNvPr id="8" name="TextBox 7"/>
+            <p:cNvSpPr txBox="1"/>
+            <p:nvPr/>
+          </p:nvSpPr>
+          <p:spPr>
+            <a:xfrm>
+              <a:off x="5865935" y="1865002"/>
+              <a:ext cx="2306465" cy="646331"/>
+            </a:xfrm>
+            <a:prstGeom prst="rect">
+              <a:avLst/>
+            </a:prstGeom>
+            <a:solidFill>
+              <a:schemeClr val="bg1"/>
+            </a:solidFill>
+            <a:ln>
+              <a:solidFill>
+                <a:srgbClr val="C00000"/>
+              </a:solidFill>
+            </a:ln>
+          </p:spPr>
+          <p:txBody>
+            <a:bodyPr wrap="none" rtlCol="0">
+              <a:spAutoFit/>
+            </a:bodyPr>
+            <a:lstStyle/>
+            <a:p>
+              <a:r>
+                <a:rPr lang="en-US" dirty="0"/>
+                <a:t>comparison operators</a:t>
+              </a:r>
+              <a:r>
+                <a:rPr lang="en-US" dirty="0" smtClean="0"/>
+                <a:t>:</a:t>
+              </a:r>
+              <a:br>
+                <a:rPr lang="en-US" dirty="0" smtClean="0"/>
+              </a:br>
+              <a:r>
+                <a:rPr lang="en-US" dirty="0" smtClean="0">
+                  <a:latin typeface="Courier New" panose="02070309020205020404" pitchFamily="49" charset="0"/>
+                  <a:cs typeface="Courier New" panose="02070309020205020404" pitchFamily="49" charset="0"/>
+                </a:rPr>
+                <a:t>==</a:t>
+              </a:r>
+              <a:r>
+                <a:rPr lang="en-US" dirty="0" smtClean="0"/>
+                <a:t>, </a:t>
+              </a:r>
+              <a:r>
+                <a:rPr lang="en-US" dirty="0">
+                  <a:latin typeface="Courier New" panose="02070309020205020404" pitchFamily="49" charset="0"/>
+                  <a:cs typeface="Courier New" panose="02070309020205020404" pitchFamily="49" charset="0"/>
+                </a:rPr>
+                <a:t>/=</a:t>
+              </a:r>
+              <a:r>
+                <a:rPr lang="en-US" dirty="0"/>
+                <a:t>, </a:t>
+              </a:r>
+              <a:r>
+                <a:rPr lang="en-US" dirty="0">
+                  <a:latin typeface="Courier New" panose="02070309020205020404" pitchFamily="49" charset="0"/>
+                  <a:cs typeface="Courier New" panose="02070309020205020404" pitchFamily="49" charset="0"/>
+                </a:rPr>
+                <a:t>&lt;</a:t>
+              </a:r>
+              <a:r>
+                <a:rPr lang="en-US" dirty="0"/>
+                <a:t>, </a:t>
+              </a:r>
+              <a:r>
+                <a:rPr lang="en-US" dirty="0">
+                  <a:latin typeface="Courier New" panose="02070309020205020404" pitchFamily="49" charset="0"/>
+                  <a:cs typeface="Courier New" panose="02070309020205020404" pitchFamily="49" charset="0"/>
+                </a:rPr>
+                <a:t>&lt;=</a:t>
+              </a:r>
+              <a:r>
+                <a:rPr lang="en-US" dirty="0"/>
+                <a:t>, </a:t>
+              </a:r>
+              <a:r>
+                <a:rPr lang="en-US" dirty="0">
+                  <a:latin typeface="Courier New" panose="02070309020205020404" pitchFamily="49" charset="0"/>
+                  <a:cs typeface="Courier New" panose="02070309020205020404" pitchFamily="49" charset="0"/>
+                </a:rPr>
+                <a:t>&gt;</a:t>
+              </a:r>
+              <a:r>
+                <a:rPr lang="en-US" dirty="0"/>
+                <a:t>, </a:t>
+              </a:r>
+              <a:r>
+                <a:rPr lang="en-US" dirty="0">
+                  <a:latin typeface="Courier New" panose="02070309020205020404" pitchFamily="49" charset="0"/>
+                  <a:cs typeface="Courier New" panose="02070309020205020404" pitchFamily="49" charset="0"/>
+                </a:rPr>
+                <a:t>&gt;=</a:t>
+              </a:r>
+              <a:endParaRPr lang="nl-BE" dirty="0">
+                <a:latin typeface="Courier New" panose="02070309020205020404" pitchFamily="49" charset="0"/>
+                <a:cs typeface="Courier New" panose="02070309020205020404" pitchFamily="49" charset="0"/>
+              </a:endParaRPr>
+            </a:p>
+          </p:txBody>
+        </p:sp>
+        <p:cxnSp>
+          <p:nvCxnSpPr>
+            <p:cNvPr id="9" name="Straight Arrow Connector 8"/>
+            <p:cNvCxnSpPr>
+              <a:stCxn id="8" idx="1"/>
+              <a:endCxn id="7" idx="0"/>
+            </p:cNvCxnSpPr>
+            <p:nvPr/>
+          </p:nvCxnSpPr>
+          <p:spPr>
+            <a:xfrm flipH="1">
+              <a:off x="2915816" y="2188168"/>
+              <a:ext cx="2950119" cy="503185"/>
+            </a:xfrm>
+            <a:prstGeom prst="straightConnector1">
+              <a:avLst/>
+            </a:prstGeom>
+            <a:ln w="19050">
+              <a:solidFill>
+                <a:srgbClr val="C00000"/>
+              </a:solidFill>
+              <a:tailEnd type="stealth" w="lg" len="lg"/>
+            </a:ln>
+          </p:spPr>
+          <p:style>
+            <a:lnRef idx="1">
+              <a:schemeClr val="accent1"/>
+            </a:lnRef>
+            <a:fillRef idx="0">
+              <a:schemeClr val="accent1"/>
+            </a:fillRef>
+            <a:effectRef idx="0">
+              <a:schemeClr val="accent1"/>
+            </a:effectRef>
+            <a:fontRef idx="minor">
+              <a:schemeClr val="tx1"/>
+            </a:fontRef>
+          </p:style>
+        </p:cxnSp>
+      </p:grpSp>
+      <p:sp>
+        <p:nvSpPr>
+          <p:cNvPr id="16" name="TextBox 15"/>
+          <p:cNvSpPr txBox="1"/>
+          <p:nvPr/>
+        </p:nvSpPr>
+        <p:spPr>
+          <a:xfrm>
+            <a:off x="827584" y="5229200"/>
+            <a:ext cx="6120680" cy="830997"/>
+          </a:xfrm>
+          <a:prstGeom prst="rect">
+            <a:avLst/>
+          </a:prstGeom>
+          <a:solidFill>
+            <a:schemeClr val="accent1">
+              <a:lumMod val="40000"/>
+              <a:lumOff val="60000"/>
+            </a:schemeClr>
+          </a:solidFill>
+        </p:spPr>
+        <p:txBody>
+          <a:bodyPr wrap="square" rtlCol="0">
+            <a:spAutoFit/>
+          </a:bodyPr>
+          <a:lstStyle/>
+          <a:p>
+            <a:r>
+              <a:rPr lang="en-US" sz="1600" dirty="0" smtClean="0"/>
+              <a:t>…</a:t>
+            </a:r>
+          </a:p>
+          <a:p>
+            <a:r>
+              <a:rPr lang="en-US" sz="1600" dirty="0" smtClean="0"/>
+              <a:t>IF (x &gt; 10.0) </a:t>
+            </a:r>
+            <a:r>
+              <a:rPr lang="en-US" sz="1600" dirty="0" smtClean="0"/>
+              <a:t> …</a:t>
+            </a:r>
+            <a:endParaRPr lang="en-US" sz="1600" dirty="0"/>
+          </a:p>
+          <a:p>
+            <a:r>
+              <a:rPr lang="en-US" sz="1600" dirty="0" smtClean="0"/>
+              <a:t>…</a:t>
+            </a:r>
+            <a:endParaRPr lang="en-US" sz="1600" dirty="0" smtClean="0"/>
+          </a:p>
+        </p:txBody>
+      </p:sp>
+      <p:sp>
+        <p:nvSpPr>
+          <p:cNvPr id="17" name="TextBox 16"/>
+          <p:cNvSpPr txBox="1"/>
+          <p:nvPr/>
+        </p:nvSpPr>
+        <p:spPr>
+          <a:xfrm>
+            <a:off x="3482350" y="5013176"/>
+            <a:ext cx="3690113" cy="1569660"/>
+          </a:xfrm>
+          <a:prstGeom prst="rect">
+            <a:avLst/>
+          </a:prstGeom>
+          <a:solidFill>
+            <a:schemeClr val="bg1"/>
+          </a:solidFill>
+          <a:ln>
+            <a:solidFill>
+              <a:schemeClr val="tx1"/>
+            </a:solidFill>
+          </a:ln>
+        </p:spPr>
+        <p:txBody>
+          <a:bodyPr wrap="none" rtlCol="0">
+            <a:spAutoFit/>
+          </a:bodyPr>
+          <a:lstStyle/>
+          <a:p>
+            <a:r>
+              <a:rPr lang="en-US" sz="2400" dirty="0" smtClean="0"/>
+              <a:t>Note:</a:t>
+            </a:r>
+            <a:br>
+              <a:rPr lang="en-US" sz="2400" dirty="0" smtClean="0"/>
+            </a:br>
+            <a:r>
+              <a:rPr lang="en-US" sz="2400" dirty="0" smtClean="0"/>
+              <a:t>- one statement, not a block</a:t>
+            </a:r>
+            <a:br>
+              <a:rPr lang="en-US" sz="2400" dirty="0" smtClean="0"/>
+            </a:br>
+            <a:r>
+              <a:rPr lang="en-US" sz="2400" dirty="0" smtClean="0"/>
+              <a:t>- no</a:t>
+            </a:r>
+            <a:r>
+              <a:rPr lang="en-US" sz="2400" dirty="0" smtClean="0">
+                <a:cs typeface="Courier New" panose="02070309020205020404" pitchFamily="49" charset="0"/>
+              </a:rPr>
+              <a:t> </a:t>
+            </a:r>
+            <a:r>
+              <a:rPr lang="en-US" sz="2400" dirty="0" smtClean="0">
+                <a:latin typeface="Courier New" panose="02070309020205020404" pitchFamily="49" charset="0"/>
+                <a:cs typeface="Courier New" panose="02070309020205020404" pitchFamily="49" charset="0"/>
+              </a:rPr>
+              <a:t>ELSE</a:t>
+            </a:r>
+          </a:p>
+          <a:p>
+            <a:r>
+              <a:rPr lang="en-US" sz="2400" dirty="0" smtClean="0">
+                <a:cs typeface="Courier New" panose="02070309020205020404" pitchFamily="49" charset="0"/>
+              </a:rPr>
+              <a:t>- no </a:t>
+            </a:r>
+            <a:r>
+              <a:rPr lang="en-US" sz="2400" dirty="0" smtClean="0">
+                <a:latin typeface="Courier New" panose="02070309020205020404" pitchFamily="49" charset="0"/>
+                <a:cs typeface="Courier New" panose="02070309020205020404" pitchFamily="49" charset="0"/>
+              </a:rPr>
+              <a:t>END IF</a:t>
+            </a:r>
+            <a:endParaRPr lang="nl-BE" sz="2400" dirty="0">
+              <a:latin typeface="Courier New" panose="02070309020205020404" pitchFamily="49" charset="0"/>
+              <a:cs typeface="Courier New" panose="02070309020205020404" pitchFamily="49" charset="0"/>
+            </a:endParaRPr>
+          </a:p>
+        </p:txBody>
+      </p:sp>
+      <p:sp>
+        <p:nvSpPr>
+          <p:cNvPr id="18" name="TextBox 17"/>
+          <p:cNvSpPr txBox="1"/>
+          <p:nvPr/>
+        </p:nvSpPr>
+        <p:spPr>
+          <a:xfrm>
+            <a:off x="6156176" y="3068960"/>
+            <a:ext cx="2335896" cy="646331"/>
+          </a:xfrm>
+          <a:prstGeom prst="rect">
+            <a:avLst/>
+          </a:prstGeom>
+          <a:solidFill>
+            <a:schemeClr val="bg1"/>
+          </a:solidFill>
+          <a:ln>
+            <a:solidFill>
+              <a:schemeClr val="tx1"/>
+            </a:solidFill>
+          </a:ln>
+        </p:spPr>
+        <p:txBody>
+          <a:bodyPr wrap="none" rtlCol="0">
+            <a:spAutoFit/>
+          </a:bodyPr>
+          <a:lstStyle/>
+          <a:p>
+            <a:r>
+              <a:rPr lang="en-US" dirty="0" smtClean="0"/>
+              <a:t>logical operators:</a:t>
+            </a:r>
+          </a:p>
+          <a:p>
+            <a:r>
+              <a:rPr lang="en-US" dirty="0" smtClean="0">
+                <a:latin typeface="Courier New" panose="02070309020205020404" pitchFamily="49" charset="0"/>
+                <a:cs typeface="Courier New" panose="02070309020205020404" pitchFamily="49" charset="0"/>
+              </a:rPr>
+              <a:t>.AND.</a:t>
+            </a:r>
+            <a:r>
+              <a:rPr lang="en-US" dirty="0" smtClean="0"/>
+              <a:t>, </a:t>
+            </a:r>
+            <a:r>
+              <a:rPr lang="en-US" dirty="0" smtClean="0">
+                <a:latin typeface="Courier New" panose="02070309020205020404" pitchFamily="49" charset="0"/>
+                <a:cs typeface="Courier New" panose="02070309020205020404" pitchFamily="49" charset="0"/>
+              </a:rPr>
+              <a:t>.OR.</a:t>
+            </a:r>
+            <a:r>
+              <a:rPr lang="en-US" dirty="0" smtClean="0"/>
+              <a:t>, </a:t>
+            </a:r>
+            <a:r>
+              <a:rPr lang="en-US" dirty="0" smtClean="0">
+                <a:latin typeface="Courier New" panose="02070309020205020404" pitchFamily="49" charset="0"/>
+                <a:cs typeface="Courier New" panose="02070309020205020404" pitchFamily="49" charset="0"/>
+              </a:rPr>
+              <a:t>.NOT.</a:t>
+            </a:r>
+            <a:endParaRPr lang="nl-BE" dirty="0">
+              <a:latin typeface="Courier New" panose="02070309020205020404" pitchFamily="49" charset="0"/>
+              <a:cs typeface="Courier New" panose="02070309020205020404" pitchFamily="49" charset="0"/>
+            </a:endParaRPr>
+          </a:p>
+        </p:txBody>
+      </p:sp>
+      <p:sp>
+        <p:nvSpPr>
+          <p:cNvPr id="19" name="TextBox 18"/>
+          <p:cNvSpPr txBox="1"/>
+          <p:nvPr/>
+        </p:nvSpPr>
+        <p:spPr>
+          <a:xfrm>
+            <a:off x="3203848" y="3861048"/>
+            <a:ext cx="2494594" cy="646331"/>
+          </a:xfrm>
+          <a:prstGeom prst="rect">
+            <a:avLst/>
+          </a:prstGeom>
+          <a:solidFill>
+            <a:schemeClr val="bg1"/>
+          </a:solidFill>
+          <a:ln>
+            <a:solidFill>
+              <a:schemeClr val="tx1"/>
+            </a:solidFill>
+          </a:ln>
+        </p:spPr>
+        <p:txBody>
+          <a:bodyPr wrap="none" rtlCol="0">
+            <a:spAutoFit/>
+          </a:bodyPr>
+          <a:lstStyle/>
+          <a:p>
+            <a:r>
+              <a:rPr lang="en-US" dirty="0" smtClean="0"/>
+              <a:t>logical values:</a:t>
+            </a:r>
+          </a:p>
+          <a:p>
+            <a:r>
+              <a:rPr lang="en-US" dirty="0" smtClean="0">
+                <a:latin typeface="Courier New" panose="02070309020205020404" pitchFamily="49" charset="0"/>
+                <a:cs typeface="Courier New" panose="02070309020205020404" pitchFamily="49" charset="0"/>
+              </a:rPr>
+              <a:t>.TRUE.</a:t>
+            </a:r>
+            <a:r>
+              <a:rPr lang="en-US" dirty="0" smtClean="0"/>
+              <a:t> and </a:t>
+            </a:r>
+            <a:r>
+              <a:rPr lang="en-US" dirty="0" smtClean="0">
+                <a:latin typeface="Courier New" panose="02070309020205020404" pitchFamily="49" charset="0"/>
+                <a:cs typeface="Courier New" panose="02070309020205020404" pitchFamily="49" charset="0"/>
+              </a:rPr>
+              <a:t>.FALSE.</a:t>
+            </a:r>
+            <a:endParaRPr lang="nl-BE" dirty="0">
+              <a:latin typeface="Courier New" panose="02070309020205020404" pitchFamily="49" charset="0"/>
+              <a:cs typeface="Courier New" panose="02070309020205020404" pitchFamily="49" charset="0"/>
+            </a:endParaRPr>
+          </a:p>
+        </p:txBody>
+      </p:sp>
+    </p:spTree>
+    <p:extLst>
+      <p:ext uri="{BB962C8B-B14F-4D97-AF65-F5344CB8AC3E}">
+        <p14:creationId xmlns:p14="http://schemas.microsoft.com/office/powerpoint/2010/main" val="3978578336"/>
+      </p:ext>
+    </p:extLst>
+  </p:cSld>
+  <p:clrMapOvr>
+    <a:masterClrMapping/>
+  </p:clrMapOvr>
+</p:sld>
+</file>
+
+<file path=ppt/slides/slide12.xml><?xml version="1.0" encoding="utf-8"?>
+<p:sld xmlns:a="http://schemas.openxmlformats.org/drawingml/2006/main" xmlns:r="http://schemas.openxmlformats.org/officeDocument/2006/relationships" xmlns:p="http://schemas.openxmlformats.org/presentationml/2006/main">
+  <p:cSld>
+    <p:spTree>
+      <p:nvGrpSpPr>
+        <p:cNvPr id="1" name=""/>
+        <p:cNvGrpSpPr/>
+        <p:nvPr/>
+      </p:nvGrpSpPr>
+      <p:grpSpPr>
+        <a:xfrm>
+          <a:off x="0" y="0"/>
+          <a:ext cx="0" cy="0"/>
+          <a:chOff x="0" y="0"/>
+          <a:chExt cx="0" cy="0"/>
+        </a:xfrm>
+      </p:grpSpPr>
+      <p:sp>
+        <p:nvSpPr>
+          <p:cNvPr id="2" name="Title 1"/>
+          <p:cNvSpPr>
+            <a:spLocks noGrp="1"/>
+          </p:cNvSpPr>
+          <p:nvPr>
+            <p:ph type="title"/>
+          </p:nvPr>
+        </p:nvSpPr>
+        <p:spPr/>
+        <p:txBody>
+          <a:bodyPr/>
+          <a:lstStyle/>
+          <a:p>
+            <a:r>
+              <a:rPr lang="en-US" dirty="0" smtClean="0"/>
+              <a:t>Conditional statements: SELECT</a:t>
+            </a:r>
+            <a:endParaRPr lang="nl-BE" dirty="0"/>
+          </a:p>
+        </p:txBody>
+      </p:sp>
+      <p:sp>
+        <p:nvSpPr>
+          <p:cNvPr id="3" name="Content Placeholder 2"/>
+          <p:cNvSpPr>
+            <a:spLocks noGrp="1"/>
+          </p:cNvSpPr>
+          <p:nvPr>
+            <p:ph idx="1"/>
+          </p:nvPr>
+        </p:nvSpPr>
+        <p:spPr/>
+        <p:txBody>
+          <a:bodyPr/>
+          <a:lstStyle/>
+          <a:p>
+            <a:r>
+              <a:rPr lang="en-US" dirty="0" smtClean="0"/>
+              <a:t>Select case block</a:t>
+            </a:r>
+            <a:endParaRPr lang="nl-BE" dirty="0"/>
+          </a:p>
+        </p:txBody>
+      </p:sp>
+      <p:sp>
+        <p:nvSpPr>
+          <p:cNvPr id="4" name="TextBox 3"/>
+          <p:cNvSpPr txBox="1"/>
+          <p:nvPr/>
+        </p:nvSpPr>
+        <p:spPr>
+          <a:xfrm>
+            <a:off x="827584" y="2314615"/>
+            <a:ext cx="6120680" cy="3046988"/>
+          </a:xfrm>
+          <a:prstGeom prst="rect">
+            <a:avLst/>
+          </a:prstGeom>
+          <a:solidFill>
+            <a:schemeClr val="accent1">
+              <a:lumMod val="40000"/>
+              <a:lumOff val="60000"/>
+            </a:schemeClr>
+          </a:solidFill>
+        </p:spPr>
+        <p:txBody>
+          <a:bodyPr wrap="square" rtlCol="0">
+            <a:spAutoFit/>
+          </a:bodyPr>
+          <a:lstStyle/>
+          <a:p>
+            <a:r>
+              <a:rPr lang="en-US" sz="1600" dirty="0" smtClean="0"/>
+              <a:t>…</a:t>
+            </a:r>
+          </a:p>
+          <a:p>
+            <a:r>
+              <a:rPr lang="en-US" sz="1600" dirty="0" smtClean="0"/>
+              <a:t>CHARACTER(LEN=1) :: operator</a:t>
+            </a:r>
+          </a:p>
+          <a:p>
+            <a:r>
+              <a:rPr lang="en-US" sz="1600" dirty="0" smtClean="0"/>
+              <a:t>…</a:t>
+            </a:r>
+          </a:p>
+          <a:p>
+            <a:r>
+              <a:rPr lang="en-US" sz="1600" dirty="0" smtClean="0"/>
+              <a:t>SELECT CASE </a:t>
+            </a:r>
+            <a:r>
+              <a:rPr lang="en-US" sz="1600" dirty="0"/>
+              <a:t>(</a:t>
+            </a:r>
+            <a:r>
+              <a:rPr lang="en-US" sz="1600" dirty="0" smtClean="0"/>
+              <a:t>operator)</a:t>
+            </a:r>
+            <a:endParaRPr lang="en-US" sz="1600" dirty="0"/>
+          </a:p>
+          <a:p>
+            <a:r>
+              <a:rPr lang="en-US" sz="1600" dirty="0"/>
+              <a:t>    </a:t>
+            </a:r>
+            <a:r>
+              <a:rPr lang="en-US" sz="1600" dirty="0" smtClean="0"/>
+              <a:t>CASE </a:t>
+            </a:r>
+            <a:r>
+              <a:rPr lang="en-US" sz="1600" dirty="0"/>
+              <a:t>('+')</a:t>
+            </a:r>
+          </a:p>
+          <a:p>
+            <a:r>
+              <a:rPr lang="en-US" sz="1600" dirty="0"/>
+              <a:t>        </a:t>
+            </a:r>
+            <a:r>
+              <a:rPr lang="en-US" sz="1600" dirty="0" smtClean="0"/>
+              <a:t>PRINT </a:t>
+            </a:r>
+            <a:r>
+              <a:rPr lang="en-US" sz="1600" dirty="0"/>
+              <a:t>"(I3, A2, I3, ' = ', I6)", a, </a:t>
+            </a:r>
+            <a:r>
+              <a:rPr lang="en-US" sz="1600" dirty="0" smtClean="0"/>
+              <a:t>operator, </a:t>
+            </a:r>
+            <a:r>
+              <a:rPr lang="en-US" sz="1600" dirty="0"/>
+              <a:t>b, a + b</a:t>
+            </a:r>
+          </a:p>
+          <a:p>
+            <a:r>
+              <a:rPr lang="en-US" sz="1600" dirty="0" smtClean="0"/>
+              <a:t>    CASE </a:t>
+            </a:r>
+            <a:r>
+              <a:rPr lang="en-US" sz="1600" dirty="0"/>
+              <a:t>('*')</a:t>
+            </a:r>
+          </a:p>
+          <a:p>
+            <a:r>
+              <a:rPr lang="en-US" sz="1600" dirty="0"/>
+              <a:t>        </a:t>
+            </a:r>
+            <a:r>
+              <a:rPr lang="en-US" sz="1600" dirty="0" smtClean="0"/>
+              <a:t>PRINT </a:t>
+            </a:r>
+            <a:r>
+              <a:rPr lang="en-US" sz="1600" dirty="0"/>
+              <a:t>"(I3, A2, I3, ' = ', I6)", a, </a:t>
+            </a:r>
+            <a:r>
+              <a:rPr lang="en-US" sz="1600" dirty="0" smtClean="0"/>
+              <a:t>operator, </a:t>
+            </a:r>
+            <a:r>
+              <a:rPr lang="en-US" sz="1600" dirty="0"/>
+              <a:t>b, a * b</a:t>
+            </a:r>
+          </a:p>
+          <a:p>
+            <a:r>
+              <a:rPr lang="en-US" sz="1600" dirty="0"/>
+              <a:t>    </a:t>
+            </a:r>
+            <a:r>
+              <a:rPr lang="en-US" sz="1600" dirty="0" smtClean="0"/>
+              <a:t>CASE DEFAULT</a:t>
+            </a:r>
+            <a:endParaRPr lang="en-US" sz="1600" dirty="0"/>
+          </a:p>
+          <a:p>
+            <a:r>
+              <a:rPr lang="en-US" sz="1600" dirty="0"/>
+              <a:t>        </a:t>
+            </a:r>
+            <a:r>
+              <a:rPr lang="en-US" sz="1600" dirty="0" smtClean="0"/>
+              <a:t>PRINT </a:t>
+            </a:r>
+            <a:r>
+              <a:rPr lang="en-US" sz="1600" dirty="0"/>
+              <a:t>"('# error: unknown operand ''', A, '''')", </a:t>
+            </a:r>
+            <a:r>
+              <a:rPr lang="en-US" sz="1600" dirty="0" smtClean="0"/>
+              <a:t>operator</a:t>
+            </a:r>
+            <a:endParaRPr lang="en-US" sz="1600" dirty="0"/>
+          </a:p>
+          <a:p>
+            <a:r>
+              <a:rPr lang="en-US" sz="1600" dirty="0" smtClean="0"/>
+              <a:t>END SELECT</a:t>
+            </a:r>
+          </a:p>
+          <a:p>
+            <a:r>
+              <a:rPr lang="en-US" sz="1600" dirty="0" smtClean="0"/>
+              <a:t>…</a:t>
+            </a:r>
+            <a:endParaRPr lang="en-US" sz="1600" dirty="0"/>
+          </a:p>
+        </p:txBody>
+      </p:sp>
+      <p:grpSp>
+        <p:nvGrpSpPr>
+          <p:cNvPr id="5" name="Group 4"/>
+          <p:cNvGrpSpPr/>
+          <p:nvPr/>
+        </p:nvGrpSpPr>
+        <p:grpSpPr>
+          <a:xfrm>
+            <a:off x="2051720" y="2299395"/>
+            <a:ext cx="4680520" cy="1057597"/>
+            <a:chOff x="2411760" y="1865002"/>
+            <a:chExt cx="4680520" cy="1057597"/>
+          </a:xfrm>
+        </p:grpSpPr>
+        <p:sp>
+          <p:nvSpPr>
+            <p:cNvPr id="6" name="Rounded Rectangle 5"/>
+            <p:cNvSpPr/>
+            <p:nvPr/>
+          </p:nvSpPr>
+          <p:spPr>
+            <a:xfrm>
+              <a:off x="2411760" y="2670571"/>
+              <a:ext cx="792088" cy="252028"/>
+            </a:xfrm>
+            <a:prstGeom prst="roundRect">
+              <a:avLst/>
+            </a:prstGeom>
+            <a:noFill/>
+            <a:ln>
+              <a:solidFill>
+                <a:srgbClr val="C00000"/>
+              </a:solidFill>
+            </a:ln>
+          </p:spPr>
+          <p:style>
+            <a:lnRef idx="2">
+              <a:schemeClr val="accent1">
+                <a:shade val="50000"/>
+              </a:schemeClr>
+            </a:lnRef>
+            <a:fillRef idx="1">
+              <a:schemeClr val="accent1"/>
+            </a:fillRef>
+            <a:effectRef idx="0">
+              <a:schemeClr val="accent1"/>
+            </a:effectRef>
+            <a:fontRef idx="minor">
+              <a:schemeClr val="lt1"/>
+            </a:fontRef>
+          </p:style>
+          <p:txBody>
+            <a:bodyPr rtlCol="0" anchor="ctr"/>
+            <a:lstStyle/>
+            <a:p>
+              <a:pPr algn="ctr"/>
+              <a:endParaRPr lang="nl-BE"/>
+            </a:p>
+          </p:txBody>
+        </p:sp>
+        <p:sp>
+          <p:nvSpPr>
+            <p:cNvPr id="7" name="TextBox 6"/>
+            <p:cNvSpPr txBox="1"/>
+            <p:nvPr/>
+          </p:nvSpPr>
+          <p:spPr>
+            <a:xfrm>
+              <a:off x="4591274" y="1865002"/>
+              <a:ext cx="2501006" cy="646331"/>
+            </a:xfrm>
+            <a:prstGeom prst="rect">
+              <a:avLst/>
+            </a:prstGeom>
+            <a:solidFill>
+              <a:schemeClr val="bg1"/>
+            </a:solidFill>
+            <a:ln>
+              <a:solidFill>
+                <a:srgbClr val="C00000"/>
+              </a:solidFill>
+            </a:ln>
+          </p:spPr>
+          <p:txBody>
+            <a:bodyPr wrap="none" rtlCol="0">
+              <a:spAutoFit/>
+            </a:bodyPr>
+            <a:lstStyle/>
+            <a:p>
+              <a:r>
+                <a:rPr lang="en-US" dirty="0" smtClean="0"/>
+                <a:t>types:</a:t>
+              </a:r>
+              <a:br>
+                <a:rPr lang="en-US" dirty="0" smtClean="0"/>
+              </a:br>
+              <a:r>
+                <a:rPr lang="en-US" dirty="0" smtClean="0">
+                  <a:latin typeface="Courier New" panose="02070309020205020404" pitchFamily="49" charset="0"/>
+                  <a:cs typeface="Courier New" panose="02070309020205020404" pitchFamily="49" charset="0"/>
+                </a:rPr>
+                <a:t>CHARACTER</a:t>
+              </a:r>
+              <a:r>
+                <a:rPr lang="en-US" dirty="0" smtClean="0">
+                  <a:cs typeface="Courier New" panose="02070309020205020404" pitchFamily="49" charset="0"/>
+                </a:rPr>
+                <a:t>, </a:t>
+              </a:r>
+              <a:r>
+                <a:rPr lang="en-US" dirty="0" smtClean="0">
+                  <a:latin typeface="Courier New" panose="02070309020205020404" pitchFamily="49" charset="0"/>
+                  <a:cs typeface="Courier New" panose="02070309020205020404" pitchFamily="49" charset="0"/>
+                </a:rPr>
+                <a:t>INTEGER</a:t>
+              </a:r>
+              <a:endParaRPr lang="nl-BE" dirty="0">
+                <a:latin typeface="Courier New" panose="02070309020205020404" pitchFamily="49" charset="0"/>
+                <a:cs typeface="Courier New" panose="02070309020205020404" pitchFamily="49" charset="0"/>
+              </a:endParaRPr>
+            </a:p>
+          </p:txBody>
+        </p:sp>
+        <p:cxnSp>
+          <p:nvCxnSpPr>
+            <p:cNvPr id="8" name="Straight Arrow Connector 7"/>
+            <p:cNvCxnSpPr>
+              <a:stCxn id="7" idx="1"/>
+              <a:endCxn id="6" idx="0"/>
+            </p:cNvCxnSpPr>
+            <p:nvPr/>
+          </p:nvCxnSpPr>
+          <p:spPr>
+            <a:xfrm flipH="1">
+              <a:off x="2807804" y="2188168"/>
+              <a:ext cx="1783470" cy="482403"/>
+            </a:xfrm>
+            <a:prstGeom prst="straightConnector1">
+              <a:avLst/>
+            </a:prstGeom>
+            <a:ln w="19050">
+              <a:solidFill>
+                <a:srgbClr val="C00000"/>
+              </a:solidFill>
+              <a:tailEnd type="stealth" w="lg" len="lg"/>
+            </a:ln>
+          </p:spPr>
+          <p:style>
+            <a:lnRef idx="1">
+              <a:schemeClr val="accent1"/>
+            </a:lnRef>
+            <a:fillRef idx="0">
+              <a:schemeClr val="accent1"/>
+            </a:fillRef>
+            <a:effectRef idx="0">
+              <a:schemeClr val="accent1"/>
+            </a:effectRef>
+            <a:fontRef idx="minor">
+              <a:schemeClr val="tx1"/>
+            </a:fontRef>
+          </p:style>
+        </p:cxnSp>
+      </p:grpSp>
+      <p:sp>
+        <p:nvSpPr>
+          <p:cNvPr id="15" name="TextBox 14"/>
+          <p:cNvSpPr txBox="1"/>
+          <p:nvPr/>
+        </p:nvSpPr>
+        <p:spPr>
+          <a:xfrm>
+            <a:off x="2447764" y="5085184"/>
+            <a:ext cx="4862741" cy="830997"/>
+          </a:xfrm>
+          <a:prstGeom prst="rect">
+            <a:avLst/>
+          </a:prstGeom>
+          <a:solidFill>
+            <a:schemeClr val="bg1"/>
+          </a:solidFill>
+          <a:ln>
+            <a:solidFill>
+              <a:schemeClr val="tx1"/>
+            </a:solidFill>
+          </a:ln>
+        </p:spPr>
+        <p:txBody>
+          <a:bodyPr wrap="none" rtlCol="0">
+            <a:spAutoFit/>
+          </a:bodyPr>
+          <a:lstStyle/>
+          <a:p>
+            <a:r>
+              <a:rPr lang="en-US" sz="2400" dirty="0" smtClean="0"/>
+              <a:t>Note semantic difference with C/C++:</a:t>
+            </a:r>
+          </a:p>
+          <a:p>
+            <a:r>
+              <a:rPr lang="en-US" sz="2400" dirty="0" smtClean="0"/>
+              <a:t>cases are exclusive, no break needed</a:t>
+            </a:r>
+            <a:endParaRPr lang="nl-BE" sz="2400" dirty="0"/>
+          </a:p>
+        </p:txBody>
+      </p:sp>
+    </p:spTree>
+    <p:extLst>
+      <p:ext uri="{BB962C8B-B14F-4D97-AF65-F5344CB8AC3E}">
+        <p14:creationId xmlns:p14="http://schemas.microsoft.com/office/powerpoint/2010/main" val="2129827619"/>
+      </p:ext>
+    </p:extLst>
+  </p:cSld>
+  <p:clrMapOvr>
+    <a:masterClrMapping/>
+  </p:clrMapOvr>
+</p:sld>
+</file>
+
+<file path=ppt/slides/slide13.xml><?xml version="1.0" encoding="utf-8"?>
+<p:sld xmlns:a="http://schemas.openxmlformats.org/drawingml/2006/main" xmlns:r="http://schemas.openxmlformats.org/officeDocument/2006/relationships" xmlns:p="http://schemas.openxmlformats.org/presentationml/2006/main">
+  <p:cSld>
+    <p:spTree>
+      <p:nvGrpSpPr>
+        <p:cNvPr id="1" name=""/>
+        <p:cNvGrpSpPr/>
+        <p:nvPr/>
+      </p:nvGrpSpPr>
+      <p:grpSpPr>
+        <a:xfrm>
+          <a:off x="0" y="0"/>
+          <a:ext cx="0" cy="0"/>
+          <a:chOff x="0" y="0"/>
+          <a:chExt cx="0" cy="0"/>
+        </a:xfrm>
+      </p:grpSpPr>
+      <p:sp>
+        <p:nvSpPr>
+          <p:cNvPr id="2" name="Title 1"/>
+          <p:cNvSpPr>
+            <a:spLocks noGrp="1"/>
+          </p:cNvSpPr>
+          <p:nvPr>
+            <p:ph type="title"/>
+          </p:nvPr>
+        </p:nvSpPr>
+        <p:spPr/>
+        <p:txBody>
+          <a:bodyPr/>
+          <a:lstStyle/>
+          <a:p>
+            <a:r>
+              <a:rPr lang="en-US" dirty="0" smtClean="0"/>
+              <a:t>Conditional statements: WHERE</a:t>
+            </a:r>
+            <a:endParaRPr lang="nl-BE" dirty="0"/>
+          </a:p>
+        </p:txBody>
+      </p:sp>
+      <p:sp>
+        <p:nvSpPr>
+          <p:cNvPr id="3" name="Content Placeholder 2"/>
+          <p:cNvSpPr>
+            <a:spLocks noGrp="1"/>
+          </p:cNvSpPr>
+          <p:nvPr>
+            <p:ph idx="1"/>
+          </p:nvPr>
+        </p:nvSpPr>
+        <p:spPr/>
+        <p:txBody>
+          <a:bodyPr/>
+          <a:lstStyle/>
+          <a:p>
+            <a:r>
+              <a:rPr lang="en-US" dirty="0" smtClean="0"/>
+              <a:t>Where block, conditions on array elements</a:t>
+            </a:r>
+            <a:endParaRPr lang="nl-BE" dirty="0"/>
+          </a:p>
+        </p:txBody>
+      </p:sp>
+      <p:sp>
+        <p:nvSpPr>
+          <p:cNvPr id="4" name="TextBox 3"/>
+          <p:cNvSpPr txBox="1"/>
+          <p:nvPr/>
+        </p:nvSpPr>
+        <p:spPr>
+          <a:xfrm>
+            <a:off x="827584" y="2314615"/>
+            <a:ext cx="6120680" cy="3293209"/>
+          </a:xfrm>
+          <a:prstGeom prst="rect">
+            <a:avLst/>
+          </a:prstGeom>
+          <a:solidFill>
+            <a:schemeClr val="accent1">
+              <a:lumMod val="40000"/>
+              <a:lumOff val="60000"/>
+            </a:schemeClr>
+          </a:solidFill>
+        </p:spPr>
+        <p:txBody>
+          <a:bodyPr wrap="square" rtlCol="0">
+            <a:spAutoFit/>
+          </a:bodyPr>
+          <a:lstStyle/>
+          <a:p>
+            <a:r>
+              <a:rPr lang="en-US" sz="1600" dirty="0" smtClean="0"/>
+              <a:t>…</a:t>
+            </a:r>
+          </a:p>
+          <a:p>
+            <a:r>
+              <a:rPr lang="en-US" sz="1600" dirty="0" smtClean="0"/>
+              <a:t>REAL(KIND=</a:t>
+            </a:r>
+            <a:r>
+              <a:rPr lang="en-US" sz="1600" dirty="0" err="1" smtClean="0"/>
+              <a:t>sp</a:t>
+            </a:r>
+            <a:r>
+              <a:rPr lang="en-US" sz="1600" dirty="0" smtClean="0"/>
+              <a:t>), DIMENSION(m, n) :: A</a:t>
+            </a:r>
+            <a:br>
+              <a:rPr lang="en-US" sz="1600" dirty="0" smtClean="0"/>
+            </a:br>
+            <a:r>
+              <a:rPr lang="en-US" sz="1600" dirty="0" smtClean="0"/>
+              <a:t>LOGICAL, DIMENSION(m, n) :: </a:t>
+            </a:r>
+            <a:r>
+              <a:rPr lang="en-US" sz="1600" dirty="0" err="1" smtClean="0"/>
+              <a:t>pos</a:t>
+            </a:r>
+            <a:r>
+              <a:rPr lang="en-US" sz="1600" dirty="0" smtClean="0"/>
+              <a:t>, </a:t>
+            </a:r>
+            <a:r>
+              <a:rPr lang="en-US" sz="1600" dirty="0" err="1" smtClean="0"/>
+              <a:t>neg</a:t>
+            </a:r>
+            <a:endParaRPr lang="en-US" sz="1600" dirty="0" smtClean="0"/>
+          </a:p>
+          <a:p>
+            <a:r>
+              <a:rPr lang="en-US" sz="1600" dirty="0" smtClean="0"/>
+              <a:t>…</a:t>
+            </a:r>
+          </a:p>
+          <a:p>
+            <a:r>
+              <a:rPr lang="en-US" sz="1600" dirty="0" err="1" smtClean="0"/>
+              <a:t>pos</a:t>
+            </a:r>
+            <a:r>
+              <a:rPr lang="en-US" sz="1600" dirty="0" smtClean="0"/>
+              <a:t> = .FALSE.</a:t>
+            </a:r>
+          </a:p>
+          <a:p>
+            <a:r>
+              <a:rPr lang="en-US" sz="1600" dirty="0" err="1" smtClean="0"/>
+              <a:t>neg</a:t>
+            </a:r>
+            <a:r>
+              <a:rPr lang="en-US" sz="1600" dirty="0" smtClean="0"/>
+              <a:t> = .FALSE.</a:t>
+            </a:r>
+          </a:p>
+          <a:p>
+            <a:r>
+              <a:rPr lang="en-US" sz="1600" dirty="0" smtClean="0"/>
+              <a:t>WHERE (A &lt; 0.0_sp)</a:t>
+            </a:r>
+          </a:p>
+          <a:p>
+            <a:r>
+              <a:rPr lang="en-US" sz="1600" dirty="0"/>
+              <a:t> </a:t>
+            </a:r>
+            <a:r>
+              <a:rPr lang="en-US" sz="1600" dirty="0" smtClean="0"/>
+              <a:t>   A = 0.0_sp</a:t>
+            </a:r>
+          </a:p>
+          <a:p>
+            <a:r>
+              <a:rPr lang="en-US" sz="1600" dirty="0"/>
+              <a:t> </a:t>
+            </a:r>
+            <a:r>
+              <a:rPr lang="en-US" sz="1600" dirty="0" smtClean="0"/>
+              <a:t>   </a:t>
+            </a:r>
+            <a:r>
+              <a:rPr lang="en-US" sz="1600" dirty="0" err="1" smtClean="0"/>
+              <a:t>neg</a:t>
+            </a:r>
+            <a:r>
+              <a:rPr lang="en-US" sz="1600" dirty="0" smtClean="0"/>
+              <a:t> = .TRUE.</a:t>
+            </a:r>
+            <a:endParaRPr lang="en-US" sz="1600" dirty="0"/>
+          </a:p>
+          <a:p>
+            <a:r>
+              <a:rPr lang="en-US" sz="1600" dirty="0" smtClean="0"/>
+              <a:t>ELSEWHERE (A &gt;= 0.0_sp)</a:t>
+            </a:r>
+          </a:p>
+          <a:p>
+            <a:r>
+              <a:rPr lang="en-US" sz="1600" dirty="0" smtClean="0"/>
+              <a:t>    </a:t>
+            </a:r>
+            <a:r>
+              <a:rPr lang="en-US" sz="1600" dirty="0" err="1" smtClean="0"/>
+              <a:t>pos</a:t>
+            </a:r>
+            <a:r>
+              <a:rPr lang="en-US" sz="1600" dirty="0" smtClean="0"/>
+              <a:t> = .TRUE.</a:t>
+            </a:r>
+            <a:endParaRPr lang="en-US" sz="1600" dirty="0" smtClean="0"/>
+          </a:p>
+          <a:p>
+            <a:r>
+              <a:rPr lang="en-US" sz="1600" dirty="0" smtClean="0"/>
+              <a:t>END WHERE</a:t>
+            </a:r>
+          </a:p>
+          <a:p>
+            <a:r>
+              <a:rPr lang="en-US" sz="1600" dirty="0" smtClean="0"/>
+              <a:t>…</a:t>
+            </a:r>
+            <a:endParaRPr lang="en-US" sz="1600" dirty="0" smtClean="0"/>
+          </a:p>
+        </p:txBody>
+      </p:sp>
+    </p:spTree>
+    <p:extLst>
+      <p:ext uri="{BB962C8B-B14F-4D97-AF65-F5344CB8AC3E}">
+        <p14:creationId xmlns:p14="http://schemas.microsoft.com/office/powerpoint/2010/main" val="212837779"/>
+      </p:ext>
+    </p:extLst>
+  </p:cSld>
+  <p:clrMapOvr>
+    <a:masterClrMapping/>
+  </p:clrMapOvr>
+</p:sld>
+</file>
+
+<file path=ppt/slides/slide14.xml><?xml version="1.0" encoding="utf-8"?>
+<p:sld xmlns:a="http://schemas.openxmlformats.org/drawingml/2006/main" xmlns:r="http://schemas.openxmlformats.org/officeDocument/2006/relationships" xmlns:p="http://schemas.openxmlformats.org/presentationml/2006/main">
+  <p:cSld>
+    <p:spTree>
+      <p:nvGrpSpPr>
+        <p:cNvPr id="1" name=""/>
+        <p:cNvGrpSpPr/>
+        <p:nvPr/>
+      </p:nvGrpSpPr>
+      <p:grpSpPr>
+        <a:xfrm>
+          <a:off x="0" y="0"/>
+          <a:ext cx="0" cy="0"/>
+          <a:chOff x="0" y="0"/>
+          <a:chExt cx="0" cy="0"/>
+        </a:xfrm>
+      </p:grpSpPr>
+      <p:sp>
+        <p:nvSpPr>
+          <p:cNvPr id="2" name="Title 1"/>
+          <p:cNvSpPr>
+            <a:spLocks noGrp="1"/>
+          </p:cNvSpPr>
+          <p:nvPr>
+            <p:ph type="title"/>
+          </p:nvPr>
+        </p:nvSpPr>
+        <p:spPr/>
+        <p:txBody>
+          <a:bodyPr/>
+          <a:lstStyle/>
+          <a:p>
+            <a:r>
+              <a:rPr lang="en-US" dirty="0" smtClean="0"/>
+              <a:t>Iteration statements: DO</a:t>
+            </a:r>
+            <a:endParaRPr lang="nl-BE" dirty="0"/>
+          </a:p>
+        </p:txBody>
+      </p:sp>
+      <p:sp>
+        <p:nvSpPr>
+          <p:cNvPr id="3" name="Content Placeholder 2"/>
+          <p:cNvSpPr>
+            <a:spLocks noGrp="1"/>
+          </p:cNvSpPr>
+          <p:nvPr>
+            <p:ph idx="1"/>
+          </p:nvPr>
+        </p:nvSpPr>
+        <p:spPr/>
+        <p:txBody>
+          <a:bodyPr/>
+          <a:lstStyle/>
+          <a:p>
+            <a:r>
+              <a:rPr lang="en-US" dirty="0" smtClean="0"/>
+              <a:t>Do block</a:t>
+            </a:r>
+            <a:endParaRPr lang="nl-BE" dirty="0"/>
+          </a:p>
+        </p:txBody>
+      </p:sp>
+      <p:sp>
+        <p:nvSpPr>
+          <p:cNvPr id="4" name="TextBox 3"/>
+          <p:cNvSpPr txBox="1"/>
+          <p:nvPr/>
+        </p:nvSpPr>
+        <p:spPr>
+          <a:xfrm>
+            <a:off x="827584" y="2314615"/>
+            <a:ext cx="6120680" cy="3293209"/>
+          </a:xfrm>
+          <a:prstGeom prst="rect">
+            <a:avLst/>
+          </a:prstGeom>
+          <a:solidFill>
+            <a:schemeClr val="accent1">
+              <a:lumMod val="40000"/>
+              <a:lumOff val="60000"/>
+            </a:schemeClr>
+          </a:solidFill>
+        </p:spPr>
+        <p:txBody>
+          <a:bodyPr wrap="square" rtlCol="0">
+            <a:spAutoFit/>
+          </a:bodyPr>
+          <a:lstStyle/>
+          <a:p>
+            <a:r>
+              <a:rPr lang="en-US" sz="1600" dirty="0" smtClean="0"/>
+              <a:t>…</a:t>
+            </a:r>
+          </a:p>
+          <a:p>
+            <a:r>
+              <a:rPr lang="en-US" sz="1600" dirty="0" smtClean="0"/>
+              <a:t>INTEGER :: </a:t>
+            </a:r>
+            <a:r>
+              <a:rPr lang="en-US" sz="1600" dirty="0" err="1" smtClean="0"/>
+              <a:t>i</a:t>
+            </a:r>
+            <a:r>
+              <a:rPr lang="en-US" sz="1600" dirty="0" smtClean="0"/>
+              <a:t>, initial, final, step</a:t>
+            </a:r>
+          </a:p>
+          <a:p>
+            <a:r>
+              <a:rPr lang="en-US" sz="1600" dirty="0" smtClean="0"/>
+              <a:t>…</a:t>
+            </a:r>
+          </a:p>
+          <a:p>
+            <a:r>
+              <a:rPr lang="en-US" sz="1600" dirty="0" smtClean="0"/>
+              <a:t>DO </a:t>
+            </a:r>
+            <a:r>
+              <a:rPr lang="en-US" sz="1600" dirty="0" err="1" smtClean="0"/>
+              <a:t>i</a:t>
+            </a:r>
+            <a:r>
+              <a:rPr lang="en-US" sz="1600" dirty="0" smtClean="0"/>
+              <a:t> = 1, 10</a:t>
+            </a:r>
+          </a:p>
+          <a:p>
+            <a:r>
+              <a:rPr lang="en-US" sz="1600" dirty="0"/>
+              <a:t> </a:t>
+            </a:r>
+            <a:r>
+              <a:rPr lang="en-US" sz="1600" dirty="0" smtClean="0"/>
+              <a:t>   …</a:t>
+            </a:r>
+          </a:p>
+          <a:p>
+            <a:r>
+              <a:rPr lang="en-US" sz="1600" dirty="0" smtClean="0"/>
+              <a:t>END DO</a:t>
+            </a:r>
+          </a:p>
+          <a:p>
+            <a:r>
+              <a:rPr lang="en-US" sz="1600" dirty="0" smtClean="0"/>
+              <a:t>…</a:t>
+            </a:r>
+          </a:p>
+          <a:p>
+            <a:r>
+              <a:rPr lang="en-US" sz="1600" dirty="0" smtClean="0"/>
+              <a:t>PRINT *, </a:t>
+            </a:r>
+            <a:r>
+              <a:rPr lang="en-US" sz="1600" dirty="0" err="1" smtClean="0"/>
+              <a:t>i</a:t>
+            </a:r>
+            <a:endParaRPr lang="en-US" sz="1600" dirty="0"/>
+          </a:p>
+          <a:p>
+            <a:r>
+              <a:rPr lang="en-US" sz="1600" dirty="0" smtClean="0"/>
+              <a:t>…</a:t>
+            </a:r>
+          </a:p>
+          <a:p>
+            <a:r>
+              <a:rPr lang="en-US" sz="1600" dirty="0" smtClean="0"/>
+              <a:t>DO </a:t>
+            </a:r>
+            <a:r>
+              <a:rPr lang="en-US" sz="1600" dirty="0" err="1" smtClean="0"/>
+              <a:t>i</a:t>
+            </a:r>
+            <a:r>
+              <a:rPr lang="en-US" sz="1600" dirty="0" smtClean="0"/>
+              <a:t> = initial, final, step</a:t>
+            </a:r>
+          </a:p>
+          <a:p>
+            <a:r>
+              <a:rPr lang="en-US" sz="1600" dirty="0"/>
+              <a:t> </a:t>
+            </a:r>
+            <a:r>
+              <a:rPr lang="en-US" sz="1600" dirty="0" smtClean="0"/>
+              <a:t>   …</a:t>
+            </a:r>
+          </a:p>
+          <a:p>
+            <a:r>
+              <a:rPr lang="en-US" sz="1600" dirty="0" smtClean="0"/>
+              <a:t>END DO</a:t>
+            </a:r>
+          </a:p>
+          <a:p>
+            <a:r>
+              <a:rPr lang="en-US" sz="1600" dirty="0" smtClean="0"/>
+              <a:t>…</a:t>
+            </a:r>
+            <a:endParaRPr lang="en-US" sz="1600" dirty="0"/>
+          </a:p>
+        </p:txBody>
+      </p:sp>
+      <p:grpSp>
+        <p:nvGrpSpPr>
+          <p:cNvPr id="5" name="Group 4"/>
+          <p:cNvGrpSpPr/>
+          <p:nvPr/>
+        </p:nvGrpSpPr>
+        <p:grpSpPr>
+          <a:xfrm>
+            <a:off x="1187624" y="3068960"/>
+            <a:ext cx="3626443" cy="936104"/>
+            <a:chOff x="4283968" y="2276872"/>
+            <a:chExt cx="3626443" cy="936104"/>
+          </a:xfrm>
+        </p:grpSpPr>
+        <p:sp>
+          <p:nvSpPr>
+            <p:cNvPr id="6" name="Rounded Rectangle 5"/>
+            <p:cNvSpPr/>
+            <p:nvPr/>
+          </p:nvSpPr>
+          <p:spPr>
+            <a:xfrm>
+              <a:off x="4283968" y="2276872"/>
+              <a:ext cx="144016" cy="360040"/>
+            </a:xfrm>
+            <a:prstGeom prst="roundRect">
+              <a:avLst/>
+            </a:prstGeom>
+            <a:noFill/>
+            <a:ln>
+              <a:solidFill>
+                <a:srgbClr val="C00000"/>
+              </a:solidFill>
+            </a:ln>
+          </p:spPr>
+          <p:style>
+            <a:lnRef idx="2">
+              <a:schemeClr val="accent1">
+                <a:shade val="50000"/>
+              </a:schemeClr>
+            </a:lnRef>
+            <a:fillRef idx="1">
+              <a:schemeClr val="accent1"/>
+            </a:fillRef>
+            <a:effectRef idx="0">
+              <a:schemeClr val="accent1"/>
+            </a:effectRef>
+            <a:fontRef idx="minor">
+              <a:schemeClr val="lt1"/>
+            </a:fontRef>
+          </p:style>
+          <p:txBody>
+            <a:bodyPr rtlCol="0" anchor="ctr"/>
+            <a:lstStyle/>
+            <a:p>
+              <a:pPr algn="ctr"/>
+              <a:endParaRPr lang="nl-BE"/>
+            </a:p>
+          </p:txBody>
+        </p:sp>
+        <p:sp>
+          <p:nvSpPr>
+            <p:cNvPr id="7" name="TextBox 6"/>
+            <p:cNvSpPr txBox="1"/>
+            <p:nvPr/>
+          </p:nvSpPr>
+          <p:spPr>
+            <a:xfrm>
+              <a:off x="5476090" y="2843644"/>
+              <a:ext cx="2434321" cy="369332"/>
+            </a:xfrm>
+            <a:prstGeom prst="rect">
+              <a:avLst/>
+            </a:prstGeom>
+            <a:solidFill>
+              <a:schemeClr val="bg1"/>
+            </a:solidFill>
+            <a:ln>
+              <a:solidFill>
+                <a:srgbClr val="C00000"/>
+              </a:solidFill>
+            </a:ln>
+          </p:spPr>
+          <p:txBody>
+            <a:bodyPr wrap="none" rtlCol="0">
+              <a:spAutoFit/>
+            </a:bodyPr>
+            <a:lstStyle/>
+            <a:p>
+              <a:r>
+                <a:rPr lang="en-US" dirty="0" smtClean="0">
+                  <a:solidFill>
+                    <a:srgbClr val="C00000"/>
+                  </a:solidFill>
+                </a:rPr>
+                <a:t>type must be </a:t>
+              </a:r>
+              <a:r>
+                <a:rPr lang="en-US" dirty="0" smtClean="0">
+                  <a:solidFill>
+                    <a:srgbClr val="C00000"/>
+                  </a:solidFill>
+                  <a:latin typeface="Courier New" panose="02070309020205020404" pitchFamily="49" charset="0"/>
+                  <a:cs typeface="Courier New" panose="02070309020205020404" pitchFamily="49" charset="0"/>
+                </a:rPr>
+                <a:t>INTEGER</a:t>
+              </a:r>
+              <a:endParaRPr lang="nl-BE" dirty="0">
+                <a:solidFill>
+                  <a:srgbClr val="C00000"/>
+                </a:solidFill>
+                <a:latin typeface="Courier New" panose="02070309020205020404" pitchFamily="49" charset="0"/>
+                <a:cs typeface="Courier New" panose="02070309020205020404" pitchFamily="49" charset="0"/>
+              </a:endParaRPr>
+            </a:p>
+          </p:txBody>
+        </p:sp>
+        <p:cxnSp>
+          <p:nvCxnSpPr>
+            <p:cNvPr id="8" name="Straight Arrow Connector 7"/>
+            <p:cNvCxnSpPr>
+              <a:stCxn id="7" idx="1"/>
+              <a:endCxn id="6" idx="2"/>
+            </p:cNvCxnSpPr>
+            <p:nvPr/>
+          </p:nvCxnSpPr>
+          <p:spPr>
+            <a:xfrm flipH="1" flipV="1">
+              <a:off x="4355976" y="2636912"/>
+              <a:ext cx="1120114" cy="391398"/>
+            </a:xfrm>
+            <a:prstGeom prst="straightConnector1">
+              <a:avLst/>
+            </a:prstGeom>
+            <a:ln w="19050">
+              <a:solidFill>
+                <a:srgbClr val="C00000"/>
+              </a:solidFill>
+              <a:tailEnd type="stealth" w="lg" len="lg"/>
+            </a:ln>
+          </p:spPr>
+          <p:style>
+            <a:lnRef idx="1">
+              <a:schemeClr val="accent1"/>
+            </a:lnRef>
+            <a:fillRef idx="0">
+              <a:schemeClr val="accent1"/>
+            </a:fillRef>
+            <a:effectRef idx="0">
+              <a:schemeClr val="accent1"/>
+            </a:effectRef>
+            <a:fontRef idx="minor">
+              <a:schemeClr val="tx1"/>
+            </a:fontRef>
+          </p:style>
+        </p:cxnSp>
+      </p:grpSp>
+      <p:grpSp>
+        <p:nvGrpSpPr>
+          <p:cNvPr id="20" name="Group 19"/>
+          <p:cNvGrpSpPr/>
+          <p:nvPr/>
+        </p:nvGrpSpPr>
+        <p:grpSpPr>
+          <a:xfrm>
+            <a:off x="1619672" y="4005064"/>
+            <a:ext cx="3916212" cy="873388"/>
+            <a:chOff x="4283968" y="2276872"/>
+            <a:chExt cx="3916212" cy="873388"/>
+          </a:xfrm>
+        </p:grpSpPr>
+        <p:sp>
+          <p:nvSpPr>
+            <p:cNvPr id="21" name="Rounded Rectangle 20"/>
+            <p:cNvSpPr/>
+            <p:nvPr/>
+          </p:nvSpPr>
+          <p:spPr>
+            <a:xfrm>
+              <a:off x="4283968" y="2276872"/>
+              <a:ext cx="144016" cy="360040"/>
+            </a:xfrm>
+            <a:prstGeom prst="roundRect">
+              <a:avLst/>
+            </a:prstGeom>
+            <a:noFill/>
+            <a:ln>
+              <a:solidFill>
+                <a:srgbClr val="C00000"/>
+              </a:solidFill>
+            </a:ln>
+          </p:spPr>
+          <p:style>
+            <a:lnRef idx="2">
+              <a:schemeClr val="accent1">
+                <a:shade val="50000"/>
+              </a:schemeClr>
+            </a:lnRef>
+            <a:fillRef idx="1">
+              <a:schemeClr val="accent1"/>
+            </a:fillRef>
+            <a:effectRef idx="0">
+              <a:schemeClr val="accent1"/>
+            </a:effectRef>
+            <a:fontRef idx="minor">
+              <a:schemeClr val="lt1"/>
+            </a:fontRef>
+          </p:style>
+          <p:txBody>
+            <a:bodyPr rtlCol="0" anchor="ctr"/>
+            <a:lstStyle/>
+            <a:p>
+              <a:pPr algn="ctr"/>
+              <a:endParaRPr lang="nl-BE"/>
+            </a:p>
+          </p:txBody>
+        </p:sp>
+        <p:sp>
+          <p:nvSpPr>
+            <p:cNvPr id="22" name="TextBox 21"/>
+            <p:cNvSpPr txBox="1"/>
+            <p:nvPr/>
+          </p:nvSpPr>
+          <p:spPr>
+            <a:xfrm>
+              <a:off x="6124162" y="2780928"/>
+              <a:ext cx="2076018" cy="369332"/>
+            </a:xfrm>
+            <a:prstGeom prst="rect">
+              <a:avLst/>
+            </a:prstGeom>
+            <a:solidFill>
+              <a:schemeClr val="bg1"/>
+            </a:solidFill>
+            <a:ln>
+              <a:solidFill>
+                <a:srgbClr val="C00000"/>
+              </a:solidFill>
+            </a:ln>
+          </p:spPr>
+          <p:txBody>
+            <a:bodyPr wrap="none" rtlCol="0">
+              <a:spAutoFit/>
+            </a:bodyPr>
+            <a:lstStyle/>
+            <a:p>
+              <a:r>
+                <a:rPr lang="en-US" dirty="0">
+                  <a:solidFill>
+                    <a:srgbClr val="C00000"/>
+                  </a:solidFill>
+                </a:rPr>
+                <a:t>value of </a:t>
+              </a:r>
+              <a:r>
+                <a:rPr lang="en-US" dirty="0" err="1" smtClean="0">
+                  <a:solidFill>
+                    <a:srgbClr val="C00000"/>
+                  </a:solidFill>
+                  <a:latin typeface="Courier New" panose="02070309020205020404" pitchFamily="49" charset="0"/>
+                  <a:cs typeface="Courier New" panose="02070309020205020404" pitchFamily="49" charset="0"/>
+                </a:rPr>
+                <a:t>i</a:t>
+              </a:r>
+              <a:r>
+                <a:rPr lang="en-US" dirty="0" smtClean="0">
+                  <a:solidFill>
+                    <a:srgbClr val="C00000"/>
+                  </a:solidFill>
+                </a:rPr>
+                <a:t> </a:t>
+              </a:r>
+              <a:r>
+                <a:rPr lang="en-US" dirty="0">
+                  <a:solidFill>
+                    <a:srgbClr val="C00000"/>
+                  </a:solidFill>
+                </a:rPr>
+                <a:t>will be 11</a:t>
+              </a:r>
+              <a:endParaRPr lang="nl-BE" dirty="0">
+                <a:solidFill>
+                  <a:srgbClr val="C00000"/>
+                </a:solidFill>
+                <a:latin typeface="Courier New" panose="02070309020205020404" pitchFamily="49" charset="0"/>
+                <a:cs typeface="Courier New" panose="02070309020205020404" pitchFamily="49" charset="0"/>
+              </a:endParaRPr>
+            </a:p>
+          </p:txBody>
+        </p:sp>
+        <p:cxnSp>
+          <p:nvCxnSpPr>
+            <p:cNvPr id="23" name="Straight Arrow Connector 22"/>
+            <p:cNvCxnSpPr>
+              <a:stCxn id="22" idx="1"/>
+              <a:endCxn id="21" idx="2"/>
+            </p:cNvCxnSpPr>
+            <p:nvPr/>
+          </p:nvCxnSpPr>
+          <p:spPr>
+            <a:xfrm flipH="1" flipV="1">
+              <a:off x="4355976" y="2636912"/>
+              <a:ext cx="1768186" cy="328682"/>
+            </a:xfrm>
+            <a:prstGeom prst="straightConnector1">
+              <a:avLst/>
+            </a:prstGeom>
+            <a:ln w="19050">
+              <a:solidFill>
+                <a:srgbClr val="C00000"/>
+              </a:solidFill>
+              <a:tailEnd type="stealth" w="lg" len="lg"/>
+            </a:ln>
+          </p:spPr>
+          <p:style>
+            <a:lnRef idx="1">
+              <a:schemeClr val="accent1"/>
+            </a:lnRef>
+            <a:fillRef idx="0">
+              <a:schemeClr val="accent1"/>
+            </a:fillRef>
+            <a:effectRef idx="0">
+              <a:schemeClr val="accent1"/>
+            </a:effectRef>
+            <a:fontRef idx="minor">
+              <a:schemeClr val="tx1"/>
+            </a:fontRef>
+          </p:style>
+        </p:cxnSp>
+      </p:grpSp>
+    </p:spTree>
+    <p:extLst>
+      <p:ext uri="{BB962C8B-B14F-4D97-AF65-F5344CB8AC3E}">
+        <p14:creationId xmlns:p14="http://schemas.microsoft.com/office/powerpoint/2010/main" val="3150856713"/>
+      </p:ext>
+    </p:extLst>
+  </p:cSld>
+  <p:clrMapOvr>
+    <a:masterClrMapping/>
+  </p:clrMapOvr>
+</p:sld>
+</file>
+
+<file path=ppt/slides/slide15.xml><?xml version="1.0" encoding="utf-8"?>
+<p:sld xmlns:a="http://schemas.openxmlformats.org/drawingml/2006/main" xmlns:r="http://schemas.openxmlformats.org/officeDocument/2006/relationships" xmlns:p="http://schemas.openxmlformats.org/presentationml/2006/main">
+  <p:cSld>
+    <p:spTree>
+      <p:nvGrpSpPr>
+        <p:cNvPr id="1" name=""/>
+        <p:cNvGrpSpPr/>
+        <p:nvPr/>
+      </p:nvGrpSpPr>
+      <p:grpSpPr>
+        <a:xfrm>
+          <a:off x="0" y="0"/>
+          <a:ext cx="0" cy="0"/>
+          <a:chOff x="0" y="0"/>
+          <a:chExt cx="0" cy="0"/>
+        </a:xfrm>
+      </p:grpSpPr>
+      <p:sp>
+        <p:nvSpPr>
+          <p:cNvPr id="2" name="Title 1"/>
+          <p:cNvSpPr>
+            <a:spLocks noGrp="1"/>
+          </p:cNvSpPr>
+          <p:nvPr>
+            <p:ph type="title"/>
+          </p:nvPr>
+        </p:nvSpPr>
+        <p:spPr/>
+        <p:txBody>
+          <a:bodyPr/>
+          <a:lstStyle/>
+          <a:p>
+            <a:r>
+              <a:rPr lang="en-US" dirty="0" smtClean="0"/>
+              <a:t>Iterations statements: DO WHILE</a:t>
+            </a:r>
+            <a:endParaRPr lang="nl-BE" dirty="0"/>
+          </a:p>
+        </p:txBody>
+      </p:sp>
+      <p:sp>
+        <p:nvSpPr>
+          <p:cNvPr id="3" name="Content Placeholder 2"/>
+          <p:cNvSpPr>
+            <a:spLocks noGrp="1"/>
+          </p:cNvSpPr>
+          <p:nvPr>
+            <p:ph idx="1"/>
+          </p:nvPr>
+        </p:nvSpPr>
+        <p:spPr/>
+        <p:txBody>
+          <a:bodyPr/>
+          <a:lstStyle/>
+          <a:p>
+            <a:r>
+              <a:rPr lang="en-US" dirty="0" smtClean="0"/>
+              <a:t>DO WHILE block statement</a:t>
+            </a:r>
+            <a:endParaRPr lang="nl-BE" dirty="0"/>
+          </a:p>
+        </p:txBody>
+      </p:sp>
+      <p:sp>
+        <p:nvSpPr>
+          <p:cNvPr id="4" name="TextBox 3"/>
+          <p:cNvSpPr txBox="1"/>
+          <p:nvPr/>
+        </p:nvSpPr>
+        <p:spPr>
+          <a:xfrm>
+            <a:off x="827584" y="2314615"/>
+            <a:ext cx="6120680" cy="2308324"/>
+          </a:xfrm>
+          <a:prstGeom prst="rect">
+            <a:avLst/>
+          </a:prstGeom>
+          <a:solidFill>
+            <a:schemeClr val="accent1">
+              <a:lumMod val="40000"/>
+              <a:lumOff val="60000"/>
+            </a:schemeClr>
+          </a:solidFill>
+        </p:spPr>
+        <p:txBody>
+          <a:bodyPr wrap="square" rtlCol="0">
+            <a:spAutoFit/>
+          </a:bodyPr>
+          <a:lstStyle/>
+          <a:p>
+            <a:r>
+              <a:rPr lang="en-US" sz="1600" dirty="0" smtClean="0"/>
+              <a:t>…</a:t>
+            </a:r>
+          </a:p>
+          <a:p>
+            <a:r>
+              <a:rPr lang="en-US" sz="1600" dirty="0" smtClean="0"/>
+              <a:t>REAL :: x</a:t>
+            </a:r>
+          </a:p>
+          <a:p>
+            <a:r>
+              <a:rPr lang="en-US" sz="1600" dirty="0" smtClean="0"/>
+              <a:t>…</a:t>
+            </a:r>
+          </a:p>
+          <a:p>
+            <a:r>
+              <a:rPr lang="en-US" sz="1600" dirty="0" smtClean="0"/>
+              <a:t>x = 5.0</a:t>
+            </a:r>
+          </a:p>
+          <a:p>
+            <a:r>
+              <a:rPr lang="en-US" sz="1600" dirty="0" smtClean="0"/>
+              <a:t>DO WHILE (x &gt; 0.0)</a:t>
+            </a:r>
+          </a:p>
+          <a:p>
+            <a:r>
+              <a:rPr lang="en-US" sz="1600" dirty="0" smtClean="0"/>
+              <a:t>    …</a:t>
+            </a:r>
+          </a:p>
+          <a:p>
+            <a:r>
+              <a:rPr lang="en-US" sz="1600" dirty="0"/>
+              <a:t> </a:t>
+            </a:r>
+            <a:r>
+              <a:rPr lang="en-US" sz="1600" dirty="0" smtClean="0"/>
+              <a:t>   x = x - 0.r</a:t>
+            </a:r>
+          </a:p>
+          <a:p>
+            <a:r>
+              <a:rPr lang="en-US" sz="1600" dirty="0" smtClean="0"/>
+              <a:t>END DO</a:t>
+            </a:r>
+          </a:p>
+          <a:p>
+            <a:r>
+              <a:rPr lang="en-US" sz="1600" dirty="0" smtClean="0"/>
+              <a:t>…</a:t>
+            </a:r>
+            <a:endParaRPr lang="en-US" sz="1600" dirty="0"/>
+          </a:p>
+        </p:txBody>
+      </p:sp>
+    </p:spTree>
+    <p:extLst>
+      <p:ext uri="{BB962C8B-B14F-4D97-AF65-F5344CB8AC3E}">
+        <p14:creationId xmlns:p14="http://schemas.microsoft.com/office/powerpoint/2010/main" val="352370349"/>
+      </p:ext>
+    </p:extLst>
+  </p:cSld>
+  <p:clrMapOvr>
+    <a:masterClrMapping/>
+  </p:clrMapOvr>
+</p:sld>
+</file>
+
+<file path=ppt/slides/slide16.xml><?xml version="1.0" encoding="utf-8"?>
+<p:sld xmlns:a="http://schemas.openxmlformats.org/drawingml/2006/main" xmlns:r="http://schemas.openxmlformats.org/officeDocument/2006/relationships" xmlns:p="http://schemas.openxmlformats.org/presentationml/2006/main">
+  <p:cSld>
+    <p:spTree>
+      <p:nvGrpSpPr>
+        <p:cNvPr id="1" name=""/>
+        <p:cNvGrpSpPr/>
+        <p:nvPr/>
+      </p:nvGrpSpPr>
+      <p:grpSpPr>
+        <a:xfrm>
+          <a:off x="0" y="0"/>
+          <a:ext cx="0" cy="0"/>
+          <a:chOff x="0" y="0"/>
+          <a:chExt cx="0" cy="0"/>
+        </a:xfrm>
+      </p:grpSpPr>
+      <p:sp>
+        <p:nvSpPr>
+          <p:cNvPr id="2" name="Title 1"/>
+          <p:cNvSpPr>
+            <a:spLocks noGrp="1"/>
+          </p:cNvSpPr>
+          <p:nvPr>
+            <p:ph type="title"/>
+          </p:nvPr>
+        </p:nvSpPr>
+        <p:spPr/>
+        <p:txBody>
+          <a:bodyPr/>
+          <a:lstStyle/>
+          <a:p>
+            <a:r>
+              <a:rPr lang="en-US" dirty="0" smtClean="0"/>
+              <a:t>Iteration statements: FORALL</a:t>
+            </a:r>
+            <a:endParaRPr lang="nl-BE" dirty="0"/>
+          </a:p>
+        </p:txBody>
+      </p:sp>
+      <p:sp>
+        <p:nvSpPr>
+          <p:cNvPr id="3" name="Content Placeholder 2"/>
+          <p:cNvSpPr>
+            <a:spLocks noGrp="1"/>
+          </p:cNvSpPr>
+          <p:nvPr>
+            <p:ph idx="1"/>
+          </p:nvPr>
+        </p:nvSpPr>
+        <p:spPr/>
+        <p:txBody>
+          <a:bodyPr/>
+          <a:lstStyle/>
+          <a:p>
+            <a:r>
+              <a:rPr lang="en-US" dirty="0" err="1" smtClean="0"/>
+              <a:t>Forall</a:t>
+            </a:r>
+            <a:r>
+              <a:rPr lang="en-US" dirty="0" smtClean="0"/>
+              <a:t> block statement, conditions on indices</a:t>
+            </a:r>
+            <a:endParaRPr lang="nl-BE" dirty="0"/>
+          </a:p>
+        </p:txBody>
+      </p:sp>
+      <p:sp>
+        <p:nvSpPr>
+          <p:cNvPr id="4" name="TextBox 3"/>
+          <p:cNvSpPr txBox="1"/>
+          <p:nvPr/>
+        </p:nvSpPr>
+        <p:spPr>
+          <a:xfrm>
+            <a:off x="827584" y="2314615"/>
+            <a:ext cx="6120680" cy="2308324"/>
+          </a:xfrm>
+          <a:prstGeom prst="rect">
+            <a:avLst/>
+          </a:prstGeom>
+          <a:solidFill>
+            <a:schemeClr val="accent1">
+              <a:lumMod val="40000"/>
+              <a:lumOff val="60000"/>
+            </a:schemeClr>
+          </a:solidFill>
+        </p:spPr>
+        <p:txBody>
+          <a:bodyPr wrap="square" rtlCol="0">
+            <a:spAutoFit/>
+          </a:bodyPr>
+          <a:lstStyle/>
+          <a:p>
+            <a:r>
+              <a:rPr lang="en-US" sz="1600" dirty="0" smtClean="0"/>
+              <a:t>INTEGER, PARAMETER </a:t>
+            </a:r>
+            <a:r>
+              <a:rPr lang="en-US" sz="1600" dirty="0"/>
+              <a:t>:: </a:t>
+            </a:r>
+            <a:r>
+              <a:rPr lang="en-US" sz="1600" dirty="0" smtClean="0"/>
+              <a:t>n </a:t>
+            </a:r>
+            <a:r>
+              <a:rPr lang="en-US" sz="1600" dirty="0"/>
+              <a:t>= </a:t>
+            </a:r>
+            <a:r>
+              <a:rPr lang="en-US" sz="1600" dirty="0" smtClean="0"/>
+              <a:t>5</a:t>
+            </a:r>
+            <a:endParaRPr lang="en-US" sz="1600" dirty="0"/>
+          </a:p>
+          <a:p>
+            <a:r>
+              <a:rPr lang="en-US" sz="1600" dirty="0" smtClean="0"/>
+              <a:t>REAL, DIMENSION(n, n) </a:t>
+            </a:r>
+            <a:r>
+              <a:rPr lang="en-US" sz="1600" dirty="0"/>
+              <a:t>:: </a:t>
+            </a:r>
+            <a:r>
+              <a:rPr lang="en-US" sz="1600" dirty="0" smtClean="0"/>
+              <a:t>a</a:t>
+            </a:r>
+            <a:endParaRPr lang="en-US" sz="1600" dirty="0"/>
+          </a:p>
+          <a:p>
+            <a:r>
+              <a:rPr lang="en-US" sz="1600" dirty="0" smtClean="0"/>
+              <a:t>INTEGER :: </a:t>
+            </a:r>
+            <a:r>
+              <a:rPr lang="en-US" sz="1600" dirty="0" err="1"/>
+              <a:t>i</a:t>
+            </a:r>
+            <a:r>
+              <a:rPr lang="en-US" sz="1600" dirty="0"/>
+              <a:t>, j</a:t>
+            </a:r>
+          </a:p>
+          <a:p>
+            <a:r>
+              <a:rPr lang="en-US" sz="1600" dirty="0" smtClean="0"/>
+              <a:t>…</a:t>
+            </a:r>
+            <a:endParaRPr lang="en-US" sz="1600" dirty="0"/>
+          </a:p>
+          <a:p>
+            <a:r>
+              <a:rPr lang="en-US" sz="1600" dirty="0"/>
+              <a:t>a</a:t>
+            </a:r>
+            <a:r>
+              <a:rPr lang="en-US" sz="1600" dirty="0" smtClean="0"/>
+              <a:t> </a:t>
+            </a:r>
+            <a:r>
+              <a:rPr lang="en-US" sz="1600" dirty="0"/>
+              <a:t>= </a:t>
+            </a:r>
+            <a:r>
+              <a:rPr lang="en-US" sz="1600" dirty="0" smtClean="0"/>
+              <a:t>0.0</a:t>
+            </a:r>
+            <a:endParaRPr lang="en-US" sz="1600" dirty="0"/>
+          </a:p>
+          <a:p>
+            <a:r>
+              <a:rPr lang="en-US" sz="1600" dirty="0" smtClean="0"/>
+              <a:t>FORALL (</a:t>
+            </a:r>
+            <a:r>
+              <a:rPr lang="en-US" sz="1600" dirty="0" err="1" smtClean="0"/>
+              <a:t>i</a:t>
+            </a:r>
+            <a:r>
+              <a:rPr lang="en-US" sz="1600" dirty="0" smtClean="0"/>
+              <a:t> </a:t>
+            </a:r>
+            <a:r>
+              <a:rPr lang="en-US" sz="1600" dirty="0"/>
+              <a:t>= </a:t>
+            </a:r>
+            <a:r>
+              <a:rPr lang="en-US" sz="1600" dirty="0" smtClean="0"/>
+              <a:t>1:n, </a:t>
+            </a:r>
+            <a:r>
+              <a:rPr lang="en-US" sz="1600" dirty="0"/>
+              <a:t>j = </a:t>
+            </a:r>
+            <a:r>
+              <a:rPr lang="en-US" sz="1600" dirty="0" smtClean="0"/>
+              <a:t>1:n, </a:t>
+            </a:r>
+            <a:r>
+              <a:rPr lang="en-US" sz="1600" dirty="0" err="1"/>
+              <a:t>i</a:t>
+            </a:r>
+            <a:r>
+              <a:rPr lang="en-US" sz="1600" dirty="0"/>
+              <a:t> == j - 1 </a:t>
+            </a:r>
+            <a:r>
+              <a:rPr lang="en-US" sz="1600" dirty="0" smtClean="0"/>
+              <a:t>.OR. </a:t>
+            </a:r>
+            <a:r>
+              <a:rPr lang="en-US" sz="1600" dirty="0" err="1"/>
+              <a:t>i</a:t>
+            </a:r>
+            <a:r>
+              <a:rPr lang="en-US" sz="1600" dirty="0"/>
+              <a:t> == j + 1)</a:t>
+            </a:r>
+          </a:p>
+          <a:p>
+            <a:r>
+              <a:rPr lang="en-US" sz="1600" dirty="0"/>
+              <a:t>    </a:t>
+            </a:r>
+            <a:r>
+              <a:rPr lang="en-US" sz="1600" dirty="0" smtClean="0"/>
+              <a:t>a(</a:t>
+            </a:r>
+            <a:r>
+              <a:rPr lang="en-US" sz="1600" dirty="0" err="1" smtClean="0"/>
+              <a:t>i</a:t>
+            </a:r>
+            <a:r>
+              <a:rPr lang="en-US" sz="1600" dirty="0"/>
+              <a:t>, j) = </a:t>
+            </a:r>
+            <a:r>
+              <a:rPr lang="en-US" sz="1600" dirty="0" smtClean="0"/>
+              <a:t>1.0</a:t>
+            </a:r>
+            <a:endParaRPr lang="en-US" sz="1600" dirty="0"/>
+          </a:p>
+          <a:p>
+            <a:r>
+              <a:rPr lang="en-US" sz="1600" dirty="0" smtClean="0"/>
+              <a:t>END FORALL</a:t>
+            </a:r>
+          </a:p>
+          <a:p>
+            <a:r>
+              <a:rPr lang="en-US" sz="1600" dirty="0" smtClean="0"/>
+              <a:t>…</a:t>
+            </a:r>
+            <a:endParaRPr lang="en-US" sz="1600" dirty="0"/>
+          </a:p>
+        </p:txBody>
+      </p:sp>
+      <p:sp>
+        <p:nvSpPr>
+          <p:cNvPr id="5" name="TextBox 4"/>
+          <p:cNvSpPr txBox="1"/>
+          <p:nvPr/>
+        </p:nvSpPr>
+        <p:spPr>
+          <a:xfrm>
+            <a:off x="827584" y="4865092"/>
+            <a:ext cx="6120680" cy="1323439"/>
+          </a:xfrm>
+          <a:prstGeom prst="rect">
+            <a:avLst/>
+          </a:prstGeom>
+          <a:solidFill>
+            <a:schemeClr val="accent1">
+              <a:lumMod val="40000"/>
+              <a:lumOff val="60000"/>
+            </a:schemeClr>
+          </a:solidFill>
+        </p:spPr>
+        <p:txBody>
+          <a:bodyPr wrap="square" rtlCol="0">
+            <a:spAutoFit/>
+          </a:bodyPr>
+          <a:lstStyle/>
+          <a:p>
+            <a:r>
+              <a:rPr lang="en-US" sz="1600" dirty="0" smtClean="0"/>
+              <a:t>…</a:t>
+            </a:r>
+            <a:endParaRPr lang="en-US" sz="1600" dirty="0"/>
+          </a:p>
+          <a:p>
+            <a:r>
+              <a:rPr lang="en-US" sz="1600" dirty="0" smtClean="0"/>
+              <a:t>FORALL (</a:t>
+            </a:r>
+            <a:r>
+              <a:rPr lang="en-US" sz="1600" dirty="0" err="1" smtClean="0"/>
+              <a:t>i</a:t>
+            </a:r>
+            <a:r>
+              <a:rPr lang="en-US" sz="1600" dirty="0" smtClean="0"/>
+              <a:t> </a:t>
+            </a:r>
+            <a:r>
+              <a:rPr lang="en-US" sz="1600" dirty="0"/>
+              <a:t>= </a:t>
+            </a:r>
+            <a:r>
+              <a:rPr lang="en-US" sz="1600" dirty="0" smtClean="0"/>
+              <a:t>1:n, </a:t>
+            </a:r>
+            <a:r>
+              <a:rPr lang="en-US" sz="1600" dirty="0"/>
+              <a:t>j = </a:t>
+            </a:r>
+            <a:r>
+              <a:rPr lang="en-US" sz="1600" dirty="0" smtClean="0"/>
+              <a:t>1:n, a(I, j) &lt; 0.0)</a:t>
+            </a:r>
+            <a:endParaRPr lang="en-US" sz="1600" dirty="0"/>
+          </a:p>
+          <a:p>
+            <a:r>
+              <a:rPr lang="en-US" sz="1600" dirty="0"/>
+              <a:t>    </a:t>
+            </a:r>
+            <a:r>
+              <a:rPr lang="en-US" sz="1600" dirty="0" smtClean="0"/>
+              <a:t>a(</a:t>
+            </a:r>
+            <a:r>
+              <a:rPr lang="en-US" sz="1600" dirty="0" err="1" smtClean="0"/>
+              <a:t>i</a:t>
+            </a:r>
+            <a:r>
+              <a:rPr lang="en-US" sz="1600" dirty="0"/>
+              <a:t>, j) = 0</a:t>
+            </a:r>
+            <a:r>
+              <a:rPr lang="en-US" sz="1600" dirty="0" smtClean="0"/>
+              <a:t>.0</a:t>
+            </a:r>
+            <a:endParaRPr lang="en-US" sz="1600" dirty="0"/>
+          </a:p>
+          <a:p>
+            <a:r>
+              <a:rPr lang="en-US" sz="1600" dirty="0" smtClean="0"/>
+              <a:t>END FORALL</a:t>
+            </a:r>
+          </a:p>
+          <a:p>
+            <a:r>
+              <a:rPr lang="en-US" sz="1600" dirty="0" smtClean="0"/>
+              <a:t>…</a:t>
+            </a:r>
+            <a:endParaRPr lang="en-US" sz="1600" dirty="0"/>
+          </a:p>
+        </p:txBody>
+      </p:sp>
+      <p:sp>
+        <p:nvSpPr>
+          <p:cNvPr id="6" name="TextBox 5"/>
+          <p:cNvSpPr txBox="1"/>
+          <p:nvPr/>
+        </p:nvSpPr>
+        <p:spPr>
+          <a:xfrm>
+            <a:off x="4604021" y="5415607"/>
+            <a:ext cx="1624163" cy="461665"/>
+          </a:xfrm>
+          <a:prstGeom prst="rect">
+            <a:avLst/>
+          </a:prstGeom>
+          <a:solidFill>
+            <a:schemeClr val="bg1"/>
+          </a:solidFill>
+          <a:ln>
+            <a:solidFill>
+              <a:schemeClr val="tx1"/>
+            </a:solidFill>
+          </a:ln>
+        </p:spPr>
+        <p:txBody>
+          <a:bodyPr wrap="none" rtlCol="0">
+            <a:spAutoFit/>
+          </a:bodyPr>
+          <a:lstStyle/>
+          <a:p>
+            <a:r>
+              <a:rPr lang="en-US" sz="2400" dirty="0" smtClean="0"/>
+              <a:t>use </a:t>
+            </a:r>
+            <a:r>
+              <a:rPr lang="en-US" sz="2400" dirty="0" smtClean="0">
+                <a:latin typeface="Courier New" panose="02070309020205020404" pitchFamily="49" charset="0"/>
+                <a:cs typeface="Courier New" panose="02070309020205020404" pitchFamily="49" charset="0"/>
+              </a:rPr>
+              <a:t>WHERE</a:t>
+            </a:r>
+            <a:endParaRPr lang="nl-BE" sz="2400" dirty="0">
+              <a:latin typeface="Courier New" panose="02070309020205020404" pitchFamily="49" charset="0"/>
+              <a:cs typeface="Courier New" panose="02070309020205020404" pitchFamily="49" charset="0"/>
+            </a:endParaRPr>
+          </a:p>
+        </p:txBody>
+      </p:sp>
+    </p:spTree>
+    <p:extLst>
+      <p:ext uri="{BB962C8B-B14F-4D97-AF65-F5344CB8AC3E}">
+        <p14:creationId xmlns:p14="http://schemas.microsoft.com/office/powerpoint/2010/main" val="2128293473"/>
+      </p:ext>
+    </p:extLst>
+  </p:cSld>
+  <p:clrMapOvr>
+    <a:masterClrMapping/>
+  </p:clrMapOvr>
+</p:sld>
+</file>
+
 <file path=ppt/slides/slide2.xml><?xml version="1.0" encoding="utf-8"?>
 <p:sld xmlns:a="http://schemas.openxmlformats.org/drawingml/2006/main" xmlns:r="http://schemas.openxmlformats.org/officeDocument/2006/relationships" xmlns:p="http://schemas.openxmlformats.org/presentationml/2006/main">
   <p:cSld>
@@ -3202,7 +5754,7 @@
           <a:p>
             <a:r>
               <a:rPr lang="en-US" dirty="0" smtClean="0"/>
-              <a:t>Code format</a:t>
+              <a:t>Introduction</a:t>
             </a:r>
             <a:endParaRPr lang="nl-BE" dirty="0"/>
           </a:p>
@@ -3210,27 +5762,101 @@
       </p:sp>
       <p:sp>
         <p:nvSpPr>
-          <p:cNvPr id="3" name="Text Placeholder 2"/>
-          <p:cNvSpPr>
-            <a:spLocks noGrp="1"/>
-          </p:cNvSpPr>
-          <p:nvPr>
-            <p:ph type="body" idx="1"/>
+          <p:cNvPr id="3" name="Content Placeholder 2"/>
+          <p:cNvSpPr>
+            <a:spLocks noGrp="1"/>
+          </p:cNvSpPr>
+          <p:nvPr>
+            <p:ph idx="1"/>
           </p:nvPr>
         </p:nvSpPr>
         <p:spPr/>
         <p:txBody>
-          <a:bodyPr/>
-          <a:lstStyle/>
-          <a:p>
-            <a:endParaRPr lang="nl-BE"/>
+          <a:bodyPr>
+            <a:normAutofit fontScale="85000" lnSpcReduction="20000"/>
+          </a:bodyPr>
+          <a:lstStyle/>
+          <a:p>
+            <a:r>
+              <a:rPr lang="en-US" dirty="0" smtClean="0"/>
+              <a:t>Fortran &amp; LISP were first high-level programming languages</a:t>
+            </a:r>
+          </a:p>
+          <a:p>
+            <a:r>
+              <a:rPr lang="en-US" dirty="0" smtClean="0"/>
+              <a:t>Fortran versions still around</a:t>
+            </a:r>
+          </a:p>
+          <a:p>
+            <a:pPr lvl="1"/>
+            <a:r>
+              <a:rPr lang="en-US" dirty="0" smtClean="0"/>
+              <a:t>Fortran 77</a:t>
+            </a:r>
+          </a:p>
+          <a:p>
+            <a:pPr lvl="1"/>
+            <a:r>
+              <a:rPr lang="en-US" dirty="0" smtClean="0"/>
+              <a:t>Fortran 90</a:t>
+            </a:r>
+          </a:p>
+          <a:p>
+            <a:pPr lvl="1"/>
+            <a:r>
+              <a:rPr lang="en-US" dirty="0" smtClean="0"/>
+              <a:t>Fortran 95</a:t>
+            </a:r>
+          </a:p>
+          <a:p>
+            <a:pPr lvl="1"/>
+            <a:r>
+              <a:rPr lang="en-US" dirty="0" smtClean="0"/>
+              <a:t>Fortran 2003</a:t>
+            </a:r>
+          </a:p>
+          <a:p>
+            <a:pPr lvl="1"/>
+            <a:r>
+              <a:rPr lang="en-US" dirty="0" smtClean="0"/>
+              <a:t>Fortran 2008</a:t>
+            </a:r>
+          </a:p>
+          <a:p>
+            <a:r>
+              <a:rPr lang="en-US" dirty="0" smtClean="0"/>
+              <a:t>Fortran is still very relevant</a:t>
+            </a:r>
+          </a:p>
+          <a:p>
+            <a:pPr lvl="1"/>
+            <a:r>
+              <a:rPr lang="en-US" dirty="0" smtClean="0"/>
+              <a:t>language with modern many features</a:t>
+            </a:r>
+          </a:p>
+          <a:p>
+            <a:pPr lvl="1"/>
+            <a:r>
+              <a:rPr lang="en-US" dirty="0" smtClean="0"/>
+              <a:t>excellent language for scientific computing</a:t>
+            </a:r>
+          </a:p>
+          <a:p>
+            <a:pPr lvl="1"/>
+            <a:r>
+              <a:rPr lang="en-US" dirty="0" smtClean="0"/>
+              <a:t>lots of legacy code</a:t>
+            </a:r>
+            <a:endParaRPr lang="nl-BE" dirty="0"/>
           </a:p>
         </p:txBody>
       </p:sp>
     </p:spTree>
     <p:extLst>
       <p:ext uri="{BB962C8B-B14F-4D97-AF65-F5344CB8AC3E}">
-        <p14:creationId xmlns:p14="http://schemas.microsoft.com/office/powerpoint/2010/main" val="3624647986"/>
+        <p14:creationId xmlns:p14="http://schemas.microsoft.com/office/powerpoint/2010/main" val="1689794365"/>
       </p:ext>
     </p:extLst>
   </p:cSld>
@@ -3274,7 +5900,7 @@
           <a:p>
             <a:r>
               <a:rPr lang="en-US" dirty="0" smtClean="0"/>
-              <a:t>Datatypes</a:t>
+              <a:t>Code format</a:t>
             </a:r>
             <a:endParaRPr lang="nl-BE" dirty="0"/>
           </a:p>
@@ -3302,7 +5928,7 @@
     </p:spTree>
     <p:extLst>
       <p:ext uri="{BB962C8B-B14F-4D97-AF65-F5344CB8AC3E}">
-        <p14:creationId xmlns:p14="http://schemas.microsoft.com/office/powerpoint/2010/main" val="2079205812"/>
+        <p14:creationId xmlns:p14="http://schemas.microsoft.com/office/powerpoint/2010/main" val="3624647986"/>
       </p:ext>
     </p:extLst>
   </p:cSld>
@@ -3331,7 +5957,7 @@
       </p:grpSpPr>
       <p:sp>
         <p:nvSpPr>
-          <p:cNvPr id="4" name="Title 3"/>
+          <p:cNvPr id="2" name="Title 1"/>
           <p:cNvSpPr>
             <a:spLocks noGrp="1"/>
           </p:cNvSpPr>
@@ -3346,7 +5972,7 @@
           <a:p>
             <a:r>
               <a:rPr lang="en-US" dirty="0" smtClean="0"/>
-              <a:t>Implicit types</a:t>
+              <a:t>Free source form</a:t>
             </a:r>
             <a:endParaRPr lang="nl-BE" dirty="0"/>
           </a:p>
@@ -3354,7 +5980,7 @@
       </p:sp>
       <p:sp>
         <p:nvSpPr>
-          <p:cNvPr id="5" name="Content Placeholder 4"/>
+          <p:cNvPr id="3" name="Content Placeholder 2"/>
           <p:cNvSpPr>
             <a:spLocks noGrp="1"/>
           </p:cNvSpPr>
@@ -3364,89 +5990,666 @@
         </p:nvSpPr>
         <p:spPr/>
         <p:txBody>
-          <a:bodyPr>
-            <a:normAutofit lnSpcReduction="10000"/>
+          <a:bodyPr/>
+          <a:lstStyle/>
+          <a:p>
+            <a:r>
+              <a:rPr lang="en-US" dirty="0" smtClean="0"/>
+              <a:t>Fortran 77 had column format</a:t>
+            </a:r>
+          </a:p>
+          <a:p>
+            <a:r>
+              <a:rPr lang="en-US" dirty="0" smtClean="0"/>
+              <a:t>Fortran 90+ allows for free source form</a:t>
+            </a:r>
+            <a:endParaRPr lang="nl-BE" dirty="0"/>
+          </a:p>
+        </p:txBody>
+      </p:sp>
+      <p:sp>
+        <p:nvSpPr>
+          <p:cNvPr id="4" name="TextBox 3"/>
+          <p:cNvSpPr txBox="1"/>
+          <p:nvPr/>
+        </p:nvSpPr>
+        <p:spPr>
+          <a:xfrm>
+            <a:off x="1861578" y="3064892"/>
+            <a:ext cx="6120680" cy="2800767"/>
+          </a:xfrm>
+          <a:prstGeom prst="rect">
+            <a:avLst/>
+          </a:prstGeom>
+          <a:solidFill>
+            <a:schemeClr val="accent1">
+              <a:lumMod val="40000"/>
+              <a:lumOff val="60000"/>
+            </a:schemeClr>
+          </a:solidFill>
+        </p:spPr>
+        <p:txBody>
+          <a:bodyPr wrap="square" rtlCol="0">
+            <a:spAutoFit/>
           </a:bodyPr>
           <a:lstStyle/>
           <a:p>
             <a:r>
-              <a:rPr lang="en-US" dirty="0" smtClean="0"/>
-              <a:t>Convention: type based on first character of variable name</a:t>
-            </a:r>
-          </a:p>
-          <a:p>
-            <a:pPr lvl="1"/>
-            <a:r>
-              <a:rPr lang="en-US" dirty="0" smtClean="0"/>
-              <a:t>'</a:t>
-            </a:r>
-            <a:r>
-              <a:rPr lang="en-US" dirty="0" err="1" smtClean="0"/>
+              <a:rPr lang="en-US" sz="1600" dirty="0" smtClean="0"/>
+              <a:t>PROGRAM </a:t>
+            </a:r>
+            <a:r>
+              <a:rPr lang="en-US" sz="1600" dirty="0" err="1" smtClean="0"/>
+              <a:t>free_source_form</a:t>
+            </a:r>
+            <a:endParaRPr lang="en-US" sz="1600" dirty="0" smtClean="0"/>
+          </a:p>
+          <a:p>
+            <a:r>
+              <a:rPr lang="en-US" sz="1600" dirty="0"/>
+              <a:t> </a:t>
+            </a:r>
+            <a:r>
+              <a:rPr lang="en-US" sz="1600" dirty="0" smtClean="0"/>
+              <a:t>   INTEGER :: </a:t>
+            </a:r>
+            <a:r>
+              <a:rPr lang="en-US" sz="1600" dirty="0" err="1" smtClean="0"/>
               <a:t>i</a:t>
             </a:r>
-            <a:r>
-              <a:rPr lang="en-US" dirty="0" smtClean="0"/>
-              <a:t>' to 'p': </a:t>
-            </a:r>
-            <a:r>
-              <a:rPr lang="en-US" dirty="0" smtClean="0">
-                <a:latin typeface="Courier New" panose="02070309020205020404" pitchFamily="49" charset="0"/>
-                <a:cs typeface="Courier New" panose="02070309020205020404" pitchFamily="49" charset="0"/>
+            <a:endParaRPr lang="en-US" sz="1600" dirty="0" smtClean="0"/>
+          </a:p>
+          <a:p>
+            <a:r>
+              <a:rPr lang="en-US" sz="1600" dirty="0"/>
+              <a:t> </a:t>
+            </a:r>
+            <a:r>
+              <a:rPr lang="en-US" sz="1600" dirty="0" smtClean="0"/>
+              <a:t>   INTEGER, PARAMETER :: n = 10</a:t>
+            </a:r>
+          </a:p>
+          <a:p>
+            <a:endParaRPr lang="en-US" sz="1600" dirty="0" smtClean="0"/>
+          </a:p>
+          <a:p>
+            <a:r>
+              <a:rPr lang="en-US" sz="1600" dirty="0"/>
+              <a:t> </a:t>
+            </a:r>
+            <a:r>
+              <a:rPr lang="en-US" sz="1600" dirty="0" smtClean="0"/>
+              <a:t>   </a:t>
+            </a:r>
+            <a:r>
+              <a:rPr lang="en-US" sz="1600" b="1" dirty="0" smtClean="0">
+                <a:solidFill>
+                  <a:srgbClr val="C00000"/>
+                </a:solidFill>
               </a:rPr>
-              <a:t>INTEGER</a:t>
-            </a:r>
-          </a:p>
-          <a:p>
-            <a:pPr lvl="1"/>
-            <a:r>
-              <a:rPr lang="en-US" dirty="0" smtClean="0"/>
-              <a:t>'a' to 'h', 'q' to 'z': </a:t>
-            </a:r>
-            <a:r>
-              <a:rPr lang="en-US" dirty="0" smtClean="0">
-                <a:latin typeface="Courier New" panose="02070309020205020404" pitchFamily="49" charset="0"/>
-                <a:cs typeface="Courier New" panose="02070309020205020404" pitchFamily="49" charset="0"/>
+              <a:t>!</a:t>
+            </a:r>
+            <a:r>
+              <a:rPr lang="en-US" sz="1600" dirty="0" smtClean="0"/>
+              <a:t> This will print something to screen</a:t>
+            </a:r>
+            <a:endParaRPr lang="en-US" sz="1600" dirty="0"/>
+          </a:p>
+          <a:p>
+            <a:r>
+              <a:rPr lang="en-US" sz="1600" dirty="0" smtClean="0"/>
+              <a:t>    DO I = 1, n</a:t>
+            </a:r>
+          </a:p>
+          <a:p>
+            <a:r>
+              <a:rPr lang="en-US" sz="1600" dirty="0"/>
+              <a:t> </a:t>
+            </a:r>
+            <a:r>
+              <a:rPr lang="en-US" sz="1600" dirty="0" smtClean="0"/>
+              <a:t>       print '(A, I2, A, I2)', 'This is iteration ', I,    </a:t>
+            </a:r>
+            <a:r>
+              <a:rPr lang="en-US" sz="1600" b="1" dirty="0" smtClean="0">
+                <a:solidFill>
+                  <a:srgbClr val="C00000"/>
+                </a:solidFill>
               </a:rPr>
-              <a:t>REAL</a:t>
-            </a:r>
-            <a:r>
-              <a:rPr lang="en-US" dirty="0" smtClean="0"/>
-              <a:t> or </a:t>
-            </a:r>
-            <a:r>
-              <a:rPr lang="en-US" dirty="0" smtClean="0">
-                <a:latin typeface="Courier New" panose="02070309020205020404" pitchFamily="49" charset="0"/>
-                <a:cs typeface="Courier New" panose="02070309020205020404" pitchFamily="49" charset="0"/>
-              </a:rPr>
-              <a:t>DOUBLE PRECISION</a:t>
-            </a:r>
-          </a:p>
-          <a:p>
-            <a:r>
-              <a:rPr lang="en-US" dirty="0" smtClean="0"/>
-              <a:t>Advantage: saves typing: no need to declare variables</a:t>
-            </a:r>
-          </a:p>
-          <a:p>
-            <a:r>
-              <a:rPr lang="en-US" dirty="0" smtClean="0"/>
-              <a:t>Disadvantage: no need to declare variables</a:t>
-            </a:r>
-          </a:p>
-          <a:p>
-            <a:pPr lvl="1"/>
-            <a:r>
-              <a:rPr lang="en-US" dirty="0" smtClean="0"/>
-              <a:t>mistakes likely</a:t>
-            </a:r>
-            <a:endParaRPr lang="nl-BE" dirty="0"/>
+              <a:t>&amp;</a:t>
+            </a:r>
+          </a:p>
+          <a:p>
+            <a:r>
+              <a:rPr lang="en-US" sz="1600" dirty="0"/>
+              <a:t> </a:t>
+            </a:r>
+            <a:r>
+              <a:rPr lang="en-US" sz="1600" dirty="0" smtClean="0"/>
+              <a:t>                                         ' out of ', n</a:t>
+            </a:r>
+            <a:endParaRPr lang="en-US" sz="1600" dirty="0" smtClean="0"/>
+          </a:p>
+          <a:p>
+            <a:r>
+              <a:rPr lang="en-US" sz="1600" dirty="0"/>
+              <a:t> </a:t>
+            </a:r>
+            <a:r>
+              <a:rPr lang="en-US" sz="1600" dirty="0" smtClean="0"/>
+              <a:t>   END DO</a:t>
+            </a:r>
+          </a:p>
+          <a:p>
+            <a:endParaRPr lang="en-US" sz="1600" dirty="0"/>
+          </a:p>
+          <a:p>
+            <a:r>
+              <a:rPr lang="en-US" sz="1600" dirty="0" smtClean="0"/>
+              <a:t>END PROGRAM </a:t>
+            </a:r>
+            <a:r>
+              <a:rPr lang="en-US" sz="1600" dirty="0" err="1" smtClean="0"/>
+              <a:t>free_source_form</a:t>
+            </a:r>
+            <a:endParaRPr lang="en-US" sz="1600" dirty="0" smtClean="0"/>
+          </a:p>
+        </p:txBody>
+      </p:sp>
+      <p:grpSp>
+        <p:nvGrpSpPr>
+          <p:cNvPr id="5" name="Group 4"/>
+          <p:cNvGrpSpPr/>
+          <p:nvPr/>
+        </p:nvGrpSpPr>
+        <p:grpSpPr>
+          <a:xfrm>
+            <a:off x="5605994" y="3933056"/>
+            <a:ext cx="2493579" cy="936104"/>
+            <a:chOff x="4283968" y="1700808"/>
+            <a:chExt cx="2493579" cy="936104"/>
+          </a:xfrm>
+        </p:grpSpPr>
+        <p:sp>
+          <p:nvSpPr>
+            <p:cNvPr id="6" name="Rounded Rectangle 5"/>
+            <p:cNvSpPr/>
+            <p:nvPr/>
+          </p:nvSpPr>
+          <p:spPr>
+            <a:xfrm>
+              <a:off x="4283968" y="2276872"/>
+              <a:ext cx="288032" cy="360040"/>
+            </a:xfrm>
+            <a:prstGeom prst="roundRect">
+              <a:avLst/>
+            </a:prstGeom>
+            <a:noFill/>
+            <a:ln>
+              <a:solidFill>
+                <a:srgbClr val="C00000"/>
+              </a:solidFill>
+            </a:ln>
+          </p:spPr>
+          <p:style>
+            <a:lnRef idx="2">
+              <a:schemeClr val="accent1">
+                <a:shade val="50000"/>
+              </a:schemeClr>
+            </a:lnRef>
+            <a:fillRef idx="1">
+              <a:schemeClr val="accent1"/>
+            </a:fillRef>
+            <a:effectRef idx="0">
+              <a:schemeClr val="accent1"/>
+            </a:effectRef>
+            <a:fontRef idx="minor">
+              <a:schemeClr val="lt1"/>
+            </a:fontRef>
+          </p:style>
+          <p:txBody>
+            <a:bodyPr rtlCol="0" anchor="ctr"/>
+            <a:lstStyle/>
+            <a:p>
+              <a:pPr algn="ctr"/>
+              <a:endParaRPr lang="nl-BE"/>
+            </a:p>
+          </p:txBody>
+        </p:sp>
+        <p:sp>
+          <p:nvSpPr>
+            <p:cNvPr id="7" name="TextBox 6"/>
+            <p:cNvSpPr txBox="1"/>
+            <p:nvPr/>
+          </p:nvSpPr>
+          <p:spPr>
+            <a:xfrm>
+              <a:off x="5004048" y="1700808"/>
+              <a:ext cx="1773499" cy="369332"/>
+            </a:xfrm>
+            <a:prstGeom prst="rect">
+              <a:avLst/>
+            </a:prstGeom>
+            <a:solidFill>
+              <a:schemeClr val="bg1"/>
+            </a:solidFill>
+            <a:ln>
+              <a:solidFill>
+                <a:srgbClr val="C00000"/>
+              </a:solidFill>
+            </a:ln>
+          </p:spPr>
+          <p:txBody>
+            <a:bodyPr wrap="none" rtlCol="0">
+              <a:spAutoFit/>
+            </a:bodyPr>
+            <a:lstStyle/>
+            <a:p>
+              <a:r>
+                <a:rPr lang="en-US" dirty="0" smtClean="0">
+                  <a:solidFill>
+                    <a:srgbClr val="C00000"/>
+                  </a:solidFill>
+                </a:rPr>
+                <a:t>line continuation</a:t>
+              </a:r>
+              <a:endParaRPr lang="nl-BE" dirty="0">
+                <a:solidFill>
+                  <a:srgbClr val="C00000"/>
+                </a:solidFill>
+              </a:endParaRPr>
+            </a:p>
+          </p:txBody>
+        </p:sp>
+        <p:cxnSp>
+          <p:nvCxnSpPr>
+            <p:cNvPr id="8" name="Straight Arrow Connector 7"/>
+            <p:cNvCxnSpPr>
+              <a:stCxn id="7" idx="1"/>
+              <a:endCxn id="6" idx="0"/>
+            </p:cNvCxnSpPr>
+            <p:nvPr/>
+          </p:nvCxnSpPr>
+          <p:spPr>
+            <a:xfrm flipH="1">
+              <a:off x="4427984" y="1885474"/>
+              <a:ext cx="576064" cy="391398"/>
+            </a:xfrm>
+            <a:prstGeom prst="straightConnector1">
+              <a:avLst/>
+            </a:prstGeom>
+            <a:ln w="19050">
+              <a:solidFill>
+                <a:srgbClr val="C00000"/>
+              </a:solidFill>
+              <a:tailEnd type="stealth" w="lg" len="lg"/>
+            </a:ln>
+          </p:spPr>
+          <p:style>
+            <a:lnRef idx="1">
+              <a:schemeClr val="accent1"/>
+            </a:lnRef>
+            <a:fillRef idx="0">
+              <a:schemeClr val="accent1"/>
+            </a:fillRef>
+            <a:effectRef idx="0">
+              <a:schemeClr val="accent1"/>
+            </a:effectRef>
+            <a:fontRef idx="minor">
+              <a:schemeClr val="tx1"/>
+            </a:fontRef>
+          </p:style>
+        </p:cxnSp>
+      </p:grpSp>
+      <p:grpSp>
+        <p:nvGrpSpPr>
+          <p:cNvPr id="9" name="Group 8"/>
+          <p:cNvGrpSpPr/>
+          <p:nvPr/>
+        </p:nvGrpSpPr>
+        <p:grpSpPr>
+          <a:xfrm>
+            <a:off x="392539" y="3429000"/>
+            <a:ext cx="1973095" cy="936104"/>
+            <a:chOff x="2598905" y="1700808"/>
+            <a:chExt cx="1973095" cy="936104"/>
+          </a:xfrm>
+        </p:grpSpPr>
+        <p:sp>
+          <p:nvSpPr>
+            <p:cNvPr id="10" name="Rounded Rectangle 9"/>
+            <p:cNvSpPr/>
+            <p:nvPr/>
+          </p:nvSpPr>
+          <p:spPr>
+            <a:xfrm>
+              <a:off x="4283968" y="2276872"/>
+              <a:ext cx="288032" cy="360040"/>
+            </a:xfrm>
+            <a:prstGeom prst="roundRect">
+              <a:avLst/>
+            </a:prstGeom>
+            <a:noFill/>
+            <a:ln>
+              <a:solidFill>
+                <a:srgbClr val="C00000"/>
+              </a:solidFill>
+            </a:ln>
+          </p:spPr>
+          <p:style>
+            <a:lnRef idx="2">
+              <a:schemeClr val="accent1">
+                <a:shade val="50000"/>
+              </a:schemeClr>
+            </a:lnRef>
+            <a:fillRef idx="1">
+              <a:schemeClr val="accent1"/>
+            </a:fillRef>
+            <a:effectRef idx="0">
+              <a:schemeClr val="accent1"/>
+            </a:effectRef>
+            <a:fontRef idx="minor">
+              <a:schemeClr val="lt1"/>
+            </a:fontRef>
+          </p:style>
+          <p:txBody>
+            <a:bodyPr rtlCol="0" anchor="ctr"/>
+            <a:lstStyle/>
+            <a:p>
+              <a:pPr algn="ctr"/>
+              <a:endParaRPr lang="nl-BE"/>
+            </a:p>
+          </p:txBody>
+        </p:sp>
+        <p:sp>
+          <p:nvSpPr>
+            <p:cNvPr id="11" name="TextBox 10"/>
+            <p:cNvSpPr txBox="1"/>
+            <p:nvPr/>
+          </p:nvSpPr>
+          <p:spPr>
+            <a:xfrm>
+              <a:off x="2598905" y="1700808"/>
+              <a:ext cx="1083117" cy="369332"/>
+            </a:xfrm>
+            <a:prstGeom prst="rect">
+              <a:avLst/>
+            </a:prstGeom>
+            <a:solidFill>
+              <a:schemeClr val="bg1"/>
+            </a:solidFill>
+            <a:ln>
+              <a:solidFill>
+                <a:srgbClr val="C00000"/>
+              </a:solidFill>
+            </a:ln>
+          </p:spPr>
+          <p:txBody>
+            <a:bodyPr wrap="none" rtlCol="0">
+              <a:spAutoFit/>
+            </a:bodyPr>
+            <a:lstStyle/>
+            <a:p>
+              <a:r>
+                <a:rPr lang="en-US" dirty="0" smtClean="0">
+                  <a:solidFill>
+                    <a:srgbClr val="C00000"/>
+                  </a:solidFill>
+                </a:rPr>
+                <a:t>comment</a:t>
+              </a:r>
+              <a:endParaRPr lang="nl-BE" dirty="0">
+                <a:solidFill>
+                  <a:srgbClr val="C00000"/>
+                </a:solidFill>
+              </a:endParaRPr>
+            </a:p>
+          </p:txBody>
+        </p:sp>
+        <p:cxnSp>
+          <p:nvCxnSpPr>
+            <p:cNvPr id="12" name="Straight Arrow Connector 11"/>
+            <p:cNvCxnSpPr>
+              <a:stCxn id="11" idx="3"/>
+              <a:endCxn id="10" idx="1"/>
+            </p:cNvCxnSpPr>
+            <p:nvPr/>
+          </p:nvCxnSpPr>
+          <p:spPr>
+            <a:xfrm>
+              <a:off x="3682022" y="1885474"/>
+              <a:ext cx="601946" cy="571418"/>
+            </a:xfrm>
+            <a:prstGeom prst="straightConnector1">
+              <a:avLst/>
+            </a:prstGeom>
+            <a:ln w="19050">
+              <a:solidFill>
+                <a:srgbClr val="C00000"/>
+              </a:solidFill>
+              <a:tailEnd type="stealth" w="lg" len="lg"/>
+            </a:ln>
+          </p:spPr>
+          <p:style>
+            <a:lnRef idx="1">
+              <a:schemeClr val="accent1"/>
+            </a:lnRef>
+            <a:fillRef idx="0">
+              <a:schemeClr val="accent1"/>
+            </a:fillRef>
+            <a:effectRef idx="0">
+              <a:schemeClr val="accent1"/>
+            </a:effectRef>
+            <a:fontRef idx="minor">
+              <a:schemeClr val="tx1"/>
+            </a:fontRef>
+          </p:style>
+        </p:cxnSp>
+      </p:grpSp>
+      <p:grpSp>
+        <p:nvGrpSpPr>
+          <p:cNvPr id="24" name="Group 23"/>
+          <p:cNvGrpSpPr/>
+          <p:nvPr/>
+        </p:nvGrpSpPr>
+        <p:grpSpPr>
+          <a:xfrm>
+            <a:off x="467544" y="4941168"/>
+            <a:ext cx="3384376" cy="1222395"/>
+            <a:chOff x="467544" y="4941168"/>
+            <a:chExt cx="3384376" cy="1222395"/>
+          </a:xfrm>
+        </p:grpSpPr>
+        <p:cxnSp>
+          <p:nvCxnSpPr>
+            <p:cNvPr id="17" name="Straight Arrow Connector 16"/>
+            <p:cNvCxnSpPr/>
+            <p:nvPr/>
+          </p:nvCxnSpPr>
+          <p:spPr>
+            <a:xfrm>
+              <a:off x="1861578" y="4941168"/>
+              <a:ext cx="1990342" cy="0"/>
+            </a:xfrm>
+            <a:prstGeom prst="straightConnector1">
+              <a:avLst/>
+            </a:prstGeom>
+            <a:ln w="31750">
+              <a:solidFill>
+                <a:srgbClr val="C00000"/>
+              </a:solidFill>
+              <a:headEnd type="stealth" w="lg" len="lg"/>
+              <a:tailEnd type="stealth" w="lg" len="lg"/>
+            </a:ln>
+          </p:spPr>
+          <p:style>
+            <a:lnRef idx="1">
+              <a:schemeClr val="accent1"/>
+            </a:lnRef>
+            <a:fillRef idx="0">
+              <a:schemeClr val="accent1"/>
+            </a:fillRef>
+            <a:effectRef idx="0">
+              <a:schemeClr val="accent1"/>
+            </a:effectRef>
+            <a:fontRef idx="minor">
+              <a:schemeClr val="tx1"/>
+            </a:fontRef>
+          </p:style>
+        </p:cxnSp>
+        <p:grpSp>
+          <p:nvGrpSpPr>
+            <p:cNvPr id="19" name="Group 18"/>
+            <p:cNvGrpSpPr/>
+            <p:nvPr/>
+          </p:nvGrpSpPr>
+          <p:grpSpPr>
+            <a:xfrm>
+              <a:off x="467544" y="4941168"/>
+              <a:ext cx="1685063" cy="1222395"/>
+              <a:chOff x="2454889" y="1124744"/>
+              <a:chExt cx="1685063" cy="1222395"/>
+            </a:xfrm>
+          </p:grpSpPr>
+          <p:sp>
+            <p:nvSpPr>
+              <p:cNvPr id="21" name="TextBox 20"/>
+              <p:cNvSpPr txBox="1"/>
+              <p:nvPr/>
+            </p:nvSpPr>
+            <p:spPr>
+              <a:xfrm>
+                <a:off x="2454889" y="1700808"/>
+                <a:ext cx="1272464" cy="646331"/>
+              </a:xfrm>
+              <a:prstGeom prst="rect">
+                <a:avLst/>
+              </a:prstGeom>
+              <a:solidFill>
+                <a:schemeClr val="bg1"/>
+              </a:solidFill>
+              <a:ln>
+                <a:solidFill>
+                  <a:srgbClr val="C00000"/>
+                </a:solidFill>
+              </a:ln>
+            </p:spPr>
+            <p:txBody>
+              <a:bodyPr wrap="none" rtlCol="0">
+                <a:spAutoFit/>
+              </a:bodyPr>
+              <a:lstStyle/>
+              <a:p>
+                <a:r>
+                  <a:rPr lang="en-US" dirty="0" smtClean="0">
+                    <a:solidFill>
+                      <a:srgbClr val="C00000"/>
+                    </a:solidFill>
+                  </a:rPr>
+                  <a:t>arbitrary</a:t>
+                </a:r>
+                <a:br>
+                  <a:rPr lang="en-US" dirty="0" smtClean="0">
+                    <a:solidFill>
+                      <a:srgbClr val="C00000"/>
+                    </a:solidFill>
+                  </a:rPr>
+                </a:br>
+                <a:r>
+                  <a:rPr lang="en-US" dirty="0" smtClean="0">
+                    <a:solidFill>
+                      <a:srgbClr val="C00000"/>
+                    </a:solidFill>
+                  </a:rPr>
+                  <a:t>indentation</a:t>
+                </a:r>
+                <a:endParaRPr lang="nl-BE" dirty="0">
+                  <a:solidFill>
+                    <a:srgbClr val="C00000"/>
+                  </a:solidFill>
+                </a:endParaRPr>
+              </a:p>
+            </p:txBody>
+          </p:sp>
+          <p:cxnSp>
+            <p:nvCxnSpPr>
+              <p:cNvPr id="22" name="Straight Arrow Connector 21"/>
+              <p:cNvCxnSpPr>
+                <a:stCxn id="21" idx="3"/>
+              </p:cNvCxnSpPr>
+              <p:nvPr/>
+            </p:nvCxnSpPr>
+            <p:spPr>
+              <a:xfrm flipV="1">
+                <a:off x="3727353" y="1124744"/>
+                <a:ext cx="412599" cy="899230"/>
+              </a:xfrm>
+              <a:prstGeom prst="straightConnector1">
+                <a:avLst/>
+              </a:prstGeom>
+              <a:ln w="19050">
+                <a:solidFill>
+                  <a:srgbClr val="C00000"/>
+                </a:solidFill>
+                <a:tailEnd type="stealth" w="lg" len="lg"/>
+              </a:ln>
+            </p:spPr>
+            <p:style>
+              <a:lnRef idx="1">
+                <a:schemeClr val="accent1"/>
+              </a:lnRef>
+              <a:fillRef idx="0">
+                <a:schemeClr val="accent1"/>
+              </a:fillRef>
+              <a:effectRef idx="0">
+                <a:schemeClr val="accent1"/>
+              </a:effectRef>
+              <a:fontRef idx="minor">
+                <a:schemeClr val="tx1"/>
+              </a:fontRef>
+            </p:style>
+          </p:cxnSp>
+        </p:grpSp>
+      </p:grpSp>
+      <p:sp>
+        <p:nvSpPr>
+          <p:cNvPr id="25" name="TextBox 24"/>
+          <p:cNvSpPr txBox="1"/>
+          <p:nvPr/>
+        </p:nvSpPr>
+        <p:spPr>
+          <a:xfrm>
+            <a:off x="4932040" y="6021288"/>
+            <a:ext cx="3762505" cy="461665"/>
+          </a:xfrm>
+          <a:prstGeom prst="rect">
+            <a:avLst/>
+          </a:prstGeom>
+          <a:noFill/>
+          <a:ln>
+            <a:solidFill>
+              <a:schemeClr val="tx1"/>
+            </a:solidFill>
+          </a:ln>
+        </p:spPr>
+        <p:txBody>
+          <a:bodyPr wrap="none" rtlCol="0">
+            <a:spAutoFit/>
+          </a:bodyPr>
+          <a:lstStyle/>
+          <a:p>
+            <a:r>
+              <a:rPr lang="en-US" sz="2400" dirty="0" smtClean="0"/>
+              <a:t>Fortran is not case-sensitive!</a:t>
+            </a:r>
+            <a:endParaRPr lang="nl-BE" sz="2400" dirty="0"/>
           </a:p>
         </p:txBody>
       </p:sp>
     </p:spTree>
     <p:extLst>
       <p:ext uri="{BB962C8B-B14F-4D97-AF65-F5344CB8AC3E}">
-        <p14:creationId xmlns:p14="http://schemas.microsoft.com/office/powerpoint/2010/main" val="259309604"/>
+        <p14:creationId xmlns:p14="http://schemas.microsoft.com/office/powerpoint/2010/main" val="1636419650"/>
       </p:ext>
     </p:extLst>
   </p:cSld>
@@ -3490,11 +6693,7 @@
           <a:p>
             <a:r>
               <a:rPr lang="en-US" dirty="0" smtClean="0"/>
-              <a:t>No </a:t>
-            </a:r>
-            <a:r>
-              <a:rPr lang="en-US" dirty="0" err="1" smtClean="0"/>
-              <a:t>implicits</a:t>
+              <a:t>Datatypes</a:t>
             </a:r>
             <a:endParaRPr lang="nl-BE" dirty="0"/>
           </a:p>
@@ -3502,12 +6701,12 @@
       </p:sp>
       <p:sp>
         <p:nvSpPr>
-          <p:cNvPr id="3" name="Content Placeholder 2"/>
-          <p:cNvSpPr>
-            <a:spLocks noGrp="1"/>
-          </p:cNvSpPr>
-          <p:nvPr>
-            <p:ph idx="1"/>
+          <p:cNvPr id="3" name="Text Placeholder 2"/>
+          <p:cNvSpPr>
+            <a:spLocks noGrp="1"/>
+          </p:cNvSpPr>
+          <p:nvPr>
+            <p:ph type="body" idx="1"/>
           </p:nvPr>
         </p:nvSpPr>
         <p:spPr/>
@@ -3515,174 +6714,14 @@
           <a:bodyPr/>
           <a:lstStyle/>
           <a:p>
-            <a:r>
-              <a:rPr lang="en-US" dirty="0" smtClean="0"/>
-              <a:t>Always use </a:t>
-            </a:r>
-            <a:r>
-              <a:rPr lang="en-US" dirty="0" smtClean="0">
-                <a:latin typeface="Courier New" panose="02070309020205020404" pitchFamily="49" charset="0"/>
-                <a:cs typeface="Courier New" panose="02070309020205020404" pitchFamily="49" charset="0"/>
-              </a:rPr>
-              <a:t>IMPLICIT NONE</a:t>
-            </a:r>
-          </a:p>
-          <a:p>
-            <a:pPr lvl="1"/>
-            <a:r>
-              <a:rPr lang="en-US" dirty="0" smtClean="0">
-                <a:cs typeface="Courier New" panose="02070309020205020404" pitchFamily="49" charset="0"/>
-              </a:rPr>
-              <a:t>variables </a:t>
-            </a:r>
-            <a:r>
-              <a:rPr lang="en-US" i="1" dirty="0" smtClean="0">
-                <a:cs typeface="Courier New" panose="02070309020205020404" pitchFamily="49" charset="0"/>
-              </a:rPr>
-              <a:t>must</a:t>
-            </a:r>
-            <a:r>
-              <a:rPr lang="en-US" dirty="0" smtClean="0">
-                <a:cs typeface="Courier New" panose="02070309020205020404" pitchFamily="49" charset="0"/>
-              </a:rPr>
-              <a:t> be declared explicitly</a:t>
-            </a:r>
-          </a:p>
-          <a:p>
-            <a:pPr lvl="1"/>
-            <a:r>
-              <a:rPr lang="en-US" dirty="0" smtClean="0"/>
-              <a:t>in </a:t>
-            </a:r>
-            <a:r>
-              <a:rPr lang="en-US" dirty="0" smtClean="0">
-                <a:latin typeface="Courier New" panose="02070309020205020404" pitchFamily="49" charset="0"/>
-                <a:cs typeface="Courier New" panose="02070309020205020404" pitchFamily="49" charset="0"/>
-              </a:rPr>
-              <a:t>PROGRAM</a:t>
-            </a:r>
-            <a:r>
-              <a:rPr lang="en-US" dirty="0" smtClean="0"/>
-              <a:t>, </a:t>
-            </a:r>
-            <a:r>
-              <a:rPr lang="en-US" dirty="0" smtClean="0">
-                <a:latin typeface="Courier New" panose="02070309020205020404" pitchFamily="49" charset="0"/>
-                <a:cs typeface="Courier New" panose="02070309020205020404" pitchFamily="49" charset="0"/>
-              </a:rPr>
-              <a:t>MODULE</a:t>
-            </a:r>
-            <a:r>
-              <a:rPr lang="en-US" dirty="0" smtClean="0"/>
-              <a:t>, </a:t>
-            </a:r>
-            <a:r>
-              <a:rPr lang="en-US" dirty="0" smtClean="0">
-                <a:latin typeface="Courier New" panose="02070309020205020404" pitchFamily="49" charset="0"/>
-                <a:cs typeface="Courier New" panose="02070309020205020404" pitchFamily="49" charset="0"/>
-              </a:rPr>
-              <a:t>SUBROUTINE</a:t>
-            </a:r>
-            <a:r>
-              <a:rPr lang="en-US" dirty="0" smtClean="0"/>
-              <a:t>, </a:t>
-            </a:r>
-            <a:r>
-              <a:rPr lang="en-US" dirty="0" smtClean="0">
-                <a:latin typeface="Courier New" panose="02070309020205020404" pitchFamily="49" charset="0"/>
-                <a:cs typeface="Courier New" panose="02070309020205020404" pitchFamily="49" charset="0"/>
-              </a:rPr>
-              <a:t>FUNCTION</a:t>
-            </a:r>
-          </a:p>
-          <a:p>
-            <a:pPr lvl="1"/>
-            <a:r>
-              <a:rPr lang="en-US" dirty="0" smtClean="0">
-                <a:cs typeface="Courier New" panose="02070309020205020404" pitchFamily="49" charset="0"/>
-              </a:rPr>
-              <a:t>example:</a:t>
-            </a:r>
-          </a:p>
-        </p:txBody>
-      </p:sp>
-      <p:sp>
-        <p:nvSpPr>
-          <p:cNvPr id="4" name="TextBox 3"/>
-          <p:cNvSpPr txBox="1"/>
-          <p:nvPr/>
-        </p:nvSpPr>
-        <p:spPr>
-          <a:xfrm>
-            <a:off x="1331640" y="4293096"/>
-            <a:ext cx="4176464" cy="1477328"/>
-          </a:xfrm>
-          <a:prstGeom prst="rect">
-            <a:avLst/>
-          </a:prstGeom>
-          <a:solidFill>
-            <a:schemeClr val="accent1">
-              <a:lumMod val="40000"/>
-              <a:lumOff val="60000"/>
-            </a:schemeClr>
-          </a:solidFill>
-        </p:spPr>
-        <p:txBody>
-          <a:bodyPr wrap="square" rtlCol="0">
-            <a:spAutoFit/>
-          </a:bodyPr>
-          <a:lstStyle/>
-          <a:p>
-            <a:r>
-              <a:rPr lang="en-US" dirty="0" smtClean="0"/>
-              <a:t>MODULE </a:t>
-            </a:r>
-            <a:r>
-              <a:rPr lang="en-US" dirty="0" err="1" smtClean="0"/>
-              <a:t>math_funcs</a:t>
-            </a:r>
-            <a:endParaRPr lang="en-US" dirty="0" smtClean="0"/>
-          </a:p>
-          <a:p>
-            <a:r>
-              <a:rPr lang="en-US" dirty="0" smtClean="0"/>
-              <a:t>    USE </a:t>
-            </a:r>
-            <a:r>
-              <a:rPr lang="en-US" dirty="0" err="1" smtClean="0"/>
-              <a:t>iso_fortran_env</a:t>
-            </a:r>
-            <a:endParaRPr lang="en-US" dirty="0" smtClean="0"/>
-          </a:p>
-          <a:p>
-            <a:r>
-              <a:rPr lang="en-US" dirty="0" smtClean="0"/>
-              <a:t>   IMPLICIT NONE</a:t>
-            </a:r>
-          </a:p>
-          <a:p>
-            <a:r>
-              <a:rPr lang="en-US" dirty="0" smtClean="0"/>
-              <a:t>…</a:t>
-            </a:r>
-          </a:p>
-          <a:p>
-            <a:r>
-              <a:rPr lang="en-US" dirty="0" smtClean="0"/>
-              <a:t>END MODULE </a:t>
-            </a:r>
-            <a:r>
-              <a:rPr lang="en-US" dirty="0" err="1" smtClean="0"/>
-              <a:t>math_funcs</a:t>
-            </a:r>
-            <a:endParaRPr lang="nl-BE" dirty="0"/>
+            <a:endParaRPr lang="nl-BE"/>
           </a:p>
         </p:txBody>
       </p:sp>
     </p:spTree>
     <p:extLst>
       <p:ext uri="{BB962C8B-B14F-4D97-AF65-F5344CB8AC3E}">
-        <p14:creationId xmlns:p14="http://schemas.microsoft.com/office/powerpoint/2010/main" val="4152805141"/>
+        <p14:creationId xmlns:p14="http://schemas.microsoft.com/office/powerpoint/2010/main" val="2079205812"/>
       </p:ext>
     </p:extLst>
   </p:cSld>
@@ -3726,7 +6765,7 @@
           <a:p>
             <a:r>
               <a:rPr lang="en-US" dirty="0" smtClean="0"/>
-              <a:t>Fortran 90 versus Fortran 95</a:t>
+              <a:t>Implicit types</a:t>
             </a:r>
             <a:endParaRPr lang="nl-BE" dirty="0"/>
           </a:p>
@@ -3744,75 +6783,43 @@
         </p:nvSpPr>
         <p:spPr/>
         <p:txBody>
-          <a:bodyPr/>
+          <a:bodyPr>
+            <a:normAutofit lnSpcReduction="10000"/>
+          </a:bodyPr>
           <a:lstStyle/>
           <a:p>
             <a:r>
               <a:rPr lang="en-US" dirty="0" smtClean="0"/>
-              <a:t>Integers</a:t>
+              <a:t>Convention: type based on first character of variable name</a:t>
             </a:r>
           </a:p>
           <a:p>
             <a:pPr lvl="1"/>
             <a:r>
               <a:rPr lang="en-US" dirty="0" smtClean="0"/>
-              <a:t>4 byte: </a:t>
+              <a:t>'</a:t>
+            </a:r>
+            <a:r>
+              <a:rPr lang="en-US" dirty="0" err="1" smtClean="0"/>
+              <a:t>i</a:t>
+            </a:r>
+            <a:r>
+              <a:rPr lang="en-US" dirty="0" smtClean="0"/>
+              <a:t>' to 'p': </a:t>
             </a:r>
             <a:r>
               <a:rPr lang="en-US" dirty="0" smtClean="0">
                 <a:latin typeface="Courier New" panose="02070309020205020404" pitchFamily="49" charset="0"/>
                 <a:cs typeface="Courier New" panose="02070309020205020404" pitchFamily="49" charset="0"/>
               </a:rPr>
-              <a:t>INTEGER*4</a:t>
-            </a:r>
+              <a:t>INTEGER</a:t>
+            </a:r>
+          </a:p>
+          <a:p>
+            <a:pPr lvl="1"/>
             <a:r>
               <a:rPr lang="en-US" dirty="0" smtClean="0"/>
-              <a:t> vs. </a:t>
-            </a:r>
-            <a:r>
-              <a:rPr lang="en-US" dirty="0" smtClean="0">
-                <a:latin typeface="Courier New" panose="02070309020205020404" pitchFamily="49" charset="0"/>
-                <a:cs typeface="Courier New" panose="02070309020205020404" pitchFamily="49" charset="0"/>
-              </a:rPr>
-              <a:t>INTEGER(KIND=4)</a:t>
-            </a:r>
-          </a:p>
-          <a:p>
-            <a:pPr lvl="1"/>
-            <a:r>
-              <a:rPr lang="en-US" dirty="0" smtClean="0"/>
-              <a:t>8 byte: </a:t>
-            </a:r>
-            <a:r>
-              <a:rPr lang="en-US" dirty="0" smtClean="0">
-                <a:latin typeface="Courier New" panose="02070309020205020404" pitchFamily="49" charset="0"/>
-                <a:cs typeface="Courier New" panose="02070309020205020404" pitchFamily="49" charset="0"/>
-              </a:rPr>
-              <a:t>INTEGER*8</a:t>
-            </a:r>
-            <a:r>
-              <a:rPr lang="en-US" dirty="0" smtClean="0"/>
-              <a:t> vs. </a:t>
-            </a:r>
-            <a:r>
-              <a:rPr lang="en-US" dirty="0" smtClean="0">
-                <a:latin typeface="Courier New" panose="02070309020205020404" pitchFamily="49" charset="0"/>
-                <a:cs typeface="Courier New" panose="02070309020205020404" pitchFamily="49" charset="0"/>
-              </a:rPr>
-              <a:t>INTEGER(KIND=8)</a:t>
-            </a:r>
-          </a:p>
-          <a:p>
-            <a:r>
-              <a:rPr lang="en-US" dirty="0" smtClean="0"/>
-              <a:t>Real numbers</a:t>
-            </a:r>
-          </a:p>
-          <a:p>
-            <a:pPr lvl="1"/>
-            <a:r>
-              <a:rPr lang="en-US" dirty="0" smtClean="0"/>
-              <a:t>single precision: </a:t>
+              <a:t>'a' to 'h', 'q' to 'z': </a:t>
             </a:r>
             <a:r>
               <a:rPr lang="en-US" dirty="0" smtClean="0">
@@ -3823,21 +6830,7 @@
             </a:r>
             <a:r>
               <a:rPr lang="en-US" dirty="0" smtClean="0"/>
-              <a:t> vs. </a:t>
-            </a:r>
-            <a:r>
-              <a:rPr lang="en-US" dirty="0" smtClean="0">
-                <a:latin typeface="Courier New" panose="02070309020205020404" pitchFamily="49" charset="0"/>
-                <a:cs typeface="Courier New" panose="02070309020205020404" pitchFamily="49" charset="0"/>
-              </a:rPr>
-              <a:t>REAL(KIND=4)</a:t>
-            </a:r>
-          </a:p>
-          <a:p>
-            <a:pPr lvl="1"/>
-            <a:r>
-              <a:rPr lang="en-US" dirty="0" smtClean="0"/>
-              <a:t>double precision: </a:t>
+              <a:t> or </a:t>
             </a:r>
             <a:r>
               <a:rPr lang="en-US" dirty="0" smtClean="0">
@@ -3846,63 +6839,74 @@
               </a:rPr>
               <a:t>DOUBLE PRECISION</a:t>
             </a:r>
+          </a:p>
+          <a:p>
             <a:r>
               <a:rPr lang="en-US" dirty="0" smtClean="0"/>
-              <a:t> vs. </a:t>
-            </a:r>
-            <a:r>
-              <a:rPr lang="en-US" dirty="0" smtClean="0">
-                <a:latin typeface="Courier New" panose="02070309020205020404" pitchFamily="49" charset="0"/>
-                <a:cs typeface="Courier New" panose="02070309020205020404" pitchFamily="49" charset="0"/>
-              </a:rPr>
-              <a:t>REAL(KIND=8)</a:t>
-            </a:r>
-            <a:endParaRPr lang="nl-BE" dirty="0">
-              <a:latin typeface="Courier New" panose="02070309020205020404" pitchFamily="49" charset="0"/>
-              <a:cs typeface="Courier New" panose="02070309020205020404" pitchFamily="49" charset="0"/>
-            </a:endParaRPr>
-          </a:p>
-        </p:txBody>
-      </p:sp>
-      <p:sp>
-        <p:nvSpPr>
-          <p:cNvPr id="6" name="TextBox 5"/>
-          <p:cNvSpPr txBox="1"/>
+              <a:t>Advantage: saves typing: no need to declare variables</a:t>
+            </a:r>
+          </a:p>
+          <a:p>
+            <a:r>
+              <a:rPr lang="en-US" dirty="0" smtClean="0"/>
+              <a:t>Disadvantage: no need to declare variables</a:t>
+            </a:r>
+          </a:p>
+          <a:p>
+            <a:pPr lvl="1"/>
+            <a:r>
+              <a:rPr lang="en-US" dirty="0" smtClean="0"/>
+              <a:t>mistakes likely</a:t>
+            </a:r>
+            <a:endParaRPr lang="nl-BE" dirty="0"/>
+          </a:p>
+        </p:txBody>
+      </p:sp>
+      <p:pic>
+        <p:nvPicPr>
+          <p:cNvPr id="1026" name="Picture 2" descr="C:\Users\lucg5005\AppData\Local\Microsoft\Windows\Temporary Internet Files\Content.IE5\CWZUAEH4\lgi01a201309290600[1].jpg"/>
+          <p:cNvPicPr>
+            <a:picLocks noChangeAspect="1" noChangeArrowheads="1"/>
+          </p:cNvPicPr>
           <p:nvPr/>
-        </p:nvSpPr>
-        <p:spPr>
+        </p:nvPicPr>
+        <p:blipFill>
+          <a:blip r:embed="rId2" cstate="print">
+            <a:extLst>
+              <a:ext uri="{28A0092B-C50C-407E-A947-70E740481C1C}">
+                <a14:useLocalDpi xmlns:a14="http://schemas.microsoft.com/office/drawing/2010/main" val="0"/>
+              </a:ext>
+            </a:extLst>
+          </a:blip>
+          <a:srcRect/>
+          <a:stretch>
+            <a:fillRect/>
+          </a:stretch>
+        </p:blipFill>
+        <p:spPr bwMode="auto">
           <a:xfrm>
-            <a:off x="3123420" y="5589240"/>
-            <a:ext cx="3105145" cy="584775"/>
+            <a:off x="7020272" y="2276872"/>
+            <a:ext cx="1152128" cy="1182158"/>
           </a:xfrm>
           <a:prstGeom prst="rect">
             <a:avLst/>
           </a:prstGeom>
           <a:noFill/>
-          <a:ln>
-            <a:solidFill>
-              <a:schemeClr val="tx1"/>
-            </a:solidFill>
-          </a:ln>
+          <a:extLst>
+            <a:ext uri="{909E8E84-426E-40DD-AFC4-6F175D3DCCD1}">
+              <a14:hiddenFill xmlns:a14="http://schemas.microsoft.com/office/drawing/2010/main">
+                <a:solidFill>
+                  <a:srgbClr val="FFFFFF"/>
+                </a:solidFill>
+              </a14:hiddenFill>
+            </a:ext>
+          </a:extLst>
         </p:spPr>
-        <p:txBody>
-          <a:bodyPr wrap="none" rtlCol="0">
-            <a:spAutoFit/>
-          </a:bodyPr>
-          <a:lstStyle/>
-          <a:p>
-            <a:r>
-              <a:rPr lang="en-US" sz="3200" dirty="0" smtClean="0"/>
-              <a:t>Still not portable!</a:t>
-            </a:r>
-            <a:endParaRPr lang="nl-BE" sz="3200" dirty="0"/>
-          </a:p>
-        </p:txBody>
-      </p:sp>
+      </p:pic>
     </p:spTree>
     <p:extLst>
       <p:ext uri="{BB962C8B-B14F-4D97-AF65-F5344CB8AC3E}">
-        <p14:creationId xmlns:p14="http://schemas.microsoft.com/office/powerpoint/2010/main" val="4159797861"/>
+        <p14:creationId xmlns:p14="http://schemas.microsoft.com/office/powerpoint/2010/main" val="259309604"/>
       </p:ext>
     </p:extLst>
   </p:cSld>
@@ -3946,7 +6950,11 @@
           <a:p>
             <a:r>
               <a:rPr lang="en-US" dirty="0" smtClean="0"/>
-              <a:t>Platform independence</a:t>
+              <a:t>No </a:t>
+            </a:r>
+            <a:r>
+              <a:rPr lang="en-US" dirty="0" err="1" smtClean="0"/>
+              <a:t>implicits</a:t>
             </a:r>
             <a:endParaRPr lang="nl-BE" dirty="0"/>
           </a:p>
@@ -3969,27 +6977,91 @@
           <a:p>
             <a:r>
               <a:rPr lang="en-US" dirty="0" smtClean="0"/>
-              <a:t>Use</a:t>
+              <a:t>Always use </a:t>
+            </a:r>
+            <a:r>
+              <a:rPr lang="en-US" dirty="0" smtClean="0">
+                <a:latin typeface="Courier New" panose="02070309020205020404" pitchFamily="49" charset="0"/>
+                <a:cs typeface="Courier New" panose="02070309020205020404" pitchFamily="49" charset="0"/>
+              </a:rPr>
+              <a:t>IMPLICIT NONE</a:t>
             </a:r>
           </a:p>
           <a:p>
             <a:pPr lvl="1"/>
             <a:r>
+              <a:rPr lang="en-US" dirty="0" smtClean="0">
+                <a:cs typeface="Courier New" panose="02070309020205020404" pitchFamily="49" charset="0"/>
+              </a:rPr>
+              <a:t>variables </a:t>
+            </a:r>
+            <a:r>
+              <a:rPr lang="en-US" i="1" dirty="0" smtClean="0">
+                <a:cs typeface="Courier New" panose="02070309020205020404" pitchFamily="49" charset="0"/>
+              </a:rPr>
+              <a:t>must</a:t>
+            </a:r>
+            <a:r>
+              <a:rPr lang="en-US" dirty="0" smtClean="0">
+                <a:cs typeface="Courier New" panose="02070309020205020404" pitchFamily="49" charset="0"/>
+              </a:rPr>
+              <a:t> be declared explicitly</a:t>
+            </a:r>
+          </a:p>
+          <a:p>
+            <a:pPr lvl="1"/>
+            <a:r>
               <a:rPr lang="en-US" dirty="0" smtClean="0"/>
-              <a:t>SELECT_INT_KIND(r=…)</a:t>
+              <a:t>in </a:t>
+            </a:r>
+            <a:r>
+              <a:rPr lang="en-US" dirty="0" smtClean="0">
+                <a:latin typeface="Courier New" panose="02070309020205020404" pitchFamily="49" charset="0"/>
+                <a:cs typeface="Courier New" panose="02070309020205020404" pitchFamily="49" charset="0"/>
+              </a:rPr>
+              <a:t>PROGRAM</a:t>
+            </a:r>
+            <a:r>
+              <a:rPr lang="en-US" dirty="0" smtClean="0"/>
+              <a:t>, </a:t>
+            </a:r>
+            <a:r>
+              <a:rPr lang="en-US" dirty="0" smtClean="0">
+                <a:latin typeface="Courier New" panose="02070309020205020404" pitchFamily="49" charset="0"/>
+                <a:cs typeface="Courier New" panose="02070309020205020404" pitchFamily="49" charset="0"/>
+              </a:rPr>
+              <a:t>MODULE</a:t>
+            </a:r>
+            <a:r>
+              <a:rPr lang="en-US" dirty="0" smtClean="0"/>
+              <a:t>, </a:t>
+            </a:r>
+            <a:r>
+              <a:rPr lang="en-US" dirty="0" smtClean="0">
+                <a:latin typeface="Courier New" panose="02070309020205020404" pitchFamily="49" charset="0"/>
+                <a:cs typeface="Courier New" panose="02070309020205020404" pitchFamily="49" charset="0"/>
+              </a:rPr>
+              <a:t>SUBROUTINE</a:t>
+            </a:r>
+            <a:r>
+              <a:rPr lang="en-US" dirty="0" smtClean="0"/>
+              <a:t>, </a:t>
+            </a:r>
+            <a:r>
+              <a:rPr lang="en-US" dirty="0" smtClean="0">
+                <a:latin typeface="Courier New" panose="02070309020205020404" pitchFamily="49" charset="0"/>
+                <a:cs typeface="Courier New" panose="02070309020205020404" pitchFamily="49" charset="0"/>
+              </a:rPr>
+              <a:t>FUNCTION</a:t>
             </a:r>
           </a:p>
           <a:p>
             <a:pPr lvl="1"/>
             <a:r>
-              <a:rPr lang="en-US" dirty="0" smtClean="0"/>
-              <a:t>SELECT_REAL_KIND(p=…, r=…)</a:t>
-            </a:r>
-          </a:p>
-          <a:p>
-            <a:r>
-              <a:rPr lang="en-US" dirty="0" smtClean="0"/>
-              <a:t>Example</a:t>
+              <a:rPr lang="en-US" dirty="0" smtClean="0">
+                <a:cs typeface="Courier New" panose="02070309020205020404" pitchFamily="49" charset="0"/>
+              </a:rPr>
+              <a:t>example:</a:t>
             </a:r>
           </a:p>
         </p:txBody>
@@ -4002,8 +7074,8 @@
         </p:nvSpPr>
         <p:spPr>
           <a:xfrm>
-            <a:off x="2699792" y="3429000"/>
-            <a:ext cx="6120680" cy="3108543"/>
+            <a:off x="1259632" y="4293096"/>
+            <a:ext cx="4176464" cy="1477328"/>
           </a:xfrm>
           <a:prstGeom prst="rect">
             <a:avLst/>
@@ -4022,14 +7094,471 @@
           <a:lstStyle/>
           <a:p>
             <a:r>
-              <a:rPr lang="en-US" sz="1600" dirty="0" smtClean="0"/>
-              <a:t>IMPLICIT NONE</a:t>
-            </a:r>
-          </a:p>
-          <a:p>
-            <a:r>
-              <a:rPr lang="en-US" sz="1600" dirty="0" smtClean="0"/>
-              <a:t>INTEGER, PARAMETER :: </a:t>
+              <a:rPr lang="en-US" dirty="0" smtClean="0"/>
+              <a:t>MODULE </a:t>
+            </a:r>
+            <a:r>
+              <a:rPr lang="en-US" dirty="0" err="1" smtClean="0"/>
+              <a:t>math_funcs</a:t>
+            </a:r>
+            <a:endParaRPr lang="en-US" dirty="0" smtClean="0"/>
+          </a:p>
+          <a:p>
+            <a:r>
+              <a:rPr lang="en-US" dirty="0" smtClean="0"/>
+              <a:t>    USE </a:t>
+            </a:r>
+            <a:r>
+              <a:rPr lang="en-US" dirty="0" err="1" smtClean="0"/>
+              <a:t>iso_fortran_env</a:t>
+            </a:r>
+            <a:endParaRPr lang="en-US" dirty="0" smtClean="0"/>
+          </a:p>
+          <a:p>
+            <a:r>
+              <a:rPr lang="en-US" dirty="0" smtClean="0"/>
+              <a:t>   </a:t>
+            </a:r>
+            <a:r>
+              <a:rPr lang="en-US" dirty="0" smtClean="0"/>
+              <a:t> </a:t>
+            </a:r>
+            <a:r>
+              <a:rPr lang="en-US" b="1" dirty="0" smtClean="0">
+                <a:solidFill>
+                  <a:srgbClr val="C00000"/>
+                </a:solidFill>
+              </a:rPr>
+              <a:t>IMPLICIT </a:t>
+            </a:r>
+            <a:r>
+              <a:rPr lang="en-US" b="1" dirty="0" smtClean="0">
+                <a:solidFill>
+                  <a:srgbClr val="C00000"/>
+                </a:solidFill>
+              </a:rPr>
+              <a:t>NONE</a:t>
+            </a:r>
+          </a:p>
+          <a:p>
+            <a:r>
+              <a:rPr lang="en-US" dirty="0" smtClean="0"/>
+              <a:t>…</a:t>
+            </a:r>
+          </a:p>
+          <a:p>
+            <a:r>
+              <a:rPr lang="en-US" dirty="0" smtClean="0"/>
+              <a:t>END MODULE </a:t>
+            </a:r>
+            <a:r>
+              <a:rPr lang="en-US" dirty="0" err="1" smtClean="0"/>
+              <a:t>math_funcs</a:t>
+            </a:r>
+            <a:endParaRPr lang="nl-BE" dirty="0"/>
+          </a:p>
+        </p:txBody>
+      </p:sp>
+    </p:spTree>
+    <p:extLst>
+      <p:ext uri="{BB962C8B-B14F-4D97-AF65-F5344CB8AC3E}">
+        <p14:creationId xmlns:p14="http://schemas.microsoft.com/office/powerpoint/2010/main" val="4152805141"/>
+      </p:ext>
+    </p:extLst>
+  </p:cSld>
+  <p:clrMapOvr>
+    <a:masterClrMapping/>
+  </p:clrMapOvr>
+</p:sld>
+</file>
+
+<file path=ppt/slides/slide8.xml><?xml version="1.0" encoding="utf-8"?>
+<p:sld xmlns:a="http://schemas.openxmlformats.org/drawingml/2006/main" xmlns:r="http://schemas.openxmlformats.org/officeDocument/2006/relationships" xmlns:p="http://schemas.openxmlformats.org/presentationml/2006/main">
+  <p:cSld>
+    <p:spTree>
+      <p:nvGrpSpPr>
+        <p:cNvPr id="1" name=""/>
+        <p:cNvGrpSpPr/>
+        <p:nvPr/>
+      </p:nvGrpSpPr>
+      <p:grpSpPr>
+        <a:xfrm>
+          <a:off x="0" y="0"/>
+          <a:ext cx="0" cy="0"/>
+          <a:chOff x="0" y="0"/>
+          <a:chExt cx="0" cy="0"/>
+        </a:xfrm>
+      </p:grpSpPr>
+      <p:sp>
+        <p:nvSpPr>
+          <p:cNvPr id="4" name="Title 3"/>
+          <p:cNvSpPr>
+            <a:spLocks noGrp="1"/>
+          </p:cNvSpPr>
+          <p:nvPr>
+            <p:ph type="title"/>
+          </p:nvPr>
+        </p:nvSpPr>
+        <p:spPr/>
+        <p:txBody>
+          <a:bodyPr/>
+          <a:lstStyle/>
+          <a:p>
+            <a:r>
+              <a:rPr lang="en-US" dirty="0" smtClean="0"/>
+              <a:t>Fortran 90 versus Fortran </a:t>
+            </a:r>
+            <a:r>
+              <a:rPr lang="en-US" dirty="0" smtClean="0"/>
+              <a:t>95+</a:t>
+            </a:r>
+            <a:endParaRPr lang="nl-BE" dirty="0"/>
+          </a:p>
+        </p:txBody>
+      </p:sp>
+      <p:sp>
+        <p:nvSpPr>
+          <p:cNvPr id="5" name="Content Placeholder 4"/>
+          <p:cNvSpPr>
+            <a:spLocks noGrp="1"/>
+          </p:cNvSpPr>
+          <p:nvPr>
+            <p:ph idx="1"/>
+          </p:nvPr>
+        </p:nvSpPr>
+        <p:spPr/>
+        <p:txBody>
+          <a:bodyPr/>
+          <a:lstStyle/>
+          <a:p>
+            <a:r>
+              <a:rPr lang="en-US" dirty="0" smtClean="0"/>
+              <a:t>Integers</a:t>
+            </a:r>
+          </a:p>
+          <a:p>
+            <a:pPr lvl="1"/>
+            <a:r>
+              <a:rPr lang="en-US" dirty="0" smtClean="0"/>
+              <a:t>4 byte: </a:t>
+            </a:r>
+            <a:r>
+              <a:rPr lang="en-US" dirty="0" smtClean="0">
+                <a:latin typeface="Courier New" panose="02070309020205020404" pitchFamily="49" charset="0"/>
+                <a:cs typeface="Courier New" panose="02070309020205020404" pitchFamily="49" charset="0"/>
+              </a:rPr>
+              <a:t>INTEGER*4</a:t>
+            </a:r>
+            <a:r>
+              <a:rPr lang="en-US" dirty="0" smtClean="0"/>
+              <a:t> vs. </a:t>
+            </a:r>
+            <a:r>
+              <a:rPr lang="en-US" dirty="0" smtClean="0">
+                <a:latin typeface="Courier New" panose="02070309020205020404" pitchFamily="49" charset="0"/>
+                <a:cs typeface="Courier New" panose="02070309020205020404" pitchFamily="49" charset="0"/>
+              </a:rPr>
+              <a:t>INTEGER(KIND=4)</a:t>
+            </a:r>
+          </a:p>
+          <a:p>
+            <a:pPr lvl="1"/>
+            <a:r>
+              <a:rPr lang="en-US" dirty="0" smtClean="0"/>
+              <a:t>8 byte: </a:t>
+            </a:r>
+            <a:r>
+              <a:rPr lang="en-US" dirty="0" smtClean="0">
+                <a:latin typeface="Courier New" panose="02070309020205020404" pitchFamily="49" charset="0"/>
+                <a:cs typeface="Courier New" panose="02070309020205020404" pitchFamily="49" charset="0"/>
+              </a:rPr>
+              <a:t>INTEGER*8</a:t>
+            </a:r>
+            <a:r>
+              <a:rPr lang="en-US" dirty="0" smtClean="0"/>
+              <a:t> vs. </a:t>
+            </a:r>
+            <a:r>
+              <a:rPr lang="en-US" dirty="0" smtClean="0">
+                <a:latin typeface="Courier New" panose="02070309020205020404" pitchFamily="49" charset="0"/>
+                <a:cs typeface="Courier New" panose="02070309020205020404" pitchFamily="49" charset="0"/>
+              </a:rPr>
+              <a:t>INTEGER(KIND=8)</a:t>
+            </a:r>
+          </a:p>
+          <a:p>
+            <a:r>
+              <a:rPr lang="en-US" dirty="0" smtClean="0"/>
+              <a:t>Real numbers</a:t>
+            </a:r>
+          </a:p>
+          <a:p>
+            <a:pPr lvl="1"/>
+            <a:r>
+              <a:rPr lang="en-US" dirty="0" smtClean="0"/>
+              <a:t>single precision: </a:t>
+            </a:r>
+            <a:r>
+              <a:rPr lang="en-US" dirty="0" smtClean="0">
+                <a:latin typeface="Courier New" panose="02070309020205020404" pitchFamily="49" charset="0"/>
+                <a:cs typeface="Courier New" panose="02070309020205020404" pitchFamily="49" charset="0"/>
+              </a:rPr>
+              <a:t>REAL</a:t>
+            </a:r>
+            <a:r>
+              <a:rPr lang="en-US" dirty="0" smtClean="0"/>
+              <a:t> vs. </a:t>
+            </a:r>
+            <a:r>
+              <a:rPr lang="en-US" dirty="0" smtClean="0">
+                <a:latin typeface="Courier New" panose="02070309020205020404" pitchFamily="49" charset="0"/>
+                <a:cs typeface="Courier New" panose="02070309020205020404" pitchFamily="49" charset="0"/>
+              </a:rPr>
+              <a:t>REAL(KIND=4)</a:t>
+            </a:r>
+          </a:p>
+          <a:p>
+            <a:pPr lvl="1"/>
+            <a:r>
+              <a:rPr lang="en-US" dirty="0" smtClean="0"/>
+              <a:t>double precision: </a:t>
+            </a:r>
+            <a:r>
+              <a:rPr lang="en-US" dirty="0" smtClean="0">
+                <a:latin typeface="Courier New" panose="02070309020205020404" pitchFamily="49" charset="0"/>
+                <a:cs typeface="Courier New" panose="02070309020205020404" pitchFamily="49" charset="0"/>
+              </a:rPr>
+              <a:t>DOUBLE PRECISION</a:t>
+            </a:r>
+            <a:r>
+              <a:rPr lang="en-US" dirty="0" smtClean="0"/>
+              <a:t> vs. </a:t>
+            </a:r>
+            <a:r>
+              <a:rPr lang="en-US" dirty="0" smtClean="0">
+                <a:latin typeface="Courier New" panose="02070309020205020404" pitchFamily="49" charset="0"/>
+                <a:cs typeface="Courier New" panose="02070309020205020404" pitchFamily="49" charset="0"/>
+              </a:rPr>
+              <a:t>REAL(KIND=8)</a:t>
+            </a:r>
+            <a:endParaRPr lang="nl-BE" dirty="0">
+              <a:latin typeface="Courier New" panose="02070309020205020404" pitchFamily="49" charset="0"/>
+              <a:cs typeface="Courier New" panose="02070309020205020404" pitchFamily="49" charset="0"/>
+            </a:endParaRPr>
+          </a:p>
+        </p:txBody>
+      </p:sp>
+      <p:sp>
+        <p:nvSpPr>
+          <p:cNvPr id="6" name="TextBox 5"/>
+          <p:cNvSpPr txBox="1"/>
+          <p:nvPr/>
+        </p:nvSpPr>
+        <p:spPr>
+          <a:xfrm>
+            <a:off x="3123420" y="5589240"/>
+            <a:ext cx="3105145" cy="584775"/>
+          </a:xfrm>
+          <a:prstGeom prst="rect">
+            <a:avLst/>
+          </a:prstGeom>
+          <a:noFill/>
+          <a:ln>
+            <a:solidFill>
+              <a:schemeClr val="tx1"/>
+            </a:solidFill>
+          </a:ln>
+        </p:spPr>
+        <p:txBody>
+          <a:bodyPr wrap="none" rtlCol="0">
+            <a:spAutoFit/>
+          </a:bodyPr>
+          <a:lstStyle/>
+          <a:p>
+            <a:r>
+              <a:rPr lang="en-US" sz="3200" dirty="0" smtClean="0"/>
+              <a:t>Still not portable!</a:t>
+            </a:r>
+            <a:endParaRPr lang="nl-BE" sz="3200" dirty="0"/>
+          </a:p>
+        </p:txBody>
+      </p:sp>
+      <p:pic>
+        <p:nvPicPr>
+          <p:cNvPr id="7" name="Picture 2" descr="C:\Users\lucg5005\AppData\Local\Microsoft\Windows\Temporary Internet Files\Content.IE5\CWZUAEH4\lgi01a201309290600[1].jpg"/>
+          <p:cNvPicPr>
+            <a:picLocks noChangeAspect="1" noChangeArrowheads="1"/>
+          </p:cNvPicPr>
+          <p:nvPr/>
+        </p:nvPicPr>
+        <p:blipFill>
+          <a:blip r:embed="rId2" cstate="print">
+            <a:extLst>
+              <a:ext uri="{28A0092B-C50C-407E-A947-70E740481C1C}">
+                <a14:useLocalDpi xmlns:a14="http://schemas.microsoft.com/office/drawing/2010/main" val="0"/>
+              </a:ext>
+            </a:extLst>
+          </a:blip>
+          <a:srcRect/>
+          <a:stretch>
+            <a:fillRect/>
+          </a:stretch>
+        </p:blipFill>
+        <p:spPr bwMode="auto">
+          <a:xfrm>
+            <a:off x="7812360" y="2636912"/>
+            <a:ext cx="1152128" cy="1182158"/>
+          </a:xfrm>
+          <a:prstGeom prst="rect">
+            <a:avLst/>
+          </a:prstGeom>
+          <a:noFill/>
+          <a:extLst>
+            <a:ext uri="{909E8E84-426E-40DD-AFC4-6F175D3DCCD1}">
+              <a14:hiddenFill xmlns:a14="http://schemas.microsoft.com/office/drawing/2010/main">
+                <a:solidFill>
+                  <a:srgbClr val="FFFFFF"/>
+                </a:solidFill>
+              </a14:hiddenFill>
+            </a:ext>
+          </a:extLst>
+        </p:spPr>
+      </p:pic>
+    </p:spTree>
+    <p:extLst>
+      <p:ext uri="{BB962C8B-B14F-4D97-AF65-F5344CB8AC3E}">
+        <p14:creationId xmlns:p14="http://schemas.microsoft.com/office/powerpoint/2010/main" val="4159797861"/>
+      </p:ext>
+    </p:extLst>
+  </p:cSld>
+  <p:clrMapOvr>
+    <a:masterClrMapping/>
+  </p:clrMapOvr>
+</p:sld>
+</file>
+
+<file path=ppt/slides/slide9.xml><?xml version="1.0" encoding="utf-8"?>
+<p:sld xmlns:a="http://schemas.openxmlformats.org/drawingml/2006/main" xmlns:r="http://schemas.openxmlformats.org/officeDocument/2006/relationships" xmlns:p="http://schemas.openxmlformats.org/presentationml/2006/main">
+  <p:cSld>
+    <p:spTree>
+      <p:nvGrpSpPr>
+        <p:cNvPr id="1" name=""/>
+        <p:cNvGrpSpPr/>
+        <p:nvPr/>
+      </p:nvGrpSpPr>
+      <p:grpSpPr>
+        <a:xfrm>
+          <a:off x="0" y="0"/>
+          <a:ext cx="0" cy="0"/>
+          <a:chOff x="0" y="0"/>
+          <a:chExt cx="0" cy="0"/>
+        </a:xfrm>
+      </p:grpSpPr>
+      <p:sp>
+        <p:nvSpPr>
+          <p:cNvPr id="2" name="Title 1"/>
+          <p:cNvSpPr>
+            <a:spLocks noGrp="1"/>
+          </p:cNvSpPr>
+          <p:nvPr>
+            <p:ph type="title"/>
+          </p:nvPr>
+        </p:nvSpPr>
+        <p:spPr/>
+        <p:txBody>
+          <a:bodyPr/>
+          <a:lstStyle/>
+          <a:p>
+            <a:r>
+              <a:rPr lang="en-US" dirty="0" smtClean="0"/>
+              <a:t>Platform independence</a:t>
+            </a:r>
+            <a:endParaRPr lang="nl-BE" dirty="0"/>
+          </a:p>
+        </p:txBody>
+      </p:sp>
+      <p:sp>
+        <p:nvSpPr>
+          <p:cNvPr id="3" name="Content Placeholder 2"/>
+          <p:cNvSpPr>
+            <a:spLocks noGrp="1"/>
+          </p:cNvSpPr>
+          <p:nvPr>
+            <p:ph idx="1"/>
+          </p:nvPr>
+        </p:nvSpPr>
+        <p:spPr/>
+        <p:txBody>
+          <a:bodyPr/>
+          <a:lstStyle/>
+          <a:p>
+            <a:r>
+              <a:rPr lang="en-US" dirty="0" smtClean="0"/>
+              <a:t>Use</a:t>
+            </a:r>
+          </a:p>
+          <a:p>
+            <a:pPr lvl="1"/>
+            <a:r>
+              <a:rPr lang="en-US" dirty="0" smtClean="0"/>
+              <a:t>SELECT_INT_KIND(r=…)</a:t>
+            </a:r>
+          </a:p>
+          <a:p>
+            <a:pPr lvl="1"/>
+            <a:r>
+              <a:rPr lang="en-US" dirty="0" smtClean="0"/>
+              <a:t>SELECT_REAL_KIND(p=…, r=…)</a:t>
+            </a:r>
+          </a:p>
+          <a:p>
+            <a:r>
+              <a:rPr lang="en-US" dirty="0" smtClean="0"/>
+              <a:t>Example</a:t>
+            </a:r>
+          </a:p>
+        </p:txBody>
+      </p:sp>
+      <p:sp>
+        <p:nvSpPr>
+          <p:cNvPr id="4" name="TextBox 3"/>
+          <p:cNvSpPr txBox="1"/>
+          <p:nvPr/>
+        </p:nvSpPr>
+        <p:spPr>
+          <a:xfrm>
+            <a:off x="2483768" y="3429000"/>
+            <a:ext cx="6120680" cy="3293209"/>
+          </a:xfrm>
+          <a:prstGeom prst="rect">
+            <a:avLst/>
+          </a:prstGeom>
+          <a:solidFill>
+            <a:schemeClr val="accent1">
+              <a:lumMod val="40000"/>
+              <a:lumOff val="60000"/>
+            </a:schemeClr>
+          </a:solidFill>
+        </p:spPr>
+        <p:txBody>
+          <a:bodyPr wrap="square" rtlCol="0">
+            <a:spAutoFit/>
+          </a:bodyPr>
+          <a:lstStyle/>
+          <a:p>
+            <a:r>
+              <a:rPr lang="en-US" sz="1600" dirty="0" smtClean="0"/>
+              <a:t>…</a:t>
+            </a:r>
+          </a:p>
+          <a:p>
+            <a:r>
+              <a:rPr lang="en-US" sz="1600" dirty="0" smtClean="0"/>
+              <a:t>INTEGER</a:t>
+            </a:r>
+            <a:r>
+              <a:rPr lang="en-US" sz="1600" dirty="0" smtClean="0"/>
+              <a:t>, PARAMETER :: </a:t>
             </a:r>
             <a:r>
               <a:rPr lang="en-US" sz="1600" dirty="0" err="1" smtClean="0"/>
@@ -4037,13 +7566,22 @@
             </a:r>
             <a:r>
               <a:rPr lang="en-US" sz="1600" dirty="0" smtClean="0"/>
-              <a:t> = SELECTED_REAL_KIND(p=6, r=30), &amp;</a:t>
-            </a:r>
+              <a:t> = SELECTED_REAL_KIND(p=6, r=30), </a:t>
+            </a:r>
+            <a:r>
+              <a:rPr lang="en-US" sz="1600" dirty="0" smtClean="0"/>
+              <a:t>         &amp;</a:t>
+            </a:r>
+            <a:endParaRPr lang="en-US" sz="1600" dirty="0" smtClean="0"/>
           </a:p>
           <a:p>
             <a:r>
               <a:rPr lang="en-US" sz="1600" dirty="0" smtClean="0"/>
               <a:t>                                           </a:t>
+            </a:r>
+            <a:r>
+              <a:rPr lang="en-US" sz="1600" dirty="0" smtClean="0"/>
+              <a:t> </a:t>
             </a:r>
             <a:r>
               <a:rPr lang="en-US" sz="1600" dirty="0" err="1" smtClean="0"/>
@@ -4051,21 +7589,26 @@
             </a:r>
             <a:r>
               <a:rPr lang="en-US" sz="1600" dirty="0" smtClean="0"/>
-              <a:t> = </a:t>
-            </a:r>
-            <a:r>
-              <a:rPr lang="en-US" sz="1600" dirty="0" smtClean="0"/>
-              <a:t>SELECTED_REAL_KIND </a:t>
-            </a:r>
-            <a:r>
-              <a:rPr lang="en-US" sz="1600" dirty="0" smtClean="0"/>
-              <a:t>(p=12, r=100), &amp;</a:t>
-            </a:r>
+              <a:t> </a:t>
+            </a:r>
+            <a:r>
+              <a:rPr lang="en-US" sz="1600" dirty="0" smtClean="0"/>
+              <a:t>= SELECTED_REAL_KIND (p=12, r=100), </a:t>
+            </a:r>
+            <a:r>
+              <a:rPr lang="en-US" sz="1600" dirty="0" smtClean="0"/>
+              <a:t>   &amp;</a:t>
+            </a:r>
+            <a:endParaRPr lang="en-US" sz="1600" dirty="0" smtClean="0"/>
           </a:p>
           <a:p>
             <a:r>
               <a:rPr lang="en-US" sz="1600" dirty="0" smtClean="0"/>
               <a:t>                                           </a:t>
+            </a:r>
+            <a:r>
+              <a:rPr lang="en-US" sz="1600" dirty="0" smtClean="0"/>
+              <a:t> </a:t>
             </a:r>
             <a:r>
               <a:rPr lang="en-US" sz="1600" dirty="0" err="1" smtClean="0"/>
@@ -4073,29 +7616,30 @@
             </a:r>
             <a:r>
               <a:rPr lang="en-US" sz="1600" dirty="0" smtClean="0"/>
-              <a:t> = </a:t>
-            </a:r>
-            <a:r>
-              <a:rPr lang="en-US" sz="1600" dirty="0" smtClean="0"/>
-              <a:t>SELECTED_INT_KIND</a:t>
-            </a:r>
-            <a:r>
-              <a:rPr lang="en-US" sz="1600" dirty="0" smtClean="0"/>
-              <a:t> (r=8), &amp;</a:t>
-            </a:r>
-          </a:p>
-          <a:p>
-            <a:r>
-              <a:rPr lang="en-US" sz="1600" dirty="0" smtClean="0"/>
-              <a:t>                                           long = </a:t>
-            </a:r>
-            <a:r>
-              <a:rPr lang="en-US" sz="1600" dirty="0" smtClean="0"/>
-              <a:t>SELECTED_INT_KIND(r=20</a:t>
-            </a:r>
-            <a:r>
-              <a:rPr lang="en-US" sz="1600" dirty="0" smtClean="0"/>
-              <a:t>)</a:t>
+              <a:t> </a:t>
+            </a:r>
+            <a:r>
+              <a:rPr lang="en-US" sz="1600" dirty="0" smtClean="0"/>
+              <a:t>= SELECTED_INT_KIND (r=8), </a:t>
+            </a:r>
+            <a:r>
+              <a:rPr lang="en-US" sz="1600" dirty="0" smtClean="0"/>
+              <a:t>                     &amp;</a:t>
+            </a:r>
+            <a:endParaRPr lang="en-US" sz="1600" dirty="0" smtClean="0"/>
+          </a:p>
+          <a:p>
+            <a:r>
+              <a:rPr lang="en-US" sz="1600" dirty="0" smtClean="0"/>
+              <a:t>                                           </a:t>
+            </a:r>
+            <a:r>
+              <a:rPr lang="en-US" sz="1600" dirty="0" smtClean="0"/>
+              <a:t> long </a:t>
+            </a:r>
+            <a:r>
+              <a:rPr lang="en-US" sz="1600" dirty="0" smtClean="0"/>
+              <a:t>= SELECTED_INT_KIND(r=20)</a:t>
             </a:r>
           </a:p>
           <a:p>
@@ -4104,26 +7648,56 @@
               <a:t>REAL(KIND=</a:t>
             </a:r>
             <a:r>
+              <a:rPr lang="en-US" sz="1600" b="1" dirty="0" err="1" smtClean="0">
+                <a:solidFill>
+                  <a:srgbClr val="C00000"/>
+                </a:solidFill>
+              </a:rPr>
+              <a:t>sp</a:t>
+            </a:r>
+            <a:r>
+              <a:rPr lang="en-US" sz="1600" dirty="0" smtClean="0"/>
+              <a:t>) :: x</a:t>
+            </a:r>
+          </a:p>
+          <a:p>
+            <a:r>
+              <a:rPr lang="en-US" sz="1600" dirty="0" smtClean="0"/>
+              <a:t>REAL(KIND=</a:t>
+            </a:r>
+            <a:r>
+              <a:rPr lang="en-US" sz="1600" b="1" dirty="0" err="1" smtClean="0">
+                <a:solidFill>
+                  <a:srgbClr val="C00000"/>
+                </a:solidFill>
+              </a:rPr>
+              <a:t>dp</a:t>
+            </a:r>
+            <a:r>
+              <a:rPr lang="en-US" sz="1600" dirty="0" smtClean="0"/>
+              <a:t>) :: y</a:t>
+            </a:r>
+          </a:p>
+          <a:p>
+            <a:r>
+              <a:rPr lang="en-US" sz="1600" dirty="0" smtClean="0"/>
+              <a:t>INTEGER(KIND=</a:t>
+            </a:r>
+            <a:r>
+              <a:rPr lang="en-US" sz="1600" b="1" dirty="0" err="1" smtClean="0">
+                <a:solidFill>
+                  <a:srgbClr val="C00000"/>
+                </a:solidFill>
+              </a:rPr>
+              <a:t>in</a:t>
+            </a:r>
+            <a:r>
               <a:rPr lang="en-US" sz="1600" dirty="0" err="1" smtClean="0"/>
-              <a:t>sp</a:t>
-            </a:r>
-            <a:r>
-              <a:rPr lang="en-US" sz="1600" dirty="0" smtClean="0"/>
-              <a:t>) :: x</a:t>
-            </a:r>
-          </a:p>
-          <a:p>
-            <a:r>
-              <a:rPr lang="en-US" sz="1600" dirty="0" smtClean="0"/>
-              <a:t>REAL(KIND=</a:t>
-            </a:r>
-            <a:r>
-              <a:rPr lang="en-US" sz="1600" dirty="0" err="1" smtClean="0"/>
-              <a:t>dp</a:t>
-            </a:r>
-            <a:r>
-              <a:rPr lang="en-US" sz="1600" dirty="0" smtClean="0"/>
-              <a:t>) :: y</a:t>
+              <a:t>t</a:t>
+            </a:r>
+            <a:r>
+              <a:rPr lang="en-US" sz="1600" dirty="0" smtClean="0"/>
+              <a:t>) :: m</a:t>
             </a:r>
           </a:p>
           <a:p>
@@ -4132,20 +7706,17 @@
               <a:t>INTEGER(KIND=</a:t>
             </a:r>
             <a:r>
-              <a:rPr lang="en-US" sz="1600" dirty="0" err="1" smtClean="0"/>
-              <a:t>int</a:t>
-            </a:r>
-            <a:r>
-              <a:rPr lang="en-US" sz="1600" dirty="0" smtClean="0"/>
-              <a:t>) :: m</a:t>
-            </a:r>
-          </a:p>
-          <a:p>
-            <a:r>
-              <a:rPr lang="en-US" sz="1600" dirty="0" smtClean="0"/>
-              <a:t>INTEGER(KIND=long) :: n</a:t>
-            </a:r>
-            <a:endParaRPr lang="en-US" sz="1600" dirty="0" smtClean="0"/>
+              <a:rPr lang="en-US" sz="1600" b="1" dirty="0" smtClean="0">
+                <a:solidFill>
+                  <a:srgbClr val="C00000"/>
+                </a:solidFill>
+              </a:rPr>
+              <a:t>long</a:t>
+            </a:r>
+            <a:r>
+              <a:rPr lang="en-US" sz="1600" dirty="0" smtClean="0"/>
+              <a:t>) :: n</a:t>
+            </a:r>
           </a:p>
           <a:p>
             <a:endParaRPr lang="en-US" sz="1600" dirty="0" smtClean="0"/>
@@ -4191,7 +7762,11 @@
             </a:r>
             <a:r>
               <a:rPr lang="en-US" sz="1600" dirty="0" smtClean="0"/>
-              <a:t>**40</a:t>
+              <a:t>**</a:t>
+            </a:r>
+            <a:r>
+              <a:rPr lang="en-US" sz="1600" dirty="0" smtClean="0"/>
+              <a:t>40</a:t>
             </a:r>
             <a:r>
               <a:rPr lang="en-US" sz="1600" b="1" dirty="0" smtClean="0">
@@ -4205,6 +7780,13 @@
               <a:rPr lang="en-US" sz="1600" dirty="0" smtClean="0"/>
               <a:t>g</a:t>
             </a:r>
+          </a:p>
+          <a:p>
+            <a:r>
+              <a:rPr lang="en-US" sz="1600" dirty="0" smtClean="0"/>
+              <a:t>…</a:t>
+            </a:r>
+            <a:endParaRPr lang="en-US" sz="1600" dirty="0" smtClean="0"/>
           </a:p>
         </p:txBody>
       </p:sp>
@@ -4268,8 +7850,8 @@
             </a:p>
           </p:txBody>
         </p:sp>
-        <mc:AlternateContent xmlns:mc="http://schemas.openxmlformats.org/markup-compatibility/2006">
-          <mc:Choice xmlns:a14="http://schemas.microsoft.com/office/drawing/2010/main" Requires="a14">
+        <mc:AlternateContent xmlns:mc="http://schemas.openxmlformats.org/markup-compatibility/2006" xmlns:a14="http://schemas.microsoft.com/office/drawing/2010/main">
+          <mc:Choice Requires="a14">
             <p:sp>
               <p:nvSpPr>
                 <p:cNvPr id="6" name="TextBox 5"/>
@@ -4352,7 +7934,7 @@
               </p:txBody>
             </p:sp>
           </mc:Choice>
-          <mc:Fallback>
+          <mc:Fallback xmlns="">
             <p:sp>
               <p:nvSpPr>
                 <p:cNvPr id="6" name="TextBox 5"/>
@@ -4496,8 +8078,8 @@
             </a:p>
           </p:txBody>
         </p:sp>
-        <mc:AlternateContent xmlns:mc="http://schemas.openxmlformats.org/markup-compatibility/2006">
-          <mc:Choice xmlns:a14="http://schemas.microsoft.com/office/drawing/2010/main" Requires="a14">
+        <mc:AlternateContent xmlns:mc="http://schemas.openxmlformats.org/markup-compatibility/2006" xmlns:a14="http://schemas.microsoft.com/office/drawing/2010/main">
+          <mc:Choice Requires="a14">
             <p:sp>
               <p:nvSpPr>
                 <p:cNvPr id="12" name="TextBox 11"/>
@@ -4596,7 +8178,7 @@
               </p:txBody>
             </p:sp>
           </mc:Choice>
-          <mc:Fallback>
+          <mc:Fallback xmlns="">
             <p:sp>
               <p:nvSpPr>
                 <p:cNvPr id="12" name="TextBox 11"/>

</xml_diff>

<commit_message>
Added named block constructs
</commit_message>
<xml_diff>
--- a/Fortran/modern_fortran.pptx
+++ b/Fortran/modern_fortran.pptx
@@ -21,6 +21,9 @@
     <p:sldId id="269" r:id="rId15"/>
     <p:sldId id="270" r:id="rId16"/>
     <p:sldId id="271" r:id="rId17"/>
+    <p:sldId id="272" r:id="rId18"/>
+    <p:sldId id="273" r:id="rId19"/>
+    <p:sldId id="274" r:id="rId20"/>
   </p:sldIdLst>
   <p:sldSz cx="9144000" cy="6858000" type="screen4x3"/>
   <p:notesSz cx="6858000" cy="9144000"/>
@@ -119,6 +122,55 @@
       </a:defRPr>
     </a:lvl9pPr>
   </p:defaultTextStyle>
+  <p:extLst>
+    <p:ext uri="{521415D9-36F7-43E2-AB2F-B90AF26B5E84}">
+      <p14:sectionLst xmlns:p14="http://schemas.microsoft.com/office/powerpoint/2010/main">
+        <p14:section name="Default Section" id="{88D5C32D-C882-4855-A7E5-DA147226032A}">
+          <p14:sldIdLst>
+            <p14:sldId id="256"/>
+          </p14:sldIdLst>
+        </p14:section>
+        <p14:section name="Introduction" id="{1112C0AE-9B9B-41AD-B3C6-EC8FBEA857D8}">
+          <p14:sldIdLst>
+            <p14:sldId id="264"/>
+          </p14:sldIdLst>
+        </p14:section>
+        <p14:section name="Code format" id="{BF7D4BFB-70F5-4DE3-9D4A-ED3AA373D039}">
+          <p14:sldIdLst>
+            <p14:sldId id="262"/>
+            <p14:sldId id="263"/>
+          </p14:sldIdLst>
+        </p14:section>
+        <p14:section name="Data types" id="{C0548B1B-EE37-4A1C-9D9E-1DEA2E3D3D68}">
+          <p14:sldIdLst>
+            <p14:sldId id="257"/>
+            <p14:sldId id="259"/>
+            <p14:sldId id="260"/>
+            <p14:sldId id="258"/>
+            <p14:sldId id="261"/>
+          </p14:sldIdLst>
+        </p14:section>
+        <p14:section name="Control constructs" id="{7E7A2D90-FD40-47E4-AEE7-C8E6CB3DCF9A}">
+          <p14:sldIdLst>
+            <p14:sldId id="265"/>
+            <p14:sldId id="266"/>
+            <p14:sldId id="268"/>
+            <p14:sldId id="267"/>
+            <p14:sldId id="269"/>
+            <p14:sldId id="270"/>
+            <p14:sldId id="271"/>
+            <p14:sldId id="272"/>
+          </p14:sldIdLst>
+        </p14:section>
+        <p14:section name="Arrays" id="{24789801-8C63-4D70-9021-C1DB6DF40FAB}">
+          <p14:sldIdLst>
+            <p14:sldId id="273"/>
+            <p14:sldId id="274"/>
+          </p14:sldIdLst>
+        </p14:section>
+      </p14:sectionLst>
+    </p:ext>
+  </p:extLst>
 </p:presentation>
 </file>
 
@@ -303,7 +355,7 @@
           <a:p>
             <a:fld id="{3727626D-DB64-4BA0-82BA-59C29F46B0C7}" type="datetimeFigureOut">
               <a:rPr lang="nl-BE" smtClean="0"/>
-              <a:t>26/03/2015</a:t>
+              <a:t>27/03/2015</a:t>
             </a:fld>
             <a:endParaRPr lang="nl-BE"/>
           </a:p>
@@ -473,7 +525,7 @@
           <a:p>
             <a:fld id="{3727626D-DB64-4BA0-82BA-59C29F46B0C7}" type="datetimeFigureOut">
               <a:rPr lang="nl-BE" smtClean="0"/>
-              <a:t>26/03/2015</a:t>
+              <a:t>27/03/2015</a:t>
             </a:fld>
             <a:endParaRPr lang="nl-BE"/>
           </a:p>
@@ -653,7 +705,7 @@
           <a:p>
             <a:fld id="{3727626D-DB64-4BA0-82BA-59C29F46B0C7}" type="datetimeFigureOut">
               <a:rPr lang="nl-BE" smtClean="0"/>
-              <a:t>26/03/2015</a:t>
+              <a:t>27/03/2015</a:t>
             </a:fld>
             <a:endParaRPr lang="nl-BE"/>
           </a:p>
@@ -823,7 +875,7 @@
           <a:p>
             <a:fld id="{3727626D-DB64-4BA0-82BA-59C29F46B0C7}" type="datetimeFigureOut">
               <a:rPr lang="nl-BE" smtClean="0"/>
-              <a:t>26/03/2015</a:t>
+              <a:t>27/03/2015</a:t>
             </a:fld>
             <a:endParaRPr lang="nl-BE"/>
           </a:p>
@@ -1069,7 +1121,7 @@
           <a:p>
             <a:fld id="{3727626D-DB64-4BA0-82BA-59C29F46B0C7}" type="datetimeFigureOut">
               <a:rPr lang="nl-BE" smtClean="0"/>
-              <a:t>26/03/2015</a:t>
+              <a:t>27/03/2015</a:t>
             </a:fld>
             <a:endParaRPr lang="nl-BE"/>
           </a:p>
@@ -1357,7 +1409,7 @@
           <a:p>
             <a:fld id="{3727626D-DB64-4BA0-82BA-59C29F46B0C7}" type="datetimeFigureOut">
               <a:rPr lang="nl-BE" smtClean="0"/>
-              <a:t>26/03/2015</a:t>
+              <a:t>27/03/2015</a:t>
             </a:fld>
             <a:endParaRPr lang="nl-BE"/>
           </a:p>
@@ -1779,7 +1831,7 @@
           <a:p>
             <a:fld id="{3727626D-DB64-4BA0-82BA-59C29F46B0C7}" type="datetimeFigureOut">
               <a:rPr lang="nl-BE" smtClean="0"/>
-              <a:t>26/03/2015</a:t>
+              <a:t>27/03/2015</a:t>
             </a:fld>
             <a:endParaRPr lang="nl-BE"/>
           </a:p>
@@ -1897,7 +1949,7 @@
           <a:p>
             <a:fld id="{3727626D-DB64-4BA0-82BA-59C29F46B0C7}" type="datetimeFigureOut">
               <a:rPr lang="nl-BE" smtClean="0"/>
-              <a:t>26/03/2015</a:t>
+              <a:t>27/03/2015</a:t>
             </a:fld>
             <a:endParaRPr lang="nl-BE"/>
           </a:p>
@@ -1992,7 +2044,7 @@
           <a:p>
             <a:fld id="{3727626D-DB64-4BA0-82BA-59C29F46B0C7}" type="datetimeFigureOut">
               <a:rPr lang="nl-BE" smtClean="0"/>
-              <a:t>26/03/2015</a:t>
+              <a:t>27/03/2015</a:t>
             </a:fld>
             <a:endParaRPr lang="nl-BE"/>
           </a:p>
@@ -2269,7 +2321,7 @@
           <a:p>
             <a:fld id="{3727626D-DB64-4BA0-82BA-59C29F46B0C7}" type="datetimeFigureOut">
               <a:rPr lang="nl-BE" smtClean="0"/>
-              <a:t>26/03/2015</a:t>
+              <a:t>27/03/2015</a:t>
             </a:fld>
             <a:endParaRPr lang="nl-BE"/>
           </a:p>
@@ -2522,7 +2574,7 @@
           <a:p>
             <a:fld id="{3727626D-DB64-4BA0-82BA-59C29F46B0C7}" type="datetimeFigureOut">
               <a:rPr lang="nl-BE" smtClean="0"/>
-              <a:t>26/03/2015</a:t>
+              <a:t>27/03/2015</a:t>
             </a:fld>
             <a:endParaRPr lang="nl-BE"/>
           </a:p>
@@ -2735,7 +2787,7 @@
           <a:p>
             <a:fld id="{3727626D-DB64-4BA0-82BA-59C29F46B0C7}" type="datetimeFigureOut">
               <a:rPr lang="nl-BE" smtClean="0"/>
-              <a:t>26/03/2015</a:t>
+              <a:t>27/03/2015</a:t>
             </a:fld>
             <a:endParaRPr lang="nl-BE"/>
           </a:p>
@@ -3211,7 +3263,11 @@
           <a:p>
             <a:r>
               <a:rPr lang="en-US" dirty="0" smtClean="0"/>
-              <a:t>Control statements</a:t>
+              <a:t>Control </a:t>
+            </a:r>
+            <a:r>
+              <a:rPr lang="en-US" dirty="0" smtClean="0"/>
+              <a:t>constructs</a:t>
             </a:r>
             <a:endParaRPr lang="nl-BE" dirty="0"/>
           </a:p>
@@ -3324,7 +3380,11 @@
           <a:p>
             <a:r>
               <a:rPr lang="en-US" dirty="0" smtClean="0"/>
-              <a:t>if statement</a:t>
+              <a:t>logical if </a:t>
+            </a:r>
+            <a:r>
+              <a:rPr lang="en-US" dirty="0" smtClean="0"/>
+              <a:t>statement</a:t>
             </a:r>
             <a:endParaRPr lang="nl-BE" dirty="0"/>
           </a:p>
@@ -3402,7 +3462,6 @@
               <a:rPr lang="en-US" sz="1600" dirty="0" smtClean="0"/>
               <a:t>…</a:t>
             </a:r>
-            <a:endParaRPr lang="en-US" sz="1600" dirty="0" smtClean="0"/>
           </a:p>
         </p:txBody>
       </p:sp>
@@ -3415,9 +3474,9 @@
         <p:grpSpPr>
           <a:xfrm>
             <a:off x="1259632" y="1774557"/>
-            <a:ext cx="5328592" cy="1006371"/>
+            <a:ext cx="5138412" cy="1006371"/>
             <a:chOff x="2843808" y="1865002"/>
-            <a:chExt cx="5328592" cy="1006371"/>
+            <a:chExt cx="5138412" cy="1006371"/>
           </a:xfrm>
         </p:grpSpPr>
         <p:sp>
@@ -3475,7 +3534,7 @@
           <p:spPr>
             <a:xfrm>
               <a:off x="5865935" y="1865002"/>
-              <a:ext cx="2306465" cy="646331"/>
+              <a:ext cx="2116285" cy="646331"/>
             </a:xfrm>
             <a:prstGeom prst="rect">
               <a:avLst/>
@@ -3496,8 +3555,8 @@
             <a:lstStyle/>
             <a:p>
               <a:r>
-                <a:rPr lang="en-US" dirty="0"/>
-                <a:t>comparison operators</a:t>
+                <a:rPr lang="en-US" dirty="0" smtClean="0"/>
+                <a:t>relational operators</a:t>
               </a:r>
               <a:r>
                 <a:rPr lang="en-US" dirty="0" smtClean="0"/>
@@ -3650,11 +3709,7 @@
           <a:p>
             <a:r>
               <a:rPr lang="en-US" sz="1600" dirty="0" smtClean="0"/>
-              <a:t>IF (x &gt; 10.0) </a:t>
-            </a:r>
-            <a:r>
-              <a:rPr lang="en-US" sz="1600" dirty="0" smtClean="0"/>
-              <a:t> …</a:t>
+              <a:t>IF (x &gt; 10.0)  …</a:t>
             </a:r>
             <a:endParaRPr lang="en-US" sz="1600" dirty="0"/>
           </a:p>
@@ -3663,7 +3718,6 @@
               <a:rPr lang="en-US" sz="1600" dirty="0" smtClean="0"/>
               <a:t>…</a:t>
             </a:r>
-            <a:endParaRPr lang="en-US" sz="1600" dirty="0" smtClean="0"/>
           </a:p>
         </p:txBody>
       </p:sp>
@@ -4556,7 +4610,6 @@
               <a:rPr lang="en-US" sz="1600" dirty="0" smtClean="0"/>
               <a:t> = .TRUE.</a:t>
             </a:r>
-            <a:endParaRPr lang="en-US" sz="1600" dirty="0" smtClean="0"/>
           </a:p>
           <a:p>
             <a:r>
@@ -4569,7 +4622,6 @@
               <a:rPr lang="en-US" sz="1600" dirty="0" smtClean="0"/>
               <a:t>…</a:t>
             </a:r>
-            <a:endParaRPr lang="en-US" sz="1600" dirty="0" smtClean="0"/>
           </a:p>
         </p:txBody>
       </p:sp>
@@ -5123,6 +5175,47 @@
           </p:style>
         </p:cxnSp>
       </p:grpSp>
+      <p:pic>
+        <p:nvPicPr>
+          <p:cNvPr id="13" name="Picture 2" descr="C:\Users\lucg5005\AppData\Local\Microsoft\Windows\Temporary Internet Files\Content.IE5\CWZUAEH4\lgi01a201309290600[1].jpg"/>
+          <p:cNvPicPr>
+            <a:picLocks noChangeAspect="1" noChangeArrowheads="1"/>
+          </p:cNvPicPr>
+          <p:nvPr/>
+        </p:nvPicPr>
+        <p:blipFill>
+          <a:blip r:embed="rId2" cstate="print">
+            <a:extLst>
+              <a:ext uri="{28A0092B-C50C-407E-A947-70E740481C1C}">
+                <a14:useLocalDpi xmlns:a14="http://schemas.microsoft.com/office/drawing/2010/main" val="0"/>
+              </a:ext>
+            </a:extLst>
+          </a:blip>
+          <a:srcRect/>
+          <a:stretch>
+            <a:fillRect/>
+          </a:stretch>
+        </p:blipFill>
+        <p:spPr bwMode="auto">
+          <a:xfrm>
+            <a:off x="7020272" y="4509120"/>
+            <a:ext cx="1152128" cy="1182158"/>
+          </a:xfrm>
+          <a:prstGeom prst="rect">
+            <a:avLst/>
+          </a:prstGeom>
+          <a:noFill/>
+          <a:extLst>
+            <a:ext uri="{909E8E84-426E-40DD-AFC4-6F175D3DCCD1}">
+              <a14:hiddenFill xmlns:a14="http://schemas.microsoft.com/office/drawing/2010/main">
+                <a:solidFill>
+                  <a:srgbClr val="FFFFFF"/>
+                </a:solidFill>
+              </a14:hiddenFill>
+            </a:ext>
+          </a:extLst>
+        </p:spPr>
+      </p:pic>
     </p:spTree>
     <p:extLst>
       <p:ext uri="{BB962C8B-B14F-4D97-AF65-F5344CB8AC3E}">
@@ -5707,10 +5800,716 @@
           </a:p>
         </p:txBody>
       </p:sp>
+      <p:sp>
+        <p:nvSpPr>
+          <p:cNvPr id="7" name="TextBox 6"/>
+          <p:cNvSpPr txBox="1"/>
+          <p:nvPr/>
+        </p:nvSpPr>
+        <p:spPr>
+          <a:xfrm>
+            <a:off x="5148064" y="3573016"/>
+            <a:ext cx="3740896" cy="830997"/>
+          </a:xfrm>
+          <a:prstGeom prst="rect">
+            <a:avLst/>
+          </a:prstGeom>
+          <a:solidFill>
+            <a:schemeClr val="bg1"/>
+          </a:solidFill>
+          <a:ln>
+            <a:solidFill>
+              <a:schemeClr val="tx1"/>
+            </a:solidFill>
+          </a:ln>
+        </p:spPr>
+        <p:txBody>
+          <a:bodyPr wrap="none" rtlCol="0">
+            <a:spAutoFit/>
+          </a:bodyPr>
+          <a:lstStyle/>
+          <a:p>
+            <a:r>
+              <a:rPr lang="en-US" sz="2400" dirty="0" smtClean="0"/>
+              <a:t>Execution order of iterations</a:t>
+            </a:r>
+            <a:br>
+              <a:rPr lang="en-US" sz="2400" dirty="0" smtClean="0"/>
+            </a:br>
+            <a:r>
+              <a:rPr lang="en-US" sz="2400" dirty="0" err="1" smtClean="0"/>
+              <a:t>detemined</a:t>
+            </a:r>
+            <a:r>
+              <a:rPr lang="en-US" sz="2400" dirty="0" smtClean="0"/>
+              <a:t> by compiler</a:t>
+            </a:r>
+            <a:endParaRPr lang="nl-BE" sz="2400" dirty="0"/>
+          </a:p>
+        </p:txBody>
+      </p:sp>
+      <p:pic>
+        <p:nvPicPr>
+          <p:cNvPr id="8" name="Picture 5" descr="C:\Users\lucg5005\AppData\Local\Microsoft\Windows\Temporary Internet Files\Content.IE5\T8RCCH8G\thumb-up-silhouette[1].jpg"/>
+          <p:cNvPicPr>
+            <a:picLocks noChangeAspect="1" noChangeArrowheads="1"/>
+          </p:cNvPicPr>
+          <p:nvPr/>
+        </p:nvPicPr>
+        <p:blipFill>
+          <a:blip r:embed="rId2" cstate="print">
+            <a:extLst>
+              <a:ext uri="{28A0092B-C50C-407E-A947-70E740481C1C}">
+                <a14:useLocalDpi xmlns:a14="http://schemas.microsoft.com/office/drawing/2010/main" val="0"/>
+              </a:ext>
+            </a:extLst>
+          </a:blip>
+          <a:srcRect/>
+          <a:stretch>
+            <a:fillRect/>
+          </a:stretch>
+        </p:blipFill>
+        <p:spPr bwMode="auto">
+          <a:xfrm>
+            <a:off x="7335688" y="4608512"/>
+            <a:ext cx="1124744" cy="1124744"/>
+          </a:xfrm>
+          <a:prstGeom prst="rect">
+            <a:avLst/>
+          </a:prstGeom>
+          <a:noFill/>
+          <a:extLst>
+            <a:ext uri="{909E8E84-426E-40DD-AFC4-6F175D3DCCD1}">
+              <a14:hiddenFill xmlns:a14="http://schemas.microsoft.com/office/drawing/2010/main">
+                <a:solidFill>
+                  <a:srgbClr val="FFFFFF"/>
+                </a:solidFill>
+              </a14:hiddenFill>
+            </a:ext>
+          </a:extLst>
+        </p:spPr>
+      </p:pic>
     </p:spTree>
     <p:extLst>
       <p:ext uri="{BB962C8B-B14F-4D97-AF65-F5344CB8AC3E}">
         <p14:creationId xmlns:p14="http://schemas.microsoft.com/office/powerpoint/2010/main" val="2128293473"/>
+      </p:ext>
+    </p:extLst>
+  </p:cSld>
+  <p:clrMapOvr>
+    <a:masterClrMapping/>
+  </p:clrMapOvr>
+</p:sld>
+</file>
+
+<file path=ppt/slides/slide17.xml><?xml version="1.0" encoding="utf-8"?>
+<p:sld xmlns:a="http://schemas.openxmlformats.org/drawingml/2006/main" xmlns:r="http://schemas.openxmlformats.org/officeDocument/2006/relationships" xmlns:p="http://schemas.openxmlformats.org/presentationml/2006/main">
+  <p:cSld>
+    <p:spTree>
+      <p:nvGrpSpPr>
+        <p:cNvPr id="1" name=""/>
+        <p:cNvGrpSpPr/>
+        <p:nvPr/>
+      </p:nvGrpSpPr>
+      <p:grpSpPr>
+        <a:xfrm>
+          <a:off x="0" y="0"/>
+          <a:ext cx="0" cy="0"/>
+          <a:chOff x="0" y="0"/>
+          <a:chExt cx="0" cy="0"/>
+        </a:xfrm>
+      </p:grpSpPr>
+      <p:sp>
+        <p:nvSpPr>
+          <p:cNvPr id="2" name="Title 1"/>
+          <p:cNvSpPr>
+            <a:spLocks noGrp="1"/>
+          </p:cNvSpPr>
+          <p:nvPr>
+            <p:ph type="title"/>
+          </p:nvPr>
+        </p:nvSpPr>
+        <p:spPr/>
+        <p:txBody>
+          <a:bodyPr/>
+          <a:lstStyle/>
+          <a:p>
+            <a:r>
+              <a:rPr lang="en-US" dirty="0" smtClean="0"/>
+              <a:t>Named blocks</a:t>
+            </a:r>
+            <a:endParaRPr lang="nl-BE" dirty="0"/>
+          </a:p>
+        </p:txBody>
+      </p:sp>
+      <p:sp>
+        <p:nvSpPr>
+          <p:cNvPr id="3" name="Content Placeholder 2"/>
+          <p:cNvSpPr>
+            <a:spLocks noGrp="1"/>
+          </p:cNvSpPr>
+          <p:nvPr>
+            <p:ph idx="1"/>
+          </p:nvPr>
+        </p:nvSpPr>
+        <p:spPr/>
+        <p:txBody>
+          <a:bodyPr/>
+          <a:lstStyle/>
+          <a:p>
+            <a:r>
+              <a:rPr lang="en-US" dirty="0" smtClean="0"/>
+              <a:t>Improves code readability</a:t>
+            </a:r>
+          </a:p>
+          <a:p>
+            <a:r>
+              <a:rPr lang="en-US" dirty="0" smtClean="0"/>
+              <a:t>Helps compiler catch semantic mistakes</a:t>
+            </a:r>
+            <a:endParaRPr lang="nl-BE" dirty="0"/>
+          </a:p>
+        </p:txBody>
+      </p:sp>
+      <p:sp>
+        <p:nvSpPr>
+          <p:cNvPr id="4" name="TextBox 3"/>
+          <p:cNvSpPr txBox="1"/>
+          <p:nvPr/>
+        </p:nvSpPr>
+        <p:spPr>
+          <a:xfrm>
+            <a:off x="827584" y="3064892"/>
+            <a:ext cx="6120680" cy="2800767"/>
+          </a:xfrm>
+          <a:prstGeom prst="rect">
+            <a:avLst/>
+          </a:prstGeom>
+          <a:solidFill>
+            <a:schemeClr val="accent1">
+              <a:lumMod val="40000"/>
+              <a:lumOff val="60000"/>
+            </a:schemeClr>
+          </a:solidFill>
+        </p:spPr>
+        <p:txBody>
+          <a:bodyPr wrap="square" rtlCol="0">
+            <a:spAutoFit/>
+          </a:bodyPr>
+          <a:lstStyle/>
+          <a:p>
+            <a:r>
+              <a:rPr lang="en-US" sz="1600" dirty="0" smtClean="0"/>
+              <a:t>outer: DO j = 1, n</a:t>
+            </a:r>
+          </a:p>
+          <a:p>
+            <a:r>
+              <a:rPr lang="en-US" sz="1600" dirty="0"/>
+              <a:t> </a:t>
+            </a:r>
+            <a:r>
+              <a:rPr lang="en-US" sz="1600" dirty="0" smtClean="0"/>
+              <a:t>   …</a:t>
+            </a:r>
+          </a:p>
+          <a:p>
+            <a:r>
+              <a:rPr lang="en-US" sz="1600" dirty="0"/>
+              <a:t> </a:t>
+            </a:r>
+            <a:r>
+              <a:rPr lang="en-US" sz="1600" dirty="0" smtClean="0"/>
+              <a:t>   inner1: DO </a:t>
+            </a:r>
+            <a:r>
+              <a:rPr lang="en-US" sz="1600" dirty="0" err="1" smtClean="0"/>
+              <a:t>i</a:t>
+            </a:r>
+            <a:r>
+              <a:rPr lang="en-US" sz="1600" dirty="0" smtClean="0"/>
+              <a:t> = 1, m</a:t>
+            </a:r>
+          </a:p>
+          <a:p>
+            <a:r>
+              <a:rPr lang="en-US" sz="1600" dirty="0"/>
+              <a:t> </a:t>
+            </a:r>
+            <a:r>
+              <a:rPr lang="en-US" sz="1600" dirty="0" smtClean="0"/>
+              <a:t>       …</a:t>
+            </a:r>
+          </a:p>
+          <a:p>
+            <a:r>
+              <a:rPr lang="en-US" sz="1600" dirty="0"/>
+              <a:t> </a:t>
+            </a:r>
+            <a:r>
+              <a:rPr lang="en-US" sz="1600" dirty="0" smtClean="0"/>
+              <a:t>   END DO inner1</a:t>
+            </a:r>
+          </a:p>
+          <a:p>
+            <a:r>
+              <a:rPr lang="en-US" sz="1600" dirty="0"/>
+              <a:t> </a:t>
+            </a:r>
+            <a:r>
+              <a:rPr lang="en-US" sz="1600" dirty="0" smtClean="0"/>
+              <a:t>   …</a:t>
+            </a:r>
+          </a:p>
+          <a:p>
+            <a:r>
+              <a:rPr lang="en-US" sz="1600" dirty="0" smtClean="0"/>
+              <a:t>    inner2: </a:t>
+            </a:r>
+            <a:r>
+              <a:rPr lang="en-US" sz="1600" dirty="0"/>
+              <a:t>DO </a:t>
+            </a:r>
+            <a:r>
+              <a:rPr lang="en-US" sz="1600" dirty="0" err="1"/>
+              <a:t>i</a:t>
+            </a:r>
+            <a:r>
+              <a:rPr lang="en-US" sz="1600" dirty="0"/>
+              <a:t> = 1, m</a:t>
+            </a:r>
+          </a:p>
+          <a:p>
+            <a:r>
+              <a:rPr lang="en-US" sz="1600" dirty="0"/>
+              <a:t>        …</a:t>
+            </a:r>
+          </a:p>
+          <a:p>
+            <a:r>
+              <a:rPr lang="en-US" sz="1600" dirty="0"/>
+              <a:t>    END DO </a:t>
+            </a:r>
+            <a:r>
+              <a:rPr lang="en-US" sz="1600" dirty="0" smtClean="0"/>
+              <a:t>inner2</a:t>
+            </a:r>
+          </a:p>
+          <a:p>
+            <a:r>
+              <a:rPr lang="en-US" sz="1600" dirty="0"/>
+              <a:t> </a:t>
+            </a:r>
+            <a:r>
+              <a:rPr lang="en-US" sz="1600" dirty="0" smtClean="0"/>
+              <a:t>   …</a:t>
+            </a:r>
+          </a:p>
+          <a:p>
+            <a:r>
+              <a:rPr lang="en-US" sz="1600" dirty="0" smtClean="0"/>
+              <a:t>END DO outer</a:t>
+            </a:r>
+            <a:endParaRPr lang="en-US" sz="1600" dirty="0"/>
+          </a:p>
+        </p:txBody>
+      </p:sp>
+      <p:sp>
+        <p:nvSpPr>
+          <p:cNvPr id="5" name="TextBox 4"/>
+          <p:cNvSpPr txBox="1"/>
+          <p:nvPr/>
+        </p:nvSpPr>
+        <p:spPr>
+          <a:xfrm>
+            <a:off x="4283968" y="4005064"/>
+            <a:ext cx="4033284" cy="1200329"/>
+          </a:xfrm>
+          <a:prstGeom prst="rect">
+            <a:avLst/>
+          </a:prstGeom>
+          <a:solidFill>
+            <a:schemeClr val="bg1"/>
+          </a:solidFill>
+          <a:ln>
+            <a:solidFill>
+              <a:schemeClr val="tx1"/>
+            </a:solidFill>
+          </a:ln>
+        </p:spPr>
+        <p:txBody>
+          <a:bodyPr wrap="none" rtlCol="0">
+            <a:spAutoFit/>
+          </a:bodyPr>
+          <a:lstStyle/>
+          <a:p>
+            <a:r>
+              <a:rPr lang="en-US" sz="2400" dirty="0" smtClean="0"/>
+              <a:t>Works for all block statements:</a:t>
+            </a:r>
+          </a:p>
+          <a:p>
+            <a:r>
+              <a:rPr lang="en-US" sz="2400" dirty="0" smtClean="0">
+                <a:latin typeface="Courier New" panose="02070309020205020404" pitchFamily="49" charset="0"/>
+                <a:cs typeface="Courier New" panose="02070309020205020404" pitchFamily="49" charset="0"/>
+              </a:rPr>
+              <a:t>IF</a:t>
+            </a:r>
+            <a:r>
+              <a:rPr lang="en-US" sz="2400" dirty="0" smtClean="0"/>
+              <a:t>, </a:t>
+            </a:r>
+            <a:r>
+              <a:rPr lang="en-US" sz="2400" dirty="0" smtClean="0">
+                <a:latin typeface="Courier New" panose="02070309020205020404" pitchFamily="49" charset="0"/>
+                <a:cs typeface="Courier New" panose="02070309020205020404" pitchFamily="49" charset="0"/>
+              </a:rPr>
+              <a:t>CASE SELECT</a:t>
+            </a:r>
+            <a:r>
+              <a:rPr lang="en-US" sz="2400" dirty="0" smtClean="0"/>
+              <a:t>, </a:t>
+            </a:r>
+            <a:r>
+              <a:rPr lang="en-US" sz="2400" dirty="0" smtClean="0">
+                <a:latin typeface="Courier New" panose="02070309020205020404" pitchFamily="49" charset="0"/>
+                <a:cs typeface="Courier New" panose="02070309020205020404" pitchFamily="49" charset="0"/>
+              </a:rPr>
+              <a:t>WHERE</a:t>
+            </a:r>
+            <a:r>
+              <a:rPr lang="en-US" sz="2400" dirty="0" smtClean="0"/>
+              <a:t>,</a:t>
+            </a:r>
+            <a:br>
+              <a:rPr lang="en-US" sz="2400" dirty="0" smtClean="0"/>
+            </a:br>
+            <a:r>
+              <a:rPr lang="en-US" sz="2400" dirty="0" smtClean="0">
+                <a:latin typeface="Courier New" panose="02070309020205020404" pitchFamily="49" charset="0"/>
+                <a:cs typeface="Courier New" panose="02070309020205020404" pitchFamily="49" charset="0"/>
+              </a:rPr>
+              <a:t>DO</a:t>
+            </a:r>
+            <a:r>
+              <a:rPr lang="en-US" sz="2400" dirty="0" smtClean="0"/>
+              <a:t>, </a:t>
+            </a:r>
+            <a:r>
+              <a:rPr lang="en-US" sz="2400" dirty="0" smtClean="0">
+                <a:latin typeface="Courier New" panose="02070309020205020404" pitchFamily="49" charset="0"/>
+                <a:cs typeface="Courier New" panose="02070309020205020404" pitchFamily="49" charset="0"/>
+              </a:rPr>
+              <a:t>DO WHILE</a:t>
+            </a:r>
+            <a:r>
+              <a:rPr lang="en-US" sz="2400" dirty="0" smtClean="0"/>
+              <a:t>, </a:t>
+            </a:r>
+            <a:r>
+              <a:rPr lang="en-US" sz="2400" dirty="0" smtClean="0">
+                <a:latin typeface="Courier New" panose="02070309020205020404" pitchFamily="49" charset="0"/>
+                <a:cs typeface="Courier New" panose="02070309020205020404" pitchFamily="49" charset="0"/>
+              </a:rPr>
+              <a:t>FORALL</a:t>
+            </a:r>
+            <a:endParaRPr lang="nl-BE" sz="2400" dirty="0">
+              <a:latin typeface="Courier New" panose="02070309020205020404" pitchFamily="49" charset="0"/>
+              <a:cs typeface="Courier New" panose="02070309020205020404" pitchFamily="49" charset="0"/>
+            </a:endParaRPr>
+          </a:p>
+        </p:txBody>
+      </p:sp>
+      <p:pic>
+        <p:nvPicPr>
+          <p:cNvPr id="6" name="Picture 5" descr="C:\Users\lucg5005\AppData\Local\Microsoft\Windows\Temporary Internet Files\Content.IE5\T8RCCH8G\thumb-up-silhouette[1].jpg"/>
+          <p:cNvPicPr>
+            <a:picLocks noChangeAspect="1" noChangeArrowheads="1"/>
+          </p:cNvPicPr>
+          <p:nvPr/>
+        </p:nvPicPr>
+        <p:blipFill>
+          <a:blip r:embed="rId2" cstate="print">
+            <a:extLst>
+              <a:ext uri="{28A0092B-C50C-407E-A947-70E740481C1C}">
+                <a14:useLocalDpi xmlns:a14="http://schemas.microsoft.com/office/drawing/2010/main" val="0"/>
+              </a:ext>
+            </a:extLst>
+          </a:blip>
+          <a:srcRect/>
+          <a:stretch>
+            <a:fillRect/>
+          </a:stretch>
+        </p:blipFill>
+        <p:spPr bwMode="auto">
+          <a:xfrm>
+            <a:off x="7407696" y="5301208"/>
+            <a:ext cx="1124744" cy="1124744"/>
+          </a:xfrm>
+          <a:prstGeom prst="rect">
+            <a:avLst/>
+          </a:prstGeom>
+          <a:noFill/>
+          <a:extLst>
+            <a:ext uri="{909E8E84-426E-40DD-AFC4-6F175D3DCCD1}">
+              <a14:hiddenFill xmlns:a14="http://schemas.microsoft.com/office/drawing/2010/main">
+                <a:solidFill>
+                  <a:srgbClr val="FFFFFF"/>
+                </a:solidFill>
+              </a14:hiddenFill>
+            </a:ext>
+          </a:extLst>
+        </p:spPr>
+      </p:pic>
+    </p:spTree>
+    <p:extLst>
+      <p:ext uri="{BB962C8B-B14F-4D97-AF65-F5344CB8AC3E}">
+        <p14:creationId xmlns:p14="http://schemas.microsoft.com/office/powerpoint/2010/main" val="1791909261"/>
+      </p:ext>
+    </p:extLst>
+  </p:cSld>
+  <p:clrMapOvr>
+    <a:masterClrMapping/>
+  </p:clrMapOvr>
+</p:sld>
+</file>
+
+<file path=ppt/slides/slide18.xml><?xml version="1.0" encoding="utf-8"?>
+<p:sld xmlns:a="http://schemas.openxmlformats.org/drawingml/2006/main" xmlns:r="http://schemas.openxmlformats.org/officeDocument/2006/relationships" xmlns:p="http://schemas.openxmlformats.org/presentationml/2006/main">
+  <p:cSld>
+    <p:spTree>
+      <p:nvGrpSpPr>
+        <p:cNvPr id="1" name=""/>
+        <p:cNvGrpSpPr/>
+        <p:nvPr/>
+      </p:nvGrpSpPr>
+      <p:grpSpPr>
+        <a:xfrm>
+          <a:off x="0" y="0"/>
+          <a:ext cx="0" cy="0"/>
+          <a:chOff x="0" y="0"/>
+          <a:chExt cx="0" cy="0"/>
+        </a:xfrm>
+      </p:grpSpPr>
+      <p:sp>
+        <p:nvSpPr>
+          <p:cNvPr id="2" name="Title 1"/>
+          <p:cNvSpPr>
+            <a:spLocks noGrp="1"/>
+          </p:cNvSpPr>
+          <p:nvPr>
+            <p:ph type="title"/>
+          </p:nvPr>
+        </p:nvSpPr>
+        <p:spPr/>
+        <p:txBody>
+          <a:bodyPr/>
+          <a:lstStyle/>
+          <a:p>
+            <a:r>
+              <a:rPr lang="en-US" dirty="0" smtClean="0"/>
+              <a:t>Arrays</a:t>
+            </a:r>
+            <a:endParaRPr lang="nl-BE" dirty="0"/>
+          </a:p>
+        </p:txBody>
+      </p:sp>
+      <p:sp>
+        <p:nvSpPr>
+          <p:cNvPr id="3" name="Text Placeholder 2"/>
+          <p:cNvSpPr>
+            <a:spLocks noGrp="1"/>
+          </p:cNvSpPr>
+          <p:nvPr>
+            <p:ph type="body" idx="1"/>
+          </p:nvPr>
+        </p:nvSpPr>
+        <p:spPr/>
+        <p:txBody>
+          <a:bodyPr/>
+          <a:lstStyle/>
+          <a:p>
+            <a:endParaRPr lang="nl-BE"/>
+          </a:p>
+        </p:txBody>
+      </p:sp>
+    </p:spTree>
+    <p:extLst>
+      <p:ext uri="{BB962C8B-B14F-4D97-AF65-F5344CB8AC3E}">
+        <p14:creationId xmlns:p14="http://schemas.microsoft.com/office/powerpoint/2010/main" val="1545060293"/>
+      </p:ext>
+    </p:extLst>
+  </p:cSld>
+  <p:clrMapOvr>
+    <a:masterClrMapping/>
+  </p:clrMapOvr>
+</p:sld>
+</file>
+
+<file path=ppt/slides/slide19.xml><?xml version="1.0" encoding="utf-8"?>
+<p:sld xmlns:a="http://schemas.openxmlformats.org/drawingml/2006/main" xmlns:r="http://schemas.openxmlformats.org/officeDocument/2006/relationships" xmlns:p="http://schemas.openxmlformats.org/presentationml/2006/main">
+  <p:cSld>
+    <p:spTree>
+      <p:nvGrpSpPr>
+        <p:cNvPr id="1" name=""/>
+        <p:cNvGrpSpPr/>
+        <p:nvPr/>
+      </p:nvGrpSpPr>
+      <p:grpSpPr>
+        <a:xfrm>
+          <a:off x="0" y="0"/>
+          <a:ext cx="0" cy="0"/>
+          <a:chOff x="0" y="0"/>
+          <a:chExt cx="0" cy="0"/>
+        </a:xfrm>
+      </p:grpSpPr>
+      <p:sp>
+        <p:nvSpPr>
+          <p:cNvPr id="2" name="Title 1"/>
+          <p:cNvSpPr>
+            <a:spLocks noGrp="1"/>
+          </p:cNvSpPr>
+          <p:nvPr>
+            <p:ph type="title"/>
+          </p:nvPr>
+        </p:nvSpPr>
+        <p:spPr/>
+        <p:txBody>
+          <a:bodyPr/>
+          <a:lstStyle/>
+          <a:p>
+            <a:r>
+              <a:rPr lang="en-US" dirty="0" smtClean="0"/>
+              <a:t>Array declaration</a:t>
+            </a:r>
+            <a:endParaRPr lang="nl-BE" dirty="0"/>
+          </a:p>
+        </p:txBody>
+      </p:sp>
+      <p:sp>
+        <p:nvSpPr>
+          <p:cNvPr id="3" name="Content Placeholder 2"/>
+          <p:cNvSpPr>
+            <a:spLocks noGrp="1"/>
+          </p:cNvSpPr>
+          <p:nvPr>
+            <p:ph idx="1"/>
+          </p:nvPr>
+        </p:nvSpPr>
+        <p:spPr/>
+        <p:txBody>
+          <a:bodyPr/>
+          <a:lstStyle/>
+          <a:p>
+            <a:r>
+              <a:rPr lang="en-US" dirty="0" smtClean="0"/>
+              <a:t>Statically declared</a:t>
+            </a:r>
+            <a:endParaRPr lang="nl-BE" dirty="0"/>
+          </a:p>
+        </p:txBody>
+      </p:sp>
+      <p:sp>
+        <p:nvSpPr>
+          <p:cNvPr id="4" name="TextBox 3"/>
+          <p:cNvSpPr txBox="1"/>
+          <p:nvPr/>
+        </p:nvSpPr>
+        <p:spPr>
+          <a:xfrm>
+            <a:off x="827584" y="2348880"/>
+            <a:ext cx="6120680" cy="1815882"/>
+          </a:xfrm>
+          <a:prstGeom prst="rect">
+            <a:avLst/>
+          </a:prstGeom>
+          <a:solidFill>
+            <a:schemeClr val="accent1">
+              <a:lumMod val="40000"/>
+              <a:lumOff val="60000"/>
+            </a:schemeClr>
+          </a:solidFill>
+        </p:spPr>
+        <p:txBody>
+          <a:bodyPr wrap="square" rtlCol="0">
+            <a:spAutoFit/>
+          </a:bodyPr>
+          <a:lstStyle/>
+          <a:p>
+            <a:r>
+              <a:rPr lang="en-US" sz="1600" dirty="0" smtClean="0"/>
+              <a:t>…</a:t>
+            </a:r>
+          </a:p>
+          <a:p>
+            <a:r>
+              <a:rPr lang="en-US" sz="1600" dirty="0" smtClean="0"/>
+              <a:t>INTEGER, PARAMETER :: </a:t>
+            </a:r>
+            <a:r>
+              <a:rPr lang="en-US" sz="1600" dirty="0" err="1" smtClean="0"/>
+              <a:t>dp</a:t>
+            </a:r>
+            <a:r>
+              <a:rPr lang="en-US" sz="1600" dirty="0" smtClean="0"/>
+              <a:t> = SELECT_READ_KIND(p=12, r=150)</a:t>
+            </a:r>
+          </a:p>
+          <a:p>
+            <a:r>
+              <a:rPr lang="en-US" sz="1600" dirty="0" smtClean="0"/>
+              <a:t>REAL(KIND=</a:t>
+            </a:r>
+            <a:r>
+              <a:rPr lang="en-US" sz="1600" dirty="0" err="1" smtClean="0"/>
+              <a:t>dp</a:t>
+            </a:r>
+            <a:r>
+              <a:rPr lang="en-US" sz="1600" dirty="0" smtClean="0"/>
+              <a:t>), DIMENSION(100) :: v</a:t>
+            </a:r>
+            <a:br>
+              <a:rPr lang="en-US" sz="1600" dirty="0" smtClean="0"/>
+            </a:br>
+            <a:r>
+              <a:rPr lang="en-US" sz="1600" dirty="0" smtClean="0"/>
+              <a:t>…</a:t>
+            </a:r>
+          </a:p>
+          <a:p>
+            <a:r>
+              <a:rPr lang="en-US" sz="1600" dirty="0" smtClean="0"/>
+              <a:t>INTEGER, PARAMETER :: m = 2000, n = 1000</a:t>
+            </a:r>
+          </a:p>
+          <a:p>
+            <a:r>
+              <a:rPr lang="en-US" sz="1600" dirty="0" smtClean="0"/>
+              <a:t>REAL(KIND=</a:t>
+            </a:r>
+            <a:r>
+              <a:rPr lang="en-US" sz="1600" dirty="0" err="1" smtClean="0"/>
+              <a:t>dp</a:t>
+            </a:r>
+            <a:r>
+              <a:rPr lang="en-US" sz="1600" dirty="0" smtClean="0"/>
+              <a:t>), DIMENSION(m, n) :: A</a:t>
+            </a:r>
+          </a:p>
+          <a:p>
+            <a:r>
+              <a:rPr lang="en-US" sz="1600" dirty="0" smtClean="0"/>
+              <a:t>…</a:t>
+            </a:r>
+            <a:endParaRPr lang="en-US" sz="1600" dirty="0"/>
+          </a:p>
+        </p:txBody>
+      </p:sp>
+    </p:spTree>
+    <p:extLst>
+      <p:ext uri="{BB962C8B-B14F-4D97-AF65-F5344CB8AC3E}">
+        <p14:creationId xmlns:p14="http://schemas.microsoft.com/office/powerpoint/2010/main" val="617132539"/>
       </p:ext>
     </p:extLst>
   </p:cSld>
@@ -6128,7 +6927,6 @@
               <a:rPr lang="en-US" sz="1600" dirty="0" smtClean="0"/>
               <a:t>                                         ' out of ', n</a:t>
             </a:r>
-            <a:endParaRPr lang="en-US" sz="1600" dirty="0" smtClean="0"/>
           </a:p>
           <a:p>
             <a:r>
@@ -7117,11 +7915,7 @@
           <a:p>
             <a:r>
               <a:rPr lang="en-US" dirty="0" smtClean="0"/>
-              <a:t>   </a:t>
-            </a:r>
-            <a:r>
-              <a:rPr lang="en-US" dirty="0" smtClean="0"/>
-              <a:t> </a:t>
+              <a:t>    </a:t>
             </a:r>
             <a:r>
               <a:rPr lang="en-US" b="1" dirty="0" smtClean="0">
@@ -7129,15 +7923,7 @@
                   <a:srgbClr val="C00000"/>
                 </a:solidFill>
               </a:rPr>
-              <a:t>IMPLICIT </a:t>
-            </a:r>
-            <a:r>
-              <a:rPr lang="en-US" b="1" dirty="0" smtClean="0">
-                <a:solidFill>
-                  <a:srgbClr val="C00000"/>
-                </a:solidFill>
-              </a:rPr>
-              <a:t>NONE</a:t>
+              <a:t>IMPLICIT NONE</a:t>
             </a:r>
           </a:p>
           <a:p>
@@ -7159,6 +7945,47 @@
           </a:p>
         </p:txBody>
       </p:sp>
+      <p:pic>
+        <p:nvPicPr>
+          <p:cNvPr id="1029" name="Picture 5" descr="C:\Users\lucg5005\AppData\Local\Microsoft\Windows\Temporary Internet Files\Content.IE5\T8RCCH8G\thumb-up-silhouette[1].jpg"/>
+          <p:cNvPicPr>
+            <a:picLocks noChangeAspect="1" noChangeArrowheads="1"/>
+          </p:cNvPicPr>
+          <p:nvPr/>
+        </p:nvPicPr>
+        <p:blipFill>
+          <a:blip r:embed="rId2" cstate="print">
+            <a:extLst>
+              <a:ext uri="{28A0092B-C50C-407E-A947-70E740481C1C}">
+                <a14:useLocalDpi xmlns:a14="http://schemas.microsoft.com/office/drawing/2010/main" val="0"/>
+              </a:ext>
+            </a:extLst>
+          </a:blip>
+          <a:srcRect/>
+          <a:stretch>
+            <a:fillRect/>
+          </a:stretch>
+        </p:blipFill>
+        <p:spPr bwMode="auto">
+          <a:xfrm>
+            <a:off x="6804248" y="1196752"/>
+            <a:ext cx="1124744" cy="1124744"/>
+          </a:xfrm>
+          <a:prstGeom prst="rect">
+            <a:avLst/>
+          </a:prstGeom>
+          <a:noFill/>
+          <a:extLst>
+            <a:ext uri="{909E8E84-426E-40DD-AFC4-6F175D3DCCD1}">
+              <a14:hiddenFill xmlns:a14="http://schemas.microsoft.com/office/drawing/2010/main">
+                <a:solidFill>
+                  <a:srgbClr val="FFFFFF"/>
+                </a:solidFill>
+              </a14:hiddenFill>
+            </a:ext>
+          </a:extLst>
+        </p:spPr>
+      </p:pic>
     </p:spTree>
     <p:extLst>
       <p:ext uri="{BB962C8B-B14F-4D97-AF65-F5344CB8AC3E}">
@@ -7206,11 +8033,7 @@
           <a:p>
             <a:r>
               <a:rPr lang="en-US" dirty="0" smtClean="0"/>
-              <a:t>Fortran 90 versus Fortran </a:t>
-            </a:r>
-            <a:r>
-              <a:rPr lang="en-US" dirty="0" smtClean="0"/>
-              <a:t>95+</a:t>
+              <a:t>Fortran 90 versus Fortran 95+</a:t>
             </a:r>
             <a:endParaRPr lang="nl-BE" dirty="0"/>
           </a:p>
@@ -7554,11 +8377,7 @@
           <a:p>
             <a:r>
               <a:rPr lang="en-US" sz="1600" dirty="0" smtClean="0"/>
-              <a:t>INTEGER</a:t>
-            </a:r>
-            <a:r>
-              <a:rPr lang="en-US" sz="1600" dirty="0" smtClean="0"/>
-              <a:t>, PARAMETER :: </a:t>
+              <a:t>INTEGER, PARAMETER :: </a:t>
             </a:r>
             <a:r>
               <a:rPr lang="en-US" sz="1600" dirty="0" err="1" smtClean="0"/>
@@ -7566,22 +8385,13 @@
             </a:r>
             <a:r>
               <a:rPr lang="en-US" sz="1600" dirty="0" smtClean="0"/>
-              <a:t> = SELECTED_REAL_KIND(p=6, r=30), </a:t>
-            </a:r>
-            <a:r>
-              <a:rPr lang="en-US" sz="1600" dirty="0" smtClean="0"/>
-              <a:t>         &amp;</a:t>
-            </a:r>
-            <a:endParaRPr lang="en-US" sz="1600" dirty="0" smtClean="0"/>
-          </a:p>
-          <a:p>
-            <a:r>
-              <a:rPr lang="en-US" sz="1600" dirty="0" smtClean="0"/>
-              <a:t>                                           </a:t>
-            </a:r>
-            <a:r>
-              <a:rPr lang="en-US" sz="1600" dirty="0" smtClean="0"/>
-              <a:t> </a:t>
+              <a:t> = SELECTED_REAL_KIND(p=6, r=30),          &amp;</a:t>
+            </a:r>
+          </a:p>
+          <a:p>
+            <a:r>
+              <a:rPr lang="en-US" sz="1600" dirty="0" smtClean="0"/>
+              <a:t>                                            </a:t>
             </a:r>
             <a:r>
               <a:rPr lang="en-US" sz="1600" dirty="0" err="1" smtClean="0"/>
@@ -7589,26 +8399,13 @@
             </a:r>
             <a:r>
               <a:rPr lang="en-US" sz="1600" dirty="0" smtClean="0"/>
-              <a:t> </a:t>
-            </a:r>
-            <a:r>
-              <a:rPr lang="en-US" sz="1600" dirty="0" smtClean="0"/>
-              <a:t>= SELECTED_REAL_KIND (p=12, r=100), </a:t>
-            </a:r>
-            <a:r>
-              <a:rPr lang="en-US" sz="1600" dirty="0" smtClean="0"/>
-              <a:t>   &amp;</a:t>
-            </a:r>
-            <a:endParaRPr lang="en-US" sz="1600" dirty="0" smtClean="0"/>
-          </a:p>
-          <a:p>
-            <a:r>
-              <a:rPr lang="en-US" sz="1600" dirty="0" smtClean="0"/>
-              <a:t>                                           </a:t>
-            </a:r>
-            <a:r>
-              <a:rPr lang="en-US" sz="1600" dirty="0" smtClean="0"/>
-              <a:t> </a:t>
+              <a:t> = SELECTED_REAL_KIND (p=12, r=100),    &amp;</a:t>
+            </a:r>
+          </a:p>
+          <a:p>
+            <a:r>
+              <a:rPr lang="en-US" sz="1600" dirty="0" smtClean="0"/>
+              <a:t>                                            </a:t>
             </a:r>
             <a:r>
               <a:rPr lang="en-US" sz="1600" dirty="0" err="1" smtClean="0"/>
@@ -7616,30 +8413,13 @@
             </a:r>
             <a:r>
               <a:rPr lang="en-US" sz="1600" dirty="0" smtClean="0"/>
-              <a:t> </a:t>
-            </a:r>
-            <a:r>
-              <a:rPr lang="en-US" sz="1600" dirty="0" smtClean="0"/>
-              <a:t>= SELECTED_INT_KIND (r=8), </a:t>
-            </a:r>
-            <a:r>
-              <a:rPr lang="en-US" sz="1600" dirty="0" smtClean="0"/>
-              <a:t>                     &amp;</a:t>
-            </a:r>
-            <a:endParaRPr lang="en-US" sz="1600" dirty="0" smtClean="0"/>
-          </a:p>
-          <a:p>
-            <a:r>
-              <a:rPr lang="en-US" sz="1600" dirty="0" smtClean="0"/>
-              <a:t>                                           </a:t>
-            </a:r>
-            <a:r>
-              <a:rPr lang="en-US" sz="1600" dirty="0" smtClean="0"/>
-              <a:t> long </a:t>
-            </a:r>
-            <a:r>
-              <a:rPr lang="en-US" sz="1600" dirty="0" smtClean="0"/>
-              <a:t>= SELECTED_INT_KIND(r=20)</a:t>
+              <a:t> = SELECTED_INT_KIND (r=8),                      &amp;</a:t>
+            </a:r>
+          </a:p>
+          <a:p>
+            <a:r>
+              <a:rPr lang="en-US" sz="1600" dirty="0" smtClean="0"/>
+              <a:t>                                            long = SELECTED_INT_KIND(r=20)</a:t>
             </a:r>
           </a:p>
           <a:p>
@@ -7762,11 +8542,7 @@
             </a:r>
             <a:r>
               <a:rPr lang="en-US" sz="1600" dirty="0" smtClean="0"/>
-              <a:t>**</a:t>
-            </a:r>
-            <a:r>
-              <a:rPr lang="en-US" sz="1600" dirty="0" smtClean="0"/>
-              <a:t>40</a:t>
+              <a:t>**40</a:t>
             </a:r>
             <a:r>
               <a:rPr lang="en-US" sz="1600" b="1" dirty="0" smtClean="0">
@@ -7786,7 +8562,6 @@
               <a:rPr lang="en-US" sz="1600" dirty="0" smtClean="0"/>
               <a:t>…</a:t>
             </a:r>
-            <a:endParaRPr lang="en-US" sz="1600" dirty="0" smtClean="0"/>
           </a:p>
         </p:txBody>
       </p:sp>
@@ -8421,6 +9196,47 @@
           </p:style>
         </p:cxnSp>
       </p:grpSp>
+      <p:pic>
+        <p:nvPicPr>
+          <p:cNvPr id="19" name="Picture 5" descr="C:\Users\lucg5005\AppData\Local\Microsoft\Windows\Temporary Internet Files\Content.IE5\T8RCCH8G\thumb-up-silhouette[1].jpg"/>
+          <p:cNvPicPr>
+            <a:picLocks noChangeAspect="1" noChangeArrowheads="1"/>
+          </p:cNvPicPr>
+          <p:nvPr/>
+        </p:nvPicPr>
+        <p:blipFill>
+          <a:blip r:embed="rId4" cstate="print">
+            <a:extLst>
+              <a:ext uri="{28A0092B-C50C-407E-A947-70E740481C1C}">
+                <a14:useLocalDpi xmlns:a14="http://schemas.microsoft.com/office/drawing/2010/main" val="0"/>
+              </a:ext>
+            </a:extLst>
+          </a:blip>
+          <a:srcRect/>
+          <a:stretch>
+            <a:fillRect/>
+          </a:stretch>
+        </p:blipFill>
+        <p:spPr bwMode="auto">
+          <a:xfrm>
+            <a:off x="802673" y="4378796"/>
+            <a:ext cx="1124744" cy="1124744"/>
+          </a:xfrm>
+          <a:prstGeom prst="rect">
+            <a:avLst/>
+          </a:prstGeom>
+          <a:noFill/>
+          <a:extLst>
+            <a:ext uri="{909E8E84-426E-40DD-AFC4-6F175D3DCCD1}">
+              <a14:hiddenFill xmlns:a14="http://schemas.microsoft.com/office/drawing/2010/main">
+                <a:solidFill>
+                  <a:srgbClr val="FFFFFF"/>
+                </a:solidFill>
+              </a14:hiddenFill>
+            </a:ext>
+          </a:extLst>
+        </p:spPr>
+      </p:pic>
     </p:spTree>
     <p:extLst>
       <p:ext uri="{BB962C8B-B14F-4D97-AF65-F5344CB8AC3E}">

</xml_diff>